<commit_message>
change alphabet soup plot
</commit_message>
<xml_diff>
--- a/Workflow Figure - Weight Perception BP3 1a_SZ_v3.pptx
+++ b/Workflow Figure - Weight Perception BP3 1a_SZ_v3.pptx
@@ -2,12 +2,12 @@
 <file path=ppt/presentation.xml><?xml version="1.0" encoding="utf-8"?>
 <p:presentation xmlns:a="http://schemas.openxmlformats.org/drawingml/2006/main" xmlns:r="http://schemas.openxmlformats.org/officeDocument/2006/relationships" xmlns:p="http://schemas.openxmlformats.org/presentationml/2006/main" autoCompressPictures="0">
   <p:sldMasterIdLst>
-    <p:sldMasterId id="2147483828" r:id="rId1"/>
+    <p:sldMasterId id="2147483840" r:id="rId1"/>
   </p:sldMasterIdLst>
   <p:sldIdLst>
     <p:sldId id="256" r:id="rId2"/>
   </p:sldIdLst>
-  <p:sldSz cx="20116800" cy="13716000"/>
+  <p:sldSz cx="20116800" cy="14630400"/>
   <p:notesSz cx="6858000" cy="9144000"/>
   <p:defaultTextStyle>
     <a:defPPr>
@@ -141,15 +141,15 @@
         </p:nvSpPr>
         <p:spPr>
           <a:xfrm>
-            <a:off x="1508760" y="2244726"/>
-            <a:ext cx="17099280" cy="4775200"/>
+            <a:off x="1508760" y="2394374"/>
+            <a:ext cx="17099280" cy="5093547"/>
           </a:xfrm>
         </p:spPr>
         <p:txBody>
           <a:bodyPr anchor="b"/>
           <a:lstStyle>
             <a:lvl1pPr algn="ctr">
-              <a:defRPr sz="12000"/>
+              <a:defRPr sz="12800"/>
             </a:lvl1pPr>
           </a:lstStyle>
           <a:p>
@@ -173,8 +173,8 @@
         </p:nvSpPr>
         <p:spPr>
           <a:xfrm>
-            <a:off x="2514600" y="7204076"/>
-            <a:ext cx="15087600" cy="3311524"/>
+            <a:off x="2514600" y="7684348"/>
+            <a:ext cx="15087600" cy="3532292"/>
           </a:xfrm>
         </p:spPr>
         <p:txBody>
@@ -182,39 +182,39 @@
           <a:lstStyle>
             <a:lvl1pPr marL="0" indent="0" algn="ctr">
               <a:buNone/>
-              <a:defRPr sz="4800"/>
+              <a:defRPr sz="5120"/>
             </a:lvl1pPr>
-            <a:lvl2pPr marL="914400" indent="0" algn="ctr">
+            <a:lvl2pPr marL="975345" indent="0" algn="ctr">
               <a:buNone/>
-              <a:defRPr sz="4000"/>
+              <a:defRPr sz="4267"/>
             </a:lvl2pPr>
-            <a:lvl3pPr marL="1828800" indent="0" algn="ctr">
+            <a:lvl3pPr marL="1950690" indent="0" algn="ctr">
               <a:buNone/>
-              <a:defRPr sz="3600"/>
+              <a:defRPr sz="3840"/>
             </a:lvl3pPr>
-            <a:lvl4pPr marL="2743200" indent="0" algn="ctr">
+            <a:lvl4pPr marL="2926034" indent="0" algn="ctr">
               <a:buNone/>
-              <a:defRPr sz="3200"/>
+              <a:defRPr sz="3413"/>
             </a:lvl4pPr>
-            <a:lvl5pPr marL="3657600" indent="0" algn="ctr">
+            <a:lvl5pPr marL="3901379" indent="0" algn="ctr">
               <a:buNone/>
-              <a:defRPr sz="3200"/>
+              <a:defRPr sz="3413"/>
             </a:lvl5pPr>
-            <a:lvl6pPr marL="4572000" indent="0" algn="ctr">
+            <a:lvl6pPr marL="4876724" indent="0" algn="ctr">
               <a:buNone/>
-              <a:defRPr sz="3200"/>
+              <a:defRPr sz="3413"/>
             </a:lvl6pPr>
-            <a:lvl7pPr marL="5486400" indent="0" algn="ctr">
+            <a:lvl7pPr marL="5852069" indent="0" algn="ctr">
               <a:buNone/>
-              <a:defRPr sz="3200"/>
+              <a:defRPr sz="3413"/>
             </a:lvl7pPr>
-            <a:lvl8pPr marL="6400800" indent="0" algn="ctr">
+            <a:lvl8pPr marL="6827413" indent="0" algn="ctr">
               <a:buNone/>
-              <a:defRPr sz="3200"/>
+              <a:defRPr sz="3413"/>
             </a:lvl8pPr>
-            <a:lvl9pPr marL="7315200" indent="0" algn="ctr">
+            <a:lvl9pPr marL="7802758" indent="0" algn="ctr">
               <a:buNone/>
-              <a:defRPr sz="3200"/>
+              <a:defRPr sz="3413"/>
             </a:lvl9pPr>
           </a:lstStyle>
           <a:p>
@@ -294,7 +294,7 @@
     </p:spTree>
     <p:extLst>
       <p:ext uri="{BB962C8B-B14F-4D97-AF65-F5344CB8AC3E}">
-        <p14:creationId xmlns:p14="http://schemas.microsoft.com/office/powerpoint/2010/main" val="3238188909"/>
+        <p14:creationId xmlns:p14="http://schemas.microsoft.com/office/powerpoint/2010/main" val="593906198"/>
       </p:ext>
     </p:extLst>
   </p:cSld>
@@ -464,7 +464,7 @@
     </p:spTree>
     <p:extLst>
       <p:ext uri="{BB962C8B-B14F-4D97-AF65-F5344CB8AC3E}">
-        <p14:creationId xmlns:p14="http://schemas.microsoft.com/office/powerpoint/2010/main" val="3131145349"/>
+        <p14:creationId xmlns:p14="http://schemas.microsoft.com/office/powerpoint/2010/main" val="2383679818"/>
       </p:ext>
     </p:extLst>
   </p:cSld>
@@ -503,8 +503,8 @@
         </p:nvSpPr>
         <p:spPr>
           <a:xfrm>
-            <a:off x="14396086" y="730250"/>
-            <a:ext cx="4337685" cy="11623676"/>
+            <a:off x="14396086" y="778933"/>
+            <a:ext cx="4337685" cy="12398588"/>
           </a:xfrm>
         </p:spPr>
         <p:txBody>
@@ -531,8 +531,8 @@
         </p:nvSpPr>
         <p:spPr>
           <a:xfrm>
-            <a:off x="1383031" y="730250"/>
-            <a:ext cx="12761595" cy="11623676"/>
+            <a:off x="1383031" y="778933"/>
+            <a:ext cx="12761595" cy="12398588"/>
           </a:xfrm>
         </p:spPr>
         <p:txBody>
@@ -644,7 +644,7 @@
     </p:spTree>
     <p:extLst>
       <p:ext uri="{BB962C8B-B14F-4D97-AF65-F5344CB8AC3E}">
-        <p14:creationId xmlns:p14="http://schemas.microsoft.com/office/powerpoint/2010/main" val="1505047540"/>
+        <p14:creationId xmlns:p14="http://schemas.microsoft.com/office/powerpoint/2010/main" val="1572253344"/>
       </p:ext>
     </p:extLst>
   </p:cSld>
@@ -814,7 +814,7 @@
     </p:spTree>
     <p:extLst>
       <p:ext uri="{BB962C8B-B14F-4D97-AF65-F5344CB8AC3E}">
-        <p14:creationId xmlns:p14="http://schemas.microsoft.com/office/powerpoint/2010/main" val="3603603568"/>
+        <p14:creationId xmlns:p14="http://schemas.microsoft.com/office/powerpoint/2010/main" val="449372837"/>
       </p:ext>
     </p:extLst>
   </p:cSld>
@@ -853,15 +853,15 @@
         </p:nvSpPr>
         <p:spPr>
           <a:xfrm>
-            <a:off x="1372554" y="3419479"/>
-            <a:ext cx="17350740" cy="5705474"/>
+            <a:off x="1372554" y="3647444"/>
+            <a:ext cx="17350740" cy="6085839"/>
           </a:xfrm>
         </p:spPr>
         <p:txBody>
           <a:bodyPr anchor="b"/>
           <a:lstStyle>
             <a:lvl1pPr>
-              <a:defRPr sz="12000"/>
+              <a:defRPr sz="12800"/>
             </a:lvl1pPr>
           </a:lstStyle>
           <a:p>
@@ -885,8 +885,8 @@
         </p:nvSpPr>
         <p:spPr>
           <a:xfrm>
-            <a:off x="1372554" y="9178929"/>
-            <a:ext cx="17350740" cy="3000374"/>
+            <a:off x="1372554" y="9790858"/>
+            <a:ext cx="17350740" cy="3200399"/>
           </a:xfrm>
         </p:spPr>
         <p:txBody>
@@ -894,15 +894,15 @@
           <a:lstStyle>
             <a:lvl1pPr marL="0" indent="0">
               <a:buNone/>
-              <a:defRPr sz="4800">
+              <a:defRPr sz="5120">
                 <a:solidFill>
                   <a:schemeClr val="tx1"/>
                 </a:solidFill>
               </a:defRPr>
             </a:lvl1pPr>
-            <a:lvl2pPr marL="914400" indent="0">
+            <a:lvl2pPr marL="975345" indent="0">
               <a:buNone/>
-              <a:defRPr sz="4000">
+              <a:defRPr sz="4267">
                 <a:solidFill>
                   <a:schemeClr val="tx1">
                     <a:tint val="75000"/>
@@ -910,9 +910,9 @@
                 </a:solidFill>
               </a:defRPr>
             </a:lvl2pPr>
-            <a:lvl3pPr marL="1828800" indent="0">
+            <a:lvl3pPr marL="1950690" indent="0">
               <a:buNone/>
-              <a:defRPr sz="3600">
+              <a:defRPr sz="3840">
                 <a:solidFill>
                   <a:schemeClr val="tx1">
                     <a:tint val="75000"/>
@@ -920,9 +920,9 @@
                 </a:solidFill>
               </a:defRPr>
             </a:lvl3pPr>
-            <a:lvl4pPr marL="2743200" indent="0">
+            <a:lvl4pPr marL="2926034" indent="0">
               <a:buNone/>
-              <a:defRPr sz="3200">
+              <a:defRPr sz="3413">
                 <a:solidFill>
                   <a:schemeClr val="tx1">
                     <a:tint val="75000"/>
@@ -930,9 +930,9 @@
                 </a:solidFill>
               </a:defRPr>
             </a:lvl4pPr>
-            <a:lvl5pPr marL="3657600" indent="0">
+            <a:lvl5pPr marL="3901379" indent="0">
               <a:buNone/>
-              <a:defRPr sz="3200">
+              <a:defRPr sz="3413">
                 <a:solidFill>
                   <a:schemeClr val="tx1">
                     <a:tint val="75000"/>
@@ -940,9 +940,9 @@
                 </a:solidFill>
               </a:defRPr>
             </a:lvl5pPr>
-            <a:lvl6pPr marL="4572000" indent="0">
+            <a:lvl6pPr marL="4876724" indent="0">
               <a:buNone/>
-              <a:defRPr sz="3200">
+              <a:defRPr sz="3413">
                 <a:solidFill>
                   <a:schemeClr val="tx1">
                     <a:tint val="75000"/>
@@ -950,9 +950,9 @@
                 </a:solidFill>
               </a:defRPr>
             </a:lvl6pPr>
-            <a:lvl7pPr marL="5486400" indent="0">
+            <a:lvl7pPr marL="5852069" indent="0">
               <a:buNone/>
-              <a:defRPr sz="3200">
+              <a:defRPr sz="3413">
                 <a:solidFill>
                   <a:schemeClr val="tx1">
                     <a:tint val="75000"/>
@@ -960,9 +960,9 @@
                 </a:solidFill>
               </a:defRPr>
             </a:lvl7pPr>
-            <a:lvl8pPr marL="6400800" indent="0">
+            <a:lvl8pPr marL="6827413" indent="0">
               <a:buNone/>
-              <a:defRPr sz="3200">
+              <a:defRPr sz="3413">
                 <a:solidFill>
                   <a:schemeClr val="tx1">
                     <a:tint val="75000"/>
@@ -970,9 +970,9 @@
                 </a:solidFill>
               </a:defRPr>
             </a:lvl8pPr>
-            <a:lvl9pPr marL="7315200" indent="0">
+            <a:lvl9pPr marL="7802758" indent="0">
               <a:buNone/>
-              <a:defRPr sz="3200">
+              <a:defRPr sz="3413">
                 <a:solidFill>
                   <a:schemeClr val="tx1">
                     <a:tint val="75000"/>
@@ -1058,7 +1058,7 @@
     </p:spTree>
     <p:extLst>
       <p:ext uri="{BB962C8B-B14F-4D97-AF65-F5344CB8AC3E}">
-        <p14:creationId xmlns:p14="http://schemas.microsoft.com/office/powerpoint/2010/main" val="2924573809"/>
+        <p14:creationId xmlns:p14="http://schemas.microsoft.com/office/powerpoint/2010/main" val="955360990"/>
       </p:ext>
     </p:extLst>
   </p:cSld>
@@ -1120,8 +1120,8 @@
         </p:nvSpPr>
         <p:spPr>
           <a:xfrm>
-            <a:off x="1383030" y="3651250"/>
-            <a:ext cx="8549640" cy="8702676"/>
+            <a:off x="1383030" y="3894667"/>
+            <a:ext cx="8549640" cy="9282854"/>
           </a:xfrm>
         </p:spPr>
         <p:txBody>
@@ -1177,8 +1177,8 @@
         </p:nvSpPr>
         <p:spPr>
           <a:xfrm>
-            <a:off x="10184130" y="3651250"/>
-            <a:ext cx="8549640" cy="8702676"/>
+            <a:off x="10184130" y="3894667"/>
+            <a:ext cx="8549640" cy="9282854"/>
           </a:xfrm>
         </p:spPr>
         <p:txBody>
@@ -1290,7 +1290,7 @@
     </p:spTree>
     <p:extLst>
       <p:ext uri="{BB962C8B-B14F-4D97-AF65-F5344CB8AC3E}">
-        <p14:creationId xmlns:p14="http://schemas.microsoft.com/office/powerpoint/2010/main" val="4275688452"/>
+        <p14:creationId xmlns:p14="http://schemas.microsoft.com/office/powerpoint/2010/main" val="1805136845"/>
       </p:ext>
     </p:extLst>
   </p:cSld>
@@ -1329,8 +1329,8 @@
         </p:nvSpPr>
         <p:spPr>
           <a:xfrm>
-            <a:off x="1385650" y="730253"/>
-            <a:ext cx="17350740" cy="2651126"/>
+            <a:off x="1385650" y="778936"/>
+            <a:ext cx="17350740" cy="2827868"/>
           </a:xfrm>
         </p:spPr>
         <p:txBody>
@@ -1357,8 +1357,8 @@
         </p:nvSpPr>
         <p:spPr>
           <a:xfrm>
-            <a:off x="1385652" y="3362326"/>
-            <a:ext cx="8510348" cy="1647824"/>
+            <a:off x="1385652" y="3586481"/>
+            <a:ext cx="8510348" cy="1757679"/>
           </a:xfrm>
         </p:spPr>
         <p:txBody>
@@ -1366,39 +1366,39 @@
           <a:lstStyle>
             <a:lvl1pPr marL="0" indent="0">
               <a:buNone/>
-              <a:defRPr sz="4800" b="1"/>
+              <a:defRPr sz="5120" b="1"/>
             </a:lvl1pPr>
-            <a:lvl2pPr marL="914400" indent="0">
+            <a:lvl2pPr marL="975345" indent="0">
               <a:buNone/>
-              <a:defRPr sz="4000" b="1"/>
+              <a:defRPr sz="4267" b="1"/>
             </a:lvl2pPr>
-            <a:lvl3pPr marL="1828800" indent="0">
+            <a:lvl3pPr marL="1950690" indent="0">
               <a:buNone/>
-              <a:defRPr sz="3600" b="1"/>
+              <a:defRPr sz="3840" b="1"/>
             </a:lvl3pPr>
-            <a:lvl4pPr marL="2743200" indent="0">
+            <a:lvl4pPr marL="2926034" indent="0">
               <a:buNone/>
-              <a:defRPr sz="3200" b="1"/>
+              <a:defRPr sz="3413" b="1"/>
             </a:lvl4pPr>
-            <a:lvl5pPr marL="3657600" indent="0">
+            <a:lvl5pPr marL="3901379" indent="0">
               <a:buNone/>
-              <a:defRPr sz="3200" b="1"/>
+              <a:defRPr sz="3413" b="1"/>
             </a:lvl5pPr>
-            <a:lvl6pPr marL="4572000" indent="0">
+            <a:lvl6pPr marL="4876724" indent="0">
               <a:buNone/>
-              <a:defRPr sz="3200" b="1"/>
+              <a:defRPr sz="3413" b="1"/>
             </a:lvl6pPr>
-            <a:lvl7pPr marL="5486400" indent="0">
+            <a:lvl7pPr marL="5852069" indent="0">
               <a:buNone/>
-              <a:defRPr sz="3200" b="1"/>
+              <a:defRPr sz="3413" b="1"/>
             </a:lvl7pPr>
-            <a:lvl8pPr marL="6400800" indent="0">
+            <a:lvl8pPr marL="6827413" indent="0">
               <a:buNone/>
-              <a:defRPr sz="3200" b="1"/>
+              <a:defRPr sz="3413" b="1"/>
             </a:lvl8pPr>
-            <a:lvl9pPr marL="7315200" indent="0">
+            <a:lvl9pPr marL="7802758" indent="0">
               <a:buNone/>
-              <a:defRPr sz="3200" b="1"/>
+              <a:defRPr sz="3413" b="1"/>
             </a:lvl9pPr>
           </a:lstStyle>
           <a:p>
@@ -1422,8 +1422,8 @@
         </p:nvSpPr>
         <p:spPr>
           <a:xfrm>
-            <a:off x="1385652" y="5010150"/>
-            <a:ext cx="8510348" cy="7369176"/>
+            <a:off x="1385652" y="5344160"/>
+            <a:ext cx="8510348" cy="7860454"/>
           </a:xfrm>
         </p:spPr>
         <p:txBody>
@@ -1479,8 +1479,8 @@
         </p:nvSpPr>
         <p:spPr>
           <a:xfrm>
-            <a:off x="10184131" y="3362326"/>
-            <a:ext cx="8552260" cy="1647824"/>
+            <a:off x="10184131" y="3586481"/>
+            <a:ext cx="8552260" cy="1757679"/>
           </a:xfrm>
         </p:spPr>
         <p:txBody>
@@ -1488,39 +1488,39 @@
           <a:lstStyle>
             <a:lvl1pPr marL="0" indent="0">
               <a:buNone/>
-              <a:defRPr sz="4800" b="1"/>
+              <a:defRPr sz="5120" b="1"/>
             </a:lvl1pPr>
-            <a:lvl2pPr marL="914400" indent="0">
+            <a:lvl2pPr marL="975345" indent="0">
               <a:buNone/>
-              <a:defRPr sz="4000" b="1"/>
+              <a:defRPr sz="4267" b="1"/>
             </a:lvl2pPr>
-            <a:lvl3pPr marL="1828800" indent="0">
+            <a:lvl3pPr marL="1950690" indent="0">
               <a:buNone/>
-              <a:defRPr sz="3600" b="1"/>
+              <a:defRPr sz="3840" b="1"/>
             </a:lvl3pPr>
-            <a:lvl4pPr marL="2743200" indent="0">
+            <a:lvl4pPr marL="2926034" indent="0">
               <a:buNone/>
-              <a:defRPr sz="3200" b="1"/>
+              <a:defRPr sz="3413" b="1"/>
             </a:lvl4pPr>
-            <a:lvl5pPr marL="3657600" indent="0">
+            <a:lvl5pPr marL="3901379" indent="0">
               <a:buNone/>
-              <a:defRPr sz="3200" b="1"/>
+              <a:defRPr sz="3413" b="1"/>
             </a:lvl5pPr>
-            <a:lvl6pPr marL="4572000" indent="0">
+            <a:lvl6pPr marL="4876724" indent="0">
               <a:buNone/>
-              <a:defRPr sz="3200" b="1"/>
+              <a:defRPr sz="3413" b="1"/>
             </a:lvl6pPr>
-            <a:lvl7pPr marL="5486400" indent="0">
+            <a:lvl7pPr marL="5852069" indent="0">
               <a:buNone/>
-              <a:defRPr sz="3200" b="1"/>
+              <a:defRPr sz="3413" b="1"/>
             </a:lvl7pPr>
-            <a:lvl8pPr marL="6400800" indent="0">
+            <a:lvl8pPr marL="6827413" indent="0">
               <a:buNone/>
-              <a:defRPr sz="3200" b="1"/>
+              <a:defRPr sz="3413" b="1"/>
             </a:lvl8pPr>
-            <a:lvl9pPr marL="7315200" indent="0">
+            <a:lvl9pPr marL="7802758" indent="0">
               <a:buNone/>
-              <a:defRPr sz="3200" b="1"/>
+              <a:defRPr sz="3413" b="1"/>
             </a:lvl9pPr>
           </a:lstStyle>
           <a:p>
@@ -1544,8 +1544,8 @@
         </p:nvSpPr>
         <p:spPr>
           <a:xfrm>
-            <a:off x="10184131" y="5010150"/>
-            <a:ext cx="8552260" cy="7369176"/>
+            <a:off x="10184131" y="5344160"/>
+            <a:ext cx="8552260" cy="7860454"/>
           </a:xfrm>
         </p:spPr>
         <p:txBody>
@@ -1657,7 +1657,7 @@
     </p:spTree>
     <p:extLst>
       <p:ext uri="{BB962C8B-B14F-4D97-AF65-F5344CB8AC3E}">
-        <p14:creationId xmlns:p14="http://schemas.microsoft.com/office/powerpoint/2010/main" val="871265274"/>
+        <p14:creationId xmlns:p14="http://schemas.microsoft.com/office/powerpoint/2010/main" val="2868026913"/>
       </p:ext>
     </p:extLst>
   </p:cSld>
@@ -1775,7 +1775,7 @@
     </p:spTree>
     <p:extLst>
       <p:ext uri="{BB962C8B-B14F-4D97-AF65-F5344CB8AC3E}">
-        <p14:creationId xmlns:p14="http://schemas.microsoft.com/office/powerpoint/2010/main" val="3244168472"/>
+        <p14:creationId xmlns:p14="http://schemas.microsoft.com/office/powerpoint/2010/main" val="1496963821"/>
       </p:ext>
     </p:extLst>
   </p:cSld>
@@ -1870,7 +1870,7 @@
     </p:spTree>
     <p:extLst>
       <p:ext uri="{BB962C8B-B14F-4D97-AF65-F5344CB8AC3E}">
-        <p14:creationId xmlns:p14="http://schemas.microsoft.com/office/powerpoint/2010/main" val="1468768138"/>
+        <p14:creationId xmlns:p14="http://schemas.microsoft.com/office/powerpoint/2010/main" val="2349347120"/>
       </p:ext>
     </p:extLst>
   </p:cSld>
@@ -1909,15 +1909,15 @@
         </p:nvSpPr>
         <p:spPr>
           <a:xfrm>
-            <a:off x="1385650" y="914400"/>
-            <a:ext cx="6488192" cy="3200400"/>
+            <a:off x="1385650" y="975360"/>
+            <a:ext cx="6488192" cy="3413760"/>
           </a:xfrm>
         </p:spPr>
         <p:txBody>
           <a:bodyPr anchor="b"/>
           <a:lstStyle>
             <a:lvl1pPr>
-              <a:defRPr sz="6400"/>
+              <a:defRPr sz="6827"/>
             </a:lvl1pPr>
           </a:lstStyle>
           <a:p>
@@ -1941,39 +1941,39 @@
         </p:nvSpPr>
         <p:spPr>
           <a:xfrm>
-            <a:off x="8552260" y="1974853"/>
-            <a:ext cx="10184130" cy="9747250"/>
+            <a:off x="8552260" y="2106510"/>
+            <a:ext cx="10184130" cy="10397067"/>
           </a:xfrm>
         </p:spPr>
         <p:txBody>
           <a:bodyPr/>
           <a:lstStyle>
             <a:lvl1pPr>
-              <a:defRPr sz="6400"/>
+              <a:defRPr sz="6827"/>
             </a:lvl1pPr>
             <a:lvl2pPr>
-              <a:defRPr sz="5600"/>
+              <a:defRPr sz="5973"/>
             </a:lvl2pPr>
             <a:lvl3pPr>
-              <a:defRPr sz="4800"/>
+              <a:defRPr sz="5120"/>
             </a:lvl3pPr>
             <a:lvl4pPr>
-              <a:defRPr sz="4000"/>
+              <a:defRPr sz="4267"/>
             </a:lvl4pPr>
             <a:lvl5pPr>
-              <a:defRPr sz="4000"/>
+              <a:defRPr sz="4267"/>
             </a:lvl5pPr>
             <a:lvl6pPr>
-              <a:defRPr sz="4000"/>
+              <a:defRPr sz="4267"/>
             </a:lvl6pPr>
             <a:lvl7pPr>
-              <a:defRPr sz="4000"/>
+              <a:defRPr sz="4267"/>
             </a:lvl7pPr>
             <a:lvl8pPr>
-              <a:defRPr sz="4000"/>
+              <a:defRPr sz="4267"/>
             </a:lvl8pPr>
             <a:lvl9pPr>
-              <a:defRPr sz="4000"/>
+              <a:defRPr sz="4267"/>
             </a:lvl9pPr>
           </a:lstStyle>
           <a:p>
@@ -2026,8 +2026,8 @@
         </p:nvSpPr>
         <p:spPr>
           <a:xfrm>
-            <a:off x="1385650" y="4114800"/>
-            <a:ext cx="6488192" cy="7623176"/>
+            <a:off x="1385650" y="4389120"/>
+            <a:ext cx="6488192" cy="8131388"/>
           </a:xfrm>
         </p:spPr>
         <p:txBody>
@@ -2035,39 +2035,39 @@
           <a:lstStyle>
             <a:lvl1pPr marL="0" indent="0">
               <a:buNone/>
-              <a:defRPr sz="3200"/>
+              <a:defRPr sz="3413"/>
             </a:lvl1pPr>
-            <a:lvl2pPr marL="914400" indent="0">
+            <a:lvl2pPr marL="975345" indent="0">
               <a:buNone/>
-              <a:defRPr sz="2800"/>
+              <a:defRPr sz="2987"/>
             </a:lvl2pPr>
-            <a:lvl3pPr marL="1828800" indent="0">
+            <a:lvl3pPr marL="1950690" indent="0">
               <a:buNone/>
-              <a:defRPr sz="2400"/>
+              <a:defRPr sz="2560"/>
             </a:lvl3pPr>
-            <a:lvl4pPr marL="2743200" indent="0">
+            <a:lvl4pPr marL="2926034" indent="0">
               <a:buNone/>
-              <a:defRPr sz="2000"/>
+              <a:defRPr sz="2133"/>
             </a:lvl4pPr>
-            <a:lvl5pPr marL="3657600" indent="0">
+            <a:lvl5pPr marL="3901379" indent="0">
               <a:buNone/>
-              <a:defRPr sz="2000"/>
+              <a:defRPr sz="2133"/>
             </a:lvl5pPr>
-            <a:lvl6pPr marL="4572000" indent="0">
+            <a:lvl6pPr marL="4876724" indent="0">
               <a:buNone/>
-              <a:defRPr sz="2000"/>
+              <a:defRPr sz="2133"/>
             </a:lvl6pPr>
-            <a:lvl7pPr marL="5486400" indent="0">
+            <a:lvl7pPr marL="5852069" indent="0">
               <a:buNone/>
-              <a:defRPr sz="2000"/>
+              <a:defRPr sz="2133"/>
             </a:lvl7pPr>
-            <a:lvl8pPr marL="6400800" indent="0">
+            <a:lvl8pPr marL="6827413" indent="0">
               <a:buNone/>
-              <a:defRPr sz="2000"/>
+              <a:defRPr sz="2133"/>
             </a:lvl8pPr>
-            <a:lvl9pPr marL="7315200" indent="0">
+            <a:lvl9pPr marL="7802758" indent="0">
               <a:buNone/>
-              <a:defRPr sz="2000"/>
+              <a:defRPr sz="2133"/>
             </a:lvl9pPr>
           </a:lstStyle>
           <a:p>
@@ -2147,7 +2147,7 @@
     </p:spTree>
     <p:extLst>
       <p:ext uri="{BB962C8B-B14F-4D97-AF65-F5344CB8AC3E}">
-        <p14:creationId xmlns:p14="http://schemas.microsoft.com/office/powerpoint/2010/main" val="936481896"/>
+        <p14:creationId xmlns:p14="http://schemas.microsoft.com/office/powerpoint/2010/main" val="339299639"/>
       </p:ext>
     </p:extLst>
   </p:cSld>
@@ -2186,15 +2186,15 @@
         </p:nvSpPr>
         <p:spPr>
           <a:xfrm>
-            <a:off x="1385650" y="914400"/>
-            <a:ext cx="6488192" cy="3200400"/>
+            <a:off x="1385650" y="975360"/>
+            <a:ext cx="6488192" cy="3413760"/>
           </a:xfrm>
         </p:spPr>
         <p:txBody>
           <a:bodyPr anchor="b"/>
           <a:lstStyle>
             <a:lvl1pPr>
-              <a:defRPr sz="6400"/>
+              <a:defRPr sz="6827"/>
             </a:lvl1pPr>
           </a:lstStyle>
           <a:p>
@@ -2218,8 +2218,8 @@
         </p:nvSpPr>
         <p:spPr>
           <a:xfrm>
-            <a:off x="8552260" y="1974853"/>
-            <a:ext cx="10184130" cy="9747250"/>
+            <a:off x="8552260" y="2106510"/>
+            <a:ext cx="10184130" cy="10397067"/>
           </a:xfrm>
         </p:spPr>
         <p:txBody>
@@ -2227,39 +2227,39 @@
           <a:lstStyle>
             <a:lvl1pPr marL="0" indent="0">
               <a:buNone/>
-              <a:defRPr sz="6400"/>
+              <a:defRPr sz="6827"/>
             </a:lvl1pPr>
-            <a:lvl2pPr marL="914400" indent="0">
+            <a:lvl2pPr marL="975345" indent="0">
               <a:buNone/>
-              <a:defRPr sz="5600"/>
+              <a:defRPr sz="5973"/>
             </a:lvl2pPr>
-            <a:lvl3pPr marL="1828800" indent="0">
+            <a:lvl3pPr marL="1950690" indent="0">
               <a:buNone/>
-              <a:defRPr sz="4800"/>
+              <a:defRPr sz="5120"/>
             </a:lvl3pPr>
-            <a:lvl4pPr marL="2743200" indent="0">
+            <a:lvl4pPr marL="2926034" indent="0">
               <a:buNone/>
-              <a:defRPr sz="4000"/>
+              <a:defRPr sz="4267"/>
             </a:lvl4pPr>
-            <a:lvl5pPr marL="3657600" indent="0">
+            <a:lvl5pPr marL="3901379" indent="0">
               <a:buNone/>
-              <a:defRPr sz="4000"/>
+              <a:defRPr sz="4267"/>
             </a:lvl5pPr>
-            <a:lvl6pPr marL="4572000" indent="0">
+            <a:lvl6pPr marL="4876724" indent="0">
               <a:buNone/>
-              <a:defRPr sz="4000"/>
+              <a:defRPr sz="4267"/>
             </a:lvl6pPr>
-            <a:lvl7pPr marL="5486400" indent="0">
+            <a:lvl7pPr marL="5852069" indent="0">
               <a:buNone/>
-              <a:defRPr sz="4000"/>
+              <a:defRPr sz="4267"/>
             </a:lvl7pPr>
-            <a:lvl8pPr marL="6400800" indent="0">
+            <a:lvl8pPr marL="6827413" indent="0">
               <a:buNone/>
-              <a:defRPr sz="4000"/>
+              <a:defRPr sz="4267"/>
             </a:lvl8pPr>
-            <a:lvl9pPr marL="7315200" indent="0">
+            <a:lvl9pPr marL="7802758" indent="0">
               <a:buNone/>
-              <a:defRPr sz="4000"/>
+              <a:defRPr sz="4267"/>
             </a:lvl9pPr>
           </a:lstStyle>
           <a:p>
@@ -2283,8 +2283,8 @@
         </p:nvSpPr>
         <p:spPr>
           <a:xfrm>
-            <a:off x="1385650" y="4114800"/>
-            <a:ext cx="6488192" cy="7623176"/>
+            <a:off x="1385650" y="4389120"/>
+            <a:ext cx="6488192" cy="8131388"/>
           </a:xfrm>
         </p:spPr>
         <p:txBody>
@@ -2292,39 +2292,39 @@
           <a:lstStyle>
             <a:lvl1pPr marL="0" indent="0">
               <a:buNone/>
-              <a:defRPr sz="3200"/>
+              <a:defRPr sz="3413"/>
             </a:lvl1pPr>
-            <a:lvl2pPr marL="914400" indent="0">
+            <a:lvl2pPr marL="975345" indent="0">
               <a:buNone/>
-              <a:defRPr sz="2800"/>
+              <a:defRPr sz="2987"/>
             </a:lvl2pPr>
-            <a:lvl3pPr marL="1828800" indent="0">
+            <a:lvl3pPr marL="1950690" indent="0">
               <a:buNone/>
-              <a:defRPr sz="2400"/>
+              <a:defRPr sz="2560"/>
             </a:lvl3pPr>
-            <a:lvl4pPr marL="2743200" indent="0">
+            <a:lvl4pPr marL="2926034" indent="0">
               <a:buNone/>
-              <a:defRPr sz="2000"/>
+              <a:defRPr sz="2133"/>
             </a:lvl4pPr>
-            <a:lvl5pPr marL="3657600" indent="0">
+            <a:lvl5pPr marL="3901379" indent="0">
               <a:buNone/>
-              <a:defRPr sz="2000"/>
+              <a:defRPr sz="2133"/>
             </a:lvl5pPr>
-            <a:lvl6pPr marL="4572000" indent="0">
+            <a:lvl6pPr marL="4876724" indent="0">
               <a:buNone/>
-              <a:defRPr sz="2000"/>
+              <a:defRPr sz="2133"/>
             </a:lvl6pPr>
-            <a:lvl7pPr marL="5486400" indent="0">
+            <a:lvl7pPr marL="5852069" indent="0">
               <a:buNone/>
-              <a:defRPr sz="2000"/>
+              <a:defRPr sz="2133"/>
             </a:lvl7pPr>
-            <a:lvl8pPr marL="6400800" indent="0">
+            <a:lvl8pPr marL="6827413" indent="0">
               <a:buNone/>
-              <a:defRPr sz="2000"/>
+              <a:defRPr sz="2133"/>
             </a:lvl8pPr>
-            <a:lvl9pPr marL="7315200" indent="0">
+            <a:lvl9pPr marL="7802758" indent="0">
               <a:buNone/>
-              <a:defRPr sz="2000"/>
+              <a:defRPr sz="2133"/>
             </a:lvl9pPr>
           </a:lstStyle>
           <a:p>
@@ -2404,7 +2404,7 @@
     </p:spTree>
     <p:extLst>
       <p:ext uri="{BB962C8B-B14F-4D97-AF65-F5344CB8AC3E}">
-        <p14:creationId xmlns:p14="http://schemas.microsoft.com/office/powerpoint/2010/main" val="4102078022"/>
+        <p14:creationId xmlns:p14="http://schemas.microsoft.com/office/powerpoint/2010/main" val="1815916"/>
       </p:ext>
     </p:extLst>
   </p:cSld>
@@ -2448,8 +2448,8 @@
         </p:nvSpPr>
         <p:spPr>
           <a:xfrm>
-            <a:off x="1383030" y="730253"/>
-            <a:ext cx="17350740" cy="2651126"/>
+            <a:off x="1383030" y="778936"/>
+            <a:ext cx="17350740" cy="2827868"/>
           </a:xfrm>
           <a:prstGeom prst="rect">
             <a:avLst/>
@@ -2481,8 +2481,8 @@
         </p:nvSpPr>
         <p:spPr>
           <a:xfrm>
-            <a:off x="1383030" y="3651250"/>
-            <a:ext cx="17350740" cy="8702676"/>
+            <a:off x="1383030" y="3894667"/>
+            <a:ext cx="17350740" cy="9282854"/>
           </a:xfrm>
           <a:prstGeom prst="rect">
             <a:avLst/>
@@ -2543,8 +2543,8 @@
         </p:nvSpPr>
         <p:spPr>
           <a:xfrm>
-            <a:off x="1383030" y="12712703"/>
-            <a:ext cx="4526280" cy="730250"/>
+            <a:off x="1383030" y="13560217"/>
+            <a:ext cx="4526280" cy="778933"/>
           </a:xfrm>
           <a:prstGeom prst="rect">
             <a:avLst/>
@@ -2554,7 +2554,7 @@
           <a:bodyPr vert="horz" lIns="91440" tIns="45720" rIns="91440" bIns="45720" rtlCol="0" anchor="ctr"/>
           <a:lstStyle>
             <a:lvl1pPr algn="l">
-              <a:defRPr sz="2400">
+              <a:defRPr sz="2560">
                 <a:solidFill>
                   <a:schemeClr val="tx1">
                     <a:tint val="75000"/>
@@ -2584,8 +2584,8 @@
         </p:nvSpPr>
         <p:spPr>
           <a:xfrm>
-            <a:off x="6663690" y="12712703"/>
-            <a:ext cx="6789420" cy="730250"/>
+            <a:off x="6663690" y="13560217"/>
+            <a:ext cx="6789420" cy="778933"/>
           </a:xfrm>
           <a:prstGeom prst="rect">
             <a:avLst/>
@@ -2595,7 +2595,7 @@
           <a:bodyPr vert="horz" lIns="91440" tIns="45720" rIns="91440" bIns="45720" rtlCol="0" anchor="ctr"/>
           <a:lstStyle>
             <a:lvl1pPr algn="ctr">
-              <a:defRPr sz="2400">
+              <a:defRPr sz="2560">
                 <a:solidFill>
                   <a:schemeClr val="tx1">
                     <a:tint val="75000"/>
@@ -2621,8 +2621,8 @@
         </p:nvSpPr>
         <p:spPr>
           <a:xfrm>
-            <a:off x="14207490" y="12712703"/>
-            <a:ext cx="4526280" cy="730250"/>
+            <a:off x="14207490" y="13560217"/>
+            <a:ext cx="4526280" cy="778933"/>
           </a:xfrm>
           <a:prstGeom prst="rect">
             <a:avLst/>
@@ -2632,7 +2632,7 @@
           <a:bodyPr vert="horz" lIns="91440" tIns="45720" rIns="91440" bIns="45720" rtlCol="0" anchor="ctr"/>
           <a:lstStyle>
             <a:lvl1pPr algn="r">
-              <a:defRPr sz="2400">
+              <a:defRPr sz="2560">
                 <a:solidFill>
                   <a:schemeClr val="tx1">
                     <a:tint val="75000"/>
@@ -2653,27 +2653,27 @@
     </p:spTree>
     <p:extLst>
       <p:ext uri="{BB962C8B-B14F-4D97-AF65-F5344CB8AC3E}">
-        <p14:creationId xmlns:p14="http://schemas.microsoft.com/office/powerpoint/2010/main" val="1835137658"/>
+        <p14:creationId xmlns:p14="http://schemas.microsoft.com/office/powerpoint/2010/main" val="4175589924"/>
       </p:ext>
     </p:extLst>
   </p:cSld>
   <p:clrMap bg1="lt1" tx1="dk1" bg2="lt2" tx2="dk2" accent1="accent1" accent2="accent2" accent3="accent3" accent4="accent4" accent5="accent5" accent6="accent6" hlink="hlink" folHlink="folHlink"/>
   <p:sldLayoutIdLst>
-    <p:sldLayoutId id="2147483829" r:id="rId1"/>
-    <p:sldLayoutId id="2147483830" r:id="rId2"/>
-    <p:sldLayoutId id="2147483831" r:id="rId3"/>
-    <p:sldLayoutId id="2147483832" r:id="rId4"/>
-    <p:sldLayoutId id="2147483833" r:id="rId5"/>
-    <p:sldLayoutId id="2147483834" r:id="rId6"/>
-    <p:sldLayoutId id="2147483835" r:id="rId7"/>
-    <p:sldLayoutId id="2147483836" r:id="rId8"/>
-    <p:sldLayoutId id="2147483837" r:id="rId9"/>
-    <p:sldLayoutId id="2147483838" r:id="rId10"/>
-    <p:sldLayoutId id="2147483839" r:id="rId11"/>
+    <p:sldLayoutId id="2147483841" r:id="rId1"/>
+    <p:sldLayoutId id="2147483842" r:id="rId2"/>
+    <p:sldLayoutId id="2147483843" r:id="rId3"/>
+    <p:sldLayoutId id="2147483844" r:id="rId4"/>
+    <p:sldLayoutId id="2147483845" r:id="rId5"/>
+    <p:sldLayoutId id="2147483846" r:id="rId6"/>
+    <p:sldLayoutId id="2147483847" r:id="rId7"/>
+    <p:sldLayoutId id="2147483848" r:id="rId8"/>
+    <p:sldLayoutId id="2147483849" r:id="rId9"/>
+    <p:sldLayoutId id="2147483850" r:id="rId10"/>
+    <p:sldLayoutId id="2147483851" r:id="rId11"/>
   </p:sldLayoutIdLst>
   <p:txStyles>
     <p:titleStyle>
-      <a:lvl1pPr algn="l" defTabSz="1828800" rtl="0" eaLnBrk="1" latinLnBrk="0" hangingPunct="1">
+      <a:lvl1pPr algn="l" defTabSz="1950690" rtl="0" eaLnBrk="1" latinLnBrk="0" hangingPunct="1">
         <a:lnSpc>
           <a:spcPct val="90000"/>
         </a:lnSpc>
@@ -2681,7 +2681,7 @@
           <a:spcPct val="0"/>
         </a:spcBef>
         <a:buNone/>
-        <a:defRPr sz="8800" kern="1200">
+        <a:defRPr sz="9387" kern="1200">
           <a:solidFill>
             <a:schemeClr val="tx1"/>
           </a:solidFill>
@@ -2692,16 +2692,16 @@
       </a:lvl1pPr>
     </p:titleStyle>
     <p:bodyStyle>
-      <a:lvl1pPr marL="457200" indent="-457200" algn="l" defTabSz="1828800" rtl="0" eaLnBrk="1" latinLnBrk="0" hangingPunct="1">
+      <a:lvl1pPr marL="487672" indent="-487672" algn="l" defTabSz="1950690" rtl="0" eaLnBrk="1" latinLnBrk="0" hangingPunct="1">
         <a:lnSpc>
           <a:spcPct val="90000"/>
         </a:lnSpc>
         <a:spcBef>
-          <a:spcPts val="2000"/>
+          <a:spcPts val="2133"/>
         </a:spcBef>
         <a:buFont typeface="Arial" panose="020B0604020202020204" pitchFamily="34" charset="0"/>
         <a:buChar char="•"/>
-        <a:defRPr sz="5600" kern="1200">
+        <a:defRPr sz="5973" kern="1200">
           <a:solidFill>
             <a:schemeClr val="tx1"/>
           </a:solidFill>
@@ -2710,16 +2710,16 @@
           <a:cs typeface="+mn-cs"/>
         </a:defRPr>
       </a:lvl1pPr>
-      <a:lvl2pPr marL="1371600" indent="-457200" algn="l" defTabSz="1828800" rtl="0" eaLnBrk="1" latinLnBrk="0" hangingPunct="1">
+      <a:lvl2pPr marL="1463017" indent="-487672" algn="l" defTabSz="1950690" rtl="0" eaLnBrk="1" latinLnBrk="0" hangingPunct="1">
         <a:lnSpc>
           <a:spcPct val="90000"/>
         </a:lnSpc>
         <a:spcBef>
-          <a:spcPts val="1000"/>
+          <a:spcPts val="1067"/>
         </a:spcBef>
         <a:buFont typeface="Arial" panose="020B0604020202020204" pitchFamily="34" charset="0"/>
         <a:buChar char="•"/>
-        <a:defRPr sz="4800" kern="1200">
+        <a:defRPr sz="5120" kern="1200">
           <a:solidFill>
             <a:schemeClr val="tx1"/>
           </a:solidFill>
@@ -2728,16 +2728,16 @@
           <a:cs typeface="+mn-cs"/>
         </a:defRPr>
       </a:lvl2pPr>
-      <a:lvl3pPr marL="2286000" indent="-457200" algn="l" defTabSz="1828800" rtl="0" eaLnBrk="1" latinLnBrk="0" hangingPunct="1">
+      <a:lvl3pPr marL="2438362" indent="-487672" algn="l" defTabSz="1950690" rtl="0" eaLnBrk="1" latinLnBrk="0" hangingPunct="1">
         <a:lnSpc>
           <a:spcPct val="90000"/>
         </a:lnSpc>
         <a:spcBef>
-          <a:spcPts val="1000"/>
+          <a:spcPts val="1067"/>
         </a:spcBef>
         <a:buFont typeface="Arial" panose="020B0604020202020204" pitchFamily="34" charset="0"/>
         <a:buChar char="•"/>
-        <a:defRPr sz="4000" kern="1200">
+        <a:defRPr sz="4267" kern="1200">
           <a:solidFill>
             <a:schemeClr val="tx1"/>
           </a:solidFill>
@@ -2746,16 +2746,16 @@
           <a:cs typeface="+mn-cs"/>
         </a:defRPr>
       </a:lvl3pPr>
-      <a:lvl4pPr marL="3200400" indent="-457200" algn="l" defTabSz="1828800" rtl="0" eaLnBrk="1" latinLnBrk="0" hangingPunct="1">
+      <a:lvl4pPr marL="3413707" indent="-487672" algn="l" defTabSz="1950690" rtl="0" eaLnBrk="1" latinLnBrk="0" hangingPunct="1">
         <a:lnSpc>
           <a:spcPct val="90000"/>
         </a:lnSpc>
         <a:spcBef>
-          <a:spcPts val="1000"/>
+          <a:spcPts val="1067"/>
         </a:spcBef>
         <a:buFont typeface="Arial" panose="020B0604020202020204" pitchFamily="34" charset="0"/>
         <a:buChar char="•"/>
-        <a:defRPr sz="3600" kern="1200">
+        <a:defRPr sz="3840" kern="1200">
           <a:solidFill>
             <a:schemeClr val="tx1"/>
           </a:solidFill>
@@ -2764,16 +2764,16 @@
           <a:cs typeface="+mn-cs"/>
         </a:defRPr>
       </a:lvl4pPr>
-      <a:lvl5pPr marL="4114800" indent="-457200" algn="l" defTabSz="1828800" rtl="0" eaLnBrk="1" latinLnBrk="0" hangingPunct="1">
+      <a:lvl5pPr marL="4389051" indent="-487672" algn="l" defTabSz="1950690" rtl="0" eaLnBrk="1" latinLnBrk="0" hangingPunct="1">
         <a:lnSpc>
           <a:spcPct val="90000"/>
         </a:lnSpc>
         <a:spcBef>
-          <a:spcPts val="1000"/>
+          <a:spcPts val="1067"/>
         </a:spcBef>
         <a:buFont typeface="Arial" panose="020B0604020202020204" pitchFamily="34" charset="0"/>
         <a:buChar char="•"/>
-        <a:defRPr sz="3600" kern="1200">
+        <a:defRPr sz="3840" kern="1200">
           <a:solidFill>
             <a:schemeClr val="tx1"/>
           </a:solidFill>
@@ -2782,16 +2782,16 @@
           <a:cs typeface="+mn-cs"/>
         </a:defRPr>
       </a:lvl5pPr>
-      <a:lvl6pPr marL="5029200" indent="-457200" algn="l" defTabSz="1828800" rtl="0" eaLnBrk="1" latinLnBrk="0" hangingPunct="1">
+      <a:lvl6pPr marL="5364396" indent="-487672" algn="l" defTabSz="1950690" rtl="0" eaLnBrk="1" latinLnBrk="0" hangingPunct="1">
         <a:lnSpc>
           <a:spcPct val="90000"/>
         </a:lnSpc>
         <a:spcBef>
-          <a:spcPts val="1000"/>
+          <a:spcPts val="1067"/>
         </a:spcBef>
         <a:buFont typeface="Arial" panose="020B0604020202020204" pitchFamily="34" charset="0"/>
         <a:buChar char="•"/>
-        <a:defRPr sz="3600" kern="1200">
+        <a:defRPr sz="3840" kern="1200">
           <a:solidFill>
             <a:schemeClr val="tx1"/>
           </a:solidFill>
@@ -2800,16 +2800,16 @@
           <a:cs typeface="+mn-cs"/>
         </a:defRPr>
       </a:lvl6pPr>
-      <a:lvl7pPr marL="5943600" indent="-457200" algn="l" defTabSz="1828800" rtl="0" eaLnBrk="1" latinLnBrk="0" hangingPunct="1">
+      <a:lvl7pPr marL="6339741" indent="-487672" algn="l" defTabSz="1950690" rtl="0" eaLnBrk="1" latinLnBrk="0" hangingPunct="1">
         <a:lnSpc>
           <a:spcPct val="90000"/>
         </a:lnSpc>
         <a:spcBef>
-          <a:spcPts val="1000"/>
+          <a:spcPts val="1067"/>
         </a:spcBef>
         <a:buFont typeface="Arial" panose="020B0604020202020204" pitchFamily="34" charset="0"/>
         <a:buChar char="•"/>
-        <a:defRPr sz="3600" kern="1200">
+        <a:defRPr sz="3840" kern="1200">
           <a:solidFill>
             <a:schemeClr val="tx1"/>
           </a:solidFill>
@@ -2818,16 +2818,16 @@
           <a:cs typeface="+mn-cs"/>
         </a:defRPr>
       </a:lvl7pPr>
-      <a:lvl8pPr marL="6858000" indent="-457200" algn="l" defTabSz="1828800" rtl="0" eaLnBrk="1" latinLnBrk="0" hangingPunct="1">
+      <a:lvl8pPr marL="7315086" indent="-487672" algn="l" defTabSz="1950690" rtl="0" eaLnBrk="1" latinLnBrk="0" hangingPunct="1">
         <a:lnSpc>
           <a:spcPct val="90000"/>
         </a:lnSpc>
         <a:spcBef>
-          <a:spcPts val="1000"/>
+          <a:spcPts val="1067"/>
         </a:spcBef>
         <a:buFont typeface="Arial" panose="020B0604020202020204" pitchFamily="34" charset="0"/>
         <a:buChar char="•"/>
-        <a:defRPr sz="3600" kern="1200">
+        <a:defRPr sz="3840" kern="1200">
           <a:solidFill>
             <a:schemeClr val="tx1"/>
           </a:solidFill>
@@ -2836,16 +2836,16 @@
           <a:cs typeface="+mn-cs"/>
         </a:defRPr>
       </a:lvl8pPr>
-      <a:lvl9pPr marL="7772400" indent="-457200" algn="l" defTabSz="1828800" rtl="0" eaLnBrk="1" latinLnBrk="0" hangingPunct="1">
+      <a:lvl9pPr marL="8290430" indent="-487672" algn="l" defTabSz="1950690" rtl="0" eaLnBrk="1" latinLnBrk="0" hangingPunct="1">
         <a:lnSpc>
           <a:spcPct val="90000"/>
         </a:lnSpc>
         <a:spcBef>
-          <a:spcPts val="1000"/>
+          <a:spcPts val="1067"/>
         </a:spcBef>
         <a:buFont typeface="Arial" panose="020B0604020202020204" pitchFamily="34" charset="0"/>
         <a:buChar char="•"/>
-        <a:defRPr sz="3600" kern="1200">
+        <a:defRPr sz="3840" kern="1200">
           <a:solidFill>
             <a:schemeClr val="tx1"/>
           </a:solidFill>
@@ -2859,8 +2859,8 @@
       <a:defPPr>
         <a:defRPr lang="en-US"/>
       </a:defPPr>
-      <a:lvl1pPr marL="0" algn="l" defTabSz="1828800" rtl="0" eaLnBrk="1" latinLnBrk="0" hangingPunct="1">
-        <a:defRPr sz="3600" kern="1200">
+      <a:lvl1pPr marL="0" algn="l" defTabSz="1950690" rtl="0" eaLnBrk="1" latinLnBrk="0" hangingPunct="1">
+        <a:defRPr sz="3840" kern="1200">
           <a:solidFill>
             <a:schemeClr val="tx1"/>
           </a:solidFill>
@@ -2869,8 +2869,8 @@
           <a:cs typeface="+mn-cs"/>
         </a:defRPr>
       </a:lvl1pPr>
-      <a:lvl2pPr marL="914400" algn="l" defTabSz="1828800" rtl="0" eaLnBrk="1" latinLnBrk="0" hangingPunct="1">
-        <a:defRPr sz="3600" kern="1200">
+      <a:lvl2pPr marL="975345" algn="l" defTabSz="1950690" rtl="0" eaLnBrk="1" latinLnBrk="0" hangingPunct="1">
+        <a:defRPr sz="3840" kern="1200">
           <a:solidFill>
             <a:schemeClr val="tx1"/>
           </a:solidFill>
@@ -2879,8 +2879,8 @@
           <a:cs typeface="+mn-cs"/>
         </a:defRPr>
       </a:lvl2pPr>
-      <a:lvl3pPr marL="1828800" algn="l" defTabSz="1828800" rtl="0" eaLnBrk="1" latinLnBrk="0" hangingPunct="1">
-        <a:defRPr sz="3600" kern="1200">
+      <a:lvl3pPr marL="1950690" algn="l" defTabSz="1950690" rtl="0" eaLnBrk="1" latinLnBrk="0" hangingPunct="1">
+        <a:defRPr sz="3840" kern="1200">
           <a:solidFill>
             <a:schemeClr val="tx1"/>
           </a:solidFill>
@@ -2889,8 +2889,8 @@
           <a:cs typeface="+mn-cs"/>
         </a:defRPr>
       </a:lvl3pPr>
-      <a:lvl4pPr marL="2743200" algn="l" defTabSz="1828800" rtl="0" eaLnBrk="1" latinLnBrk="0" hangingPunct="1">
-        <a:defRPr sz="3600" kern="1200">
+      <a:lvl4pPr marL="2926034" algn="l" defTabSz="1950690" rtl="0" eaLnBrk="1" latinLnBrk="0" hangingPunct="1">
+        <a:defRPr sz="3840" kern="1200">
           <a:solidFill>
             <a:schemeClr val="tx1"/>
           </a:solidFill>
@@ -2899,8 +2899,8 @@
           <a:cs typeface="+mn-cs"/>
         </a:defRPr>
       </a:lvl4pPr>
-      <a:lvl5pPr marL="3657600" algn="l" defTabSz="1828800" rtl="0" eaLnBrk="1" latinLnBrk="0" hangingPunct="1">
-        <a:defRPr sz="3600" kern="1200">
+      <a:lvl5pPr marL="3901379" algn="l" defTabSz="1950690" rtl="0" eaLnBrk="1" latinLnBrk="0" hangingPunct="1">
+        <a:defRPr sz="3840" kern="1200">
           <a:solidFill>
             <a:schemeClr val="tx1"/>
           </a:solidFill>
@@ -2909,8 +2909,8 @@
           <a:cs typeface="+mn-cs"/>
         </a:defRPr>
       </a:lvl5pPr>
-      <a:lvl6pPr marL="4572000" algn="l" defTabSz="1828800" rtl="0" eaLnBrk="1" latinLnBrk="0" hangingPunct="1">
-        <a:defRPr sz="3600" kern="1200">
+      <a:lvl6pPr marL="4876724" algn="l" defTabSz="1950690" rtl="0" eaLnBrk="1" latinLnBrk="0" hangingPunct="1">
+        <a:defRPr sz="3840" kern="1200">
           <a:solidFill>
             <a:schemeClr val="tx1"/>
           </a:solidFill>
@@ -2919,8 +2919,8 @@
           <a:cs typeface="+mn-cs"/>
         </a:defRPr>
       </a:lvl6pPr>
-      <a:lvl7pPr marL="5486400" algn="l" defTabSz="1828800" rtl="0" eaLnBrk="1" latinLnBrk="0" hangingPunct="1">
-        <a:defRPr sz="3600" kern="1200">
+      <a:lvl7pPr marL="5852069" algn="l" defTabSz="1950690" rtl="0" eaLnBrk="1" latinLnBrk="0" hangingPunct="1">
+        <a:defRPr sz="3840" kern="1200">
           <a:solidFill>
             <a:schemeClr val="tx1"/>
           </a:solidFill>
@@ -2929,8 +2929,8 @@
           <a:cs typeface="+mn-cs"/>
         </a:defRPr>
       </a:lvl7pPr>
-      <a:lvl8pPr marL="6400800" algn="l" defTabSz="1828800" rtl="0" eaLnBrk="1" latinLnBrk="0" hangingPunct="1">
-        <a:defRPr sz="3600" kern="1200">
+      <a:lvl8pPr marL="6827413" algn="l" defTabSz="1950690" rtl="0" eaLnBrk="1" latinLnBrk="0" hangingPunct="1">
+        <a:defRPr sz="3840" kern="1200">
           <a:solidFill>
             <a:schemeClr val="tx1"/>
           </a:solidFill>
@@ -2939,8 +2939,8 @@
           <a:cs typeface="+mn-cs"/>
         </a:defRPr>
       </a:lvl8pPr>
-      <a:lvl9pPr marL="7315200" algn="l" defTabSz="1828800" rtl="0" eaLnBrk="1" latinLnBrk="0" hangingPunct="1">
-        <a:defRPr sz="3600" kern="1200">
+      <a:lvl9pPr marL="7802758" algn="l" defTabSz="1950690" rtl="0" eaLnBrk="1" latinLnBrk="0" hangingPunct="1">
+        <a:defRPr sz="3840" kern="1200">
           <a:solidFill>
             <a:schemeClr val="tx1"/>
           </a:solidFill>
@@ -2986,13 +2986,13 @@
           <p:nvPr>
             <p:extLst>
               <p:ext uri="{D42A27DB-BD31-4B8C-83A1-F6EECF244321}">
-                <p14:modId xmlns:p14="http://schemas.microsoft.com/office/powerpoint/2010/main" val="866802115"/>
+                <p14:modId xmlns:p14="http://schemas.microsoft.com/office/powerpoint/2010/main" val="3549214504"/>
               </p:ext>
             </p:extLst>
           </p:nvPr>
         </p:nvGraphicFramePr>
         <p:xfrm>
-          <a:off x="1083258" y="9031444"/>
+          <a:off x="933447" y="8838754"/>
           <a:ext cx="6390389" cy="670560"/>
         </p:xfrm>
         <a:graphic>
@@ -3521,13 +3521,13 @@
           <p:nvPr>
             <p:extLst>
               <p:ext uri="{D42A27DB-BD31-4B8C-83A1-F6EECF244321}">
-                <p14:modId xmlns:p14="http://schemas.microsoft.com/office/powerpoint/2010/main" val="417255966"/>
+                <p14:modId xmlns:p14="http://schemas.microsoft.com/office/powerpoint/2010/main" val="3174078575"/>
               </p:ext>
             </p:extLst>
           </p:nvPr>
         </p:nvGraphicFramePr>
         <p:xfrm>
-          <a:off x="1113019" y="8246856"/>
+          <a:off x="963208" y="8054166"/>
           <a:ext cx="6390389" cy="670560"/>
         </p:xfrm>
         <a:graphic>
@@ -4116,13 +4116,13 @@
           <p:nvPr>
             <p:extLst>
               <p:ext uri="{D42A27DB-BD31-4B8C-83A1-F6EECF244321}">
-                <p14:modId xmlns:p14="http://schemas.microsoft.com/office/powerpoint/2010/main" val="2152304636"/>
+                <p14:modId xmlns:p14="http://schemas.microsoft.com/office/powerpoint/2010/main" val="1256531757"/>
               </p:ext>
             </p:extLst>
           </p:nvPr>
         </p:nvGraphicFramePr>
         <p:xfrm>
-          <a:off x="7472277" y="9031444"/>
+          <a:off x="8495969" y="8838754"/>
           <a:ext cx="6390389" cy="670560"/>
         </p:xfrm>
         <a:graphic>
@@ -4711,13 +4711,13 @@
           <p:nvPr>
             <p:extLst>
               <p:ext uri="{D42A27DB-BD31-4B8C-83A1-F6EECF244321}">
-                <p14:modId xmlns:p14="http://schemas.microsoft.com/office/powerpoint/2010/main" val="325001514"/>
+                <p14:modId xmlns:p14="http://schemas.microsoft.com/office/powerpoint/2010/main" val="4234739395"/>
               </p:ext>
             </p:extLst>
           </p:nvPr>
         </p:nvGraphicFramePr>
         <p:xfrm>
-          <a:off x="7451227" y="8246856"/>
+          <a:off x="8474919" y="8054166"/>
           <a:ext cx="6390389" cy="670560"/>
         </p:xfrm>
         <a:graphic>
@@ -5365,7 +5365,7 @@
         </p:nvSpPr>
         <p:spPr>
           <a:xfrm>
-            <a:off x="15309058" y="11398356"/>
+            <a:off x="16013859" y="11856994"/>
             <a:ext cx="1374287" cy="369332"/>
           </a:xfrm>
           <a:prstGeom prst="rect">
@@ -5402,8 +5402,8 @@
         </p:nvCxnSpPr>
         <p:spPr bwMode="auto">
           <a:xfrm>
-            <a:off x="4374536" y="5421216"/>
-            <a:ext cx="11430000" cy="0"/>
+            <a:off x="3743680" y="5115657"/>
+            <a:ext cx="12893040" cy="0"/>
           </a:xfrm>
           <a:prstGeom prst="line">
             <a:avLst/>
@@ -5439,7 +5439,7 @@
         </p:nvCxnSpPr>
         <p:spPr bwMode="auto">
           <a:xfrm flipV="1">
-            <a:off x="1446589" y="1824389"/>
+            <a:off x="1513091" y="1550070"/>
             <a:ext cx="12180954" cy="18471"/>
           </a:xfrm>
           <a:prstGeom prst="line">
@@ -5474,7 +5474,7 @@
         </p:nvSpPr>
         <p:spPr bwMode="auto">
           <a:xfrm>
-            <a:off x="6940296" y="649857"/>
+            <a:off x="7006798" y="375537"/>
             <a:ext cx="6691310" cy="438150"/>
           </a:xfrm>
           <a:prstGeom prst="roundRect">
@@ -5529,7 +5529,7 @@
         </p:nvSpPr>
         <p:spPr bwMode="auto">
           <a:xfrm>
-            <a:off x="2294613" y="6111561"/>
+            <a:off x="1646037" y="5786977"/>
             <a:ext cx="4114800" cy="365760"/>
           </a:xfrm>
           <a:prstGeom prst="roundRect">
@@ -5587,7 +5587,7 @@
         </p:nvSpPr>
         <p:spPr bwMode="auto">
           <a:xfrm>
-            <a:off x="8267916" y="6068802"/>
+            <a:off x="8334418" y="5794482"/>
             <a:ext cx="4114800" cy="365760"/>
           </a:xfrm>
           <a:prstGeom prst="roundRect">
@@ -5647,7 +5647,7 @@
         </p:nvSpPr>
         <p:spPr bwMode="auto">
           <a:xfrm>
-            <a:off x="7918473" y="635569"/>
+            <a:off x="7984975" y="361249"/>
             <a:ext cx="4711700" cy="431800"/>
           </a:xfrm>
           <a:prstGeom prst="rect">
@@ -5841,7 +5841,7 @@
         </p:nvSpPr>
         <p:spPr bwMode="auto">
           <a:xfrm>
-            <a:off x="2195747" y="6570776"/>
+            <a:off x="1547171" y="6246192"/>
             <a:ext cx="4305106" cy="969496"/>
           </a:xfrm>
           <a:prstGeom prst="rect">
@@ -6029,7 +6029,7 @@
         </p:nvCxnSpPr>
         <p:spPr bwMode="auto">
           <a:xfrm>
-            <a:off x="10320360" y="1095111"/>
+            <a:off x="10386862" y="820791"/>
             <a:ext cx="1588" cy="457200"/>
           </a:xfrm>
           <a:prstGeom prst="straightConnector1">
@@ -6066,7 +6066,7 @@
         </p:nvCxnSpPr>
         <p:spPr bwMode="auto">
           <a:xfrm>
-            <a:off x="10264180" y="4637270"/>
+            <a:off x="10330683" y="4316456"/>
             <a:ext cx="6043" cy="546950"/>
           </a:xfrm>
           <a:prstGeom prst="straightConnector1">
@@ -6103,7 +6103,7 @@
         </p:nvCxnSpPr>
         <p:spPr bwMode="auto">
           <a:xfrm>
-            <a:off x="13019257" y="4600884"/>
+            <a:off x="13085760" y="4326564"/>
             <a:ext cx="777875" cy="779462"/>
           </a:xfrm>
           <a:prstGeom prst="line">
@@ -6148,7 +6148,7 @@
         </p:nvSpPr>
         <p:spPr bwMode="auto">
           <a:xfrm>
-            <a:off x="13709071" y="689777"/>
+            <a:off x="13775573" y="415457"/>
             <a:ext cx="3088834" cy="400110"/>
           </a:xfrm>
           <a:prstGeom prst="rect">
@@ -6338,7 +6338,7 @@
         </p:nvSpPr>
         <p:spPr bwMode="auto">
           <a:xfrm>
-            <a:off x="10468404" y="4714420"/>
+            <a:off x="10534906" y="4440101"/>
             <a:ext cx="2939790" cy="384721"/>
           </a:xfrm>
           <a:prstGeom prst="rect">
@@ -6526,7 +6526,7 @@
         </p:nvSpPr>
         <p:spPr bwMode="auto">
           <a:xfrm>
-            <a:off x="6963541" y="1605314"/>
+            <a:off x="7030043" y="1330994"/>
             <a:ext cx="6691310" cy="438150"/>
           </a:xfrm>
           <a:prstGeom prst="roundRect">
@@ -6583,7 +6583,7 @@
         </p:nvSpPr>
         <p:spPr bwMode="auto">
           <a:xfrm>
-            <a:off x="8867798" y="1608489"/>
+            <a:off x="8934300" y="1334169"/>
             <a:ext cx="2786062" cy="431800"/>
           </a:xfrm>
           <a:prstGeom prst="rect">
@@ -6775,7 +6775,7 @@
         </p:nvSpPr>
         <p:spPr bwMode="auto">
           <a:xfrm>
-            <a:off x="6990722" y="5225889"/>
+            <a:off x="7057224" y="4951569"/>
             <a:ext cx="6691310" cy="438150"/>
           </a:xfrm>
           <a:prstGeom prst="roundRect">
@@ -6832,7 +6832,7 @@
         </p:nvSpPr>
         <p:spPr bwMode="auto">
           <a:xfrm>
-            <a:off x="8429730" y="5210212"/>
+            <a:off x="8496232" y="4935893"/>
             <a:ext cx="3539900" cy="430887"/>
           </a:xfrm>
           <a:prstGeom prst="rect">
@@ -7026,7 +7026,7 @@
         </p:nvCxnSpPr>
         <p:spPr bwMode="auto">
           <a:xfrm>
-            <a:off x="10285951" y="7834754"/>
+            <a:off x="10352453" y="7560434"/>
             <a:ext cx="0" cy="457200"/>
           </a:xfrm>
           <a:prstGeom prst="straightConnector1">
@@ -7061,7 +7061,7 @@
         </p:nvCxnSpPr>
         <p:spPr bwMode="auto">
           <a:xfrm>
-            <a:off x="4387138" y="5421216"/>
+            <a:off x="3738562" y="5096632"/>
             <a:ext cx="0" cy="640080"/>
           </a:xfrm>
           <a:prstGeom prst="straightConnector1">
@@ -7096,7 +7096,7 @@
         </p:nvCxnSpPr>
         <p:spPr bwMode="auto">
           <a:xfrm>
-            <a:off x="1459634" y="1857409"/>
+            <a:off x="1526136" y="1583089"/>
             <a:ext cx="1588" cy="640080"/>
           </a:xfrm>
           <a:prstGeom prst="straightConnector1">
@@ -7131,7 +7131,7 @@
         </p:nvCxnSpPr>
         <p:spPr bwMode="auto">
           <a:xfrm flipH="1">
-            <a:off x="17933522" y="4344779"/>
+            <a:off x="17992590" y="4115063"/>
             <a:ext cx="0" cy="254000"/>
           </a:xfrm>
           <a:prstGeom prst="line">
@@ -7168,7 +7168,7 @@
         </p:nvCxnSpPr>
         <p:spPr bwMode="auto">
           <a:xfrm flipV="1">
-            <a:off x="10252552" y="4625952"/>
+            <a:off x="10319054" y="4351632"/>
             <a:ext cx="7692460" cy="0"/>
           </a:xfrm>
           <a:prstGeom prst="line">
@@ -7205,7 +7205,7 @@
         </p:nvCxnSpPr>
         <p:spPr bwMode="auto">
           <a:xfrm>
-            <a:off x="4455939" y="10069884"/>
+            <a:off x="3717663" y="10862348"/>
             <a:ext cx="0" cy="457200"/>
           </a:xfrm>
           <a:prstGeom prst="straightConnector1">
@@ -7240,7 +7240,7 @@
         </p:nvSpPr>
         <p:spPr bwMode="auto">
           <a:xfrm>
-            <a:off x="13798985" y="6184960"/>
+            <a:off x="14635527" y="5856310"/>
             <a:ext cx="4114800" cy="365760"/>
           </a:xfrm>
           <a:prstGeom prst="roundRect">
@@ -7300,7 +7300,7 @@
         </p:nvSpPr>
         <p:spPr bwMode="auto">
           <a:xfrm>
-            <a:off x="13818720" y="6641813"/>
+            <a:off x="14655263" y="6313163"/>
             <a:ext cx="4114801" cy="969496"/>
           </a:xfrm>
           <a:prstGeom prst="rect">
@@ -7490,7 +7490,7 @@
         </p:nvSpPr>
         <p:spPr bwMode="auto">
           <a:xfrm>
-            <a:off x="8267916" y="6558539"/>
+            <a:off x="8334419" y="6284219"/>
             <a:ext cx="4114801" cy="969496"/>
           </a:xfrm>
           <a:prstGeom prst="rect">
@@ -7679,7 +7679,7 @@
         </p:nvSpPr>
         <p:spPr bwMode="auto">
           <a:xfrm>
-            <a:off x="13693059" y="8430175"/>
+            <a:off x="14440884" y="8535625"/>
             <a:ext cx="4457693" cy="384721"/>
           </a:xfrm>
           <a:prstGeom prst="rect">
@@ -7856,7 +7856,7 @@
             </a:r>
             <a:r>
               <a:rPr lang="en-US" altLang="en-US" sz="1900" b="1" kern="0" dirty="0"/>
-              <a:t> from models (1)-(4)</a:t>
+              <a:t> from models (1)-(6)</a:t>
             </a:r>
           </a:p>
         </p:txBody>
@@ -7875,7 +7875,7 @@
         </p:nvCxnSpPr>
         <p:spPr bwMode="auto">
           <a:xfrm>
-            <a:off x="15766691" y="7936849"/>
+            <a:off x="16603233" y="7608199"/>
             <a:ext cx="0" cy="457200"/>
           </a:xfrm>
           <a:prstGeom prst="straightConnector1">
@@ -7912,7 +7912,7 @@
         </p:nvSpPr>
         <p:spPr bwMode="auto">
           <a:xfrm>
-            <a:off x="13627543" y="9813736"/>
+            <a:off x="14374386" y="10602134"/>
             <a:ext cx="4457693" cy="969496"/>
           </a:xfrm>
           <a:prstGeom prst="rect">
@@ -8116,7 +8116,7 @@
         </p:nvCxnSpPr>
         <p:spPr bwMode="auto">
           <a:xfrm>
-            <a:off x="15838346" y="9232161"/>
+            <a:off x="16641078" y="9684907"/>
             <a:ext cx="0" cy="457200"/>
           </a:xfrm>
           <a:prstGeom prst="straightConnector1">
@@ -8151,7 +8151,7 @@
         </p:nvCxnSpPr>
         <p:spPr bwMode="auto">
           <a:xfrm>
-            <a:off x="15792887" y="5421216"/>
+            <a:off x="16629429" y="5109191"/>
             <a:ext cx="0" cy="640080"/>
           </a:xfrm>
           <a:prstGeom prst="straightConnector1">
@@ -8186,7 +8186,7 @@
         </p:nvSpPr>
         <p:spPr>
           <a:xfrm>
-            <a:off x="2294613" y="6111565"/>
+            <a:off x="1646037" y="5786982"/>
             <a:ext cx="4114800" cy="1454229"/>
           </a:xfrm>
           <a:prstGeom prst="roundRect">
@@ -8238,7 +8238,7 @@
         </p:nvCxnSpPr>
         <p:spPr bwMode="auto">
           <a:xfrm>
-            <a:off x="4387138" y="7823491"/>
+            <a:off x="3738562" y="7498907"/>
             <a:ext cx="0" cy="457200"/>
           </a:xfrm>
           <a:prstGeom prst="straightConnector1">
@@ -8273,7 +8273,7 @@
         </p:nvSpPr>
         <p:spPr>
           <a:xfrm>
-            <a:off x="8267916" y="6128581"/>
+            <a:off x="8334418" y="5854262"/>
             <a:ext cx="4114800" cy="1454229"/>
           </a:xfrm>
           <a:prstGeom prst="roundRect">
@@ -8325,7 +8325,7 @@
         </p:nvSpPr>
         <p:spPr>
           <a:xfrm>
-            <a:off x="13802576" y="6208331"/>
+            <a:off x="14639118" y="5879682"/>
             <a:ext cx="4114800" cy="1454229"/>
           </a:xfrm>
           <a:prstGeom prst="roundRect">
@@ -8379,7 +8379,7 @@
         </p:nvCxnSpPr>
         <p:spPr bwMode="auto">
           <a:xfrm flipH="1">
-            <a:off x="10285951" y="5664039"/>
+            <a:off x="10352453" y="5389720"/>
             <a:ext cx="0" cy="397257"/>
           </a:xfrm>
           <a:prstGeom prst="straightConnector1">
@@ -8416,7 +8416,7 @@
         </p:nvSpPr>
         <p:spPr bwMode="auto">
           <a:xfrm>
-            <a:off x="5253841" y="2846548"/>
+            <a:off x="5320343" y="2572228"/>
             <a:ext cx="1631118" cy="1261884"/>
           </a:xfrm>
           <a:prstGeom prst="rect">
@@ -8622,7 +8622,7 @@
         </p:nvSpPr>
         <p:spPr bwMode="auto">
           <a:xfrm>
-            <a:off x="12142915" y="2618482"/>
+            <a:off x="12209418" y="2344162"/>
             <a:ext cx="1654217" cy="1554272"/>
           </a:xfrm>
           <a:prstGeom prst="rect">
@@ -8844,7 +8844,7 @@
         </p:nvSpPr>
         <p:spPr bwMode="auto">
           <a:xfrm>
-            <a:off x="16965843" y="2490090"/>
+            <a:off x="17032346" y="2215771"/>
             <a:ext cx="1866231" cy="1846659"/>
           </a:xfrm>
           <a:prstGeom prst="rect">
@@ -9066,7 +9066,7 @@
         </p:nvSpPr>
         <p:spPr bwMode="auto">
           <a:xfrm>
-            <a:off x="477975" y="2488845"/>
+            <a:off x="544477" y="2214526"/>
             <a:ext cx="1955326" cy="1846659"/>
           </a:xfrm>
           <a:prstGeom prst="rect">
@@ -9288,7 +9288,7 @@
         </p:nvSpPr>
         <p:spPr bwMode="auto">
           <a:xfrm>
-            <a:off x="14537810" y="2668408"/>
+            <a:off x="14604312" y="2394088"/>
             <a:ext cx="1715890" cy="1554272"/>
           </a:xfrm>
           <a:prstGeom prst="rect">
@@ -9510,7 +9510,7 @@
         </p:nvSpPr>
         <p:spPr bwMode="auto">
           <a:xfrm>
-            <a:off x="9486094" y="2405789"/>
+            <a:off x="9552596" y="2131470"/>
             <a:ext cx="2062876" cy="1846659"/>
           </a:xfrm>
           <a:prstGeom prst="rect">
@@ -9732,7 +9732,7 @@
         </p:nvSpPr>
         <p:spPr bwMode="auto">
           <a:xfrm>
-            <a:off x="7320992" y="2615889"/>
+            <a:off x="7387495" y="2341569"/>
             <a:ext cx="1619979" cy="1554272"/>
           </a:xfrm>
           <a:prstGeom prst="rect">
@@ -9938,7 +9938,7 @@
         </p:nvSpPr>
         <p:spPr bwMode="auto">
           <a:xfrm>
-            <a:off x="2699453" y="2669010"/>
+            <a:off x="2765955" y="2394690"/>
             <a:ext cx="2536062" cy="1554272"/>
           </a:xfrm>
           <a:prstGeom prst="rect">
@@ -10160,7 +10160,7 @@
         </p:nvCxnSpPr>
         <p:spPr bwMode="auto">
           <a:xfrm>
-            <a:off x="2488021" y="3410867"/>
+            <a:off x="2554524" y="3136547"/>
             <a:ext cx="636491" cy="0"/>
           </a:xfrm>
           <a:prstGeom prst="straightConnector1">
@@ -10197,7 +10197,7 @@
         </p:nvCxnSpPr>
         <p:spPr bwMode="auto">
           <a:xfrm>
-            <a:off x="4893054" y="3410867"/>
+            <a:off x="4959557" y="3136547"/>
             <a:ext cx="636491" cy="0"/>
           </a:xfrm>
           <a:prstGeom prst="straightConnector1">
@@ -10234,7 +10234,7 @@
         </p:nvCxnSpPr>
         <p:spPr bwMode="auto">
           <a:xfrm>
-            <a:off x="6639475" y="3410867"/>
+            <a:off x="6705978" y="3136547"/>
             <a:ext cx="636491" cy="0"/>
           </a:xfrm>
           <a:prstGeom prst="straightConnector1">
@@ -10271,7 +10271,7 @@
         </p:nvCxnSpPr>
         <p:spPr bwMode="auto">
           <a:xfrm>
-            <a:off x="8993604" y="3410867"/>
+            <a:off x="9060107" y="3136547"/>
             <a:ext cx="636491" cy="0"/>
           </a:xfrm>
           <a:prstGeom prst="straightConnector1">
@@ -10308,7 +10308,7 @@
         </p:nvCxnSpPr>
         <p:spPr bwMode="auto">
           <a:xfrm>
-            <a:off x="11459637" y="3410867"/>
+            <a:off x="11526140" y="3136547"/>
             <a:ext cx="636491" cy="0"/>
           </a:xfrm>
           <a:prstGeom prst="straightConnector1">
@@ -10345,7 +10345,7 @@
         </p:nvCxnSpPr>
         <p:spPr bwMode="auto">
           <a:xfrm>
-            <a:off x="13878438" y="3410867"/>
+            <a:off x="13944941" y="3136547"/>
             <a:ext cx="636491" cy="0"/>
           </a:xfrm>
           <a:prstGeom prst="straightConnector1">
@@ -10382,7 +10382,7 @@
         </p:nvCxnSpPr>
         <p:spPr bwMode="auto">
           <a:xfrm>
-            <a:off x="16332674" y="3410867"/>
+            <a:off x="16399177" y="3136547"/>
             <a:ext cx="636491" cy="0"/>
           </a:xfrm>
           <a:prstGeom prst="straightConnector1">
@@ -10417,7 +10417,7 @@
         </p:nvSpPr>
         <p:spPr>
           <a:xfrm>
-            <a:off x="1720479" y="11450150"/>
+            <a:off x="982204" y="12242615"/>
             <a:ext cx="1925207" cy="646331"/>
           </a:xfrm>
           <a:prstGeom prst="rect">
@@ -10460,7 +10460,7 @@
         </p:nvSpPr>
         <p:spPr>
           <a:xfrm>
-            <a:off x="4416621" y="12776335"/>
+            <a:off x="3678345" y="13568799"/>
             <a:ext cx="1538626" cy="369332"/>
           </a:xfrm>
           <a:prstGeom prst="rect">
@@ -10495,7 +10495,7 @@
         </p:nvSpPr>
         <p:spPr>
           <a:xfrm flipH="1">
-            <a:off x="4368516" y="11172509"/>
+            <a:off x="3630241" y="11964973"/>
             <a:ext cx="199099" cy="436374"/>
           </a:xfrm>
           <a:prstGeom prst="upArrow">
@@ -10544,7 +10544,7 @@
         </p:nvSpPr>
         <p:spPr>
           <a:xfrm>
-            <a:off x="4362911" y="11619042"/>
+            <a:off x="3624635" y="12411507"/>
             <a:ext cx="199098" cy="183303"/>
           </a:xfrm>
           <a:prstGeom prst="ellipse">
@@ -10598,7 +10598,7 @@
         </p:nvSpPr>
         <p:spPr>
           <a:xfrm rot="10800000" flipH="1">
-            <a:off x="4356390" y="11816689"/>
+            <a:off x="3618115" y="12609153"/>
             <a:ext cx="199099" cy="436374"/>
           </a:xfrm>
           <a:prstGeom prst="upArrow">
@@ -10653,7 +10653,7 @@
         </p:nvCxnSpPr>
         <p:spPr bwMode="auto">
           <a:xfrm>
-            <a:off x="3802021" y="12534998"/>
+            <a:off x="3063746" y="13327462"/>
             <a:ext cx="2397301" cy="0"/>
           </a:xfrm>
           <a:prstGeom prst="line">
@@ -10690,7 +10690,7 @@
         </p:nvCxnSpPr>
         <p:spPr bwMode="auto">
           <a:xfrm flipV="1">
-            <a:off x="3802021" y="11131766"/>
+            <a:off x="3063745" y="11924231"/>
             <a:ext cx="0" cy="1423077"/>
           </a:xfrm>
           <a:prstGeom prst="line">
@@ -10725,7 +10725,7 @@
         </p:nvSpPr>
         <p:spPr>
           <a:xfrm>
-            <a:off x="4554012" y="10956848"/>
+            <a:off x="3815737" y="11749312"/>
             <a:ext cx="1144865" cy="369332"/>
           </a:xfrm>
           <a:prstGeom prst="rect">
@@ -10740,15 +10740,15 @@
           <a:lstStyle/>
           <a:p>
             <a:r>
-              <a:rPr lang="el-GR" altLang="en-US" sz="1800" b="1" kern="0" dirty="0"/>
+              <a:rPr lang="el-GR" altLang="en-US" b="1" kern="0" dirty="0"/>
               <a:t>Β</a:t>
             </a:r>
             <a:r>
-              <a:rPr lang="en-US" altLang="en-US" sz="1800" b="1" kern="0" baseline="-25000" dirty="0" err="1"/>
+              <a:rPr lang="en-US" altLang="en-US" b="1" kern="0" baseline="-25000" dirty="0" err="1"/>
               <a:t>race,k_body</a:t>
             </a:r>
             <a:r>
-              <a:rPr lang="en-US" altLang="en-US" sz="1800" b="1" kern="0" baseline="-25000" dirty="0"/>
+              <a:rPr lang="en-US" altLang="en-US" b="1" kern="0" baseline="-25000" dirty="0"/>
               <a:t>-</a:t>
             </a:r>
             <a:endParaRPr lang="en-US" dirty="0"/>
@@ -10769,7 +10769,7 @@
         </p:nvSpPr>
         <p:spPr>
           <a:xfrm>
-            <a:off x="4553723" y="11965104"/>
+            <a:off x="3815447" y="12757568"/>
             <a:ext cx="1175322" cy="369332"/>
           </a:xfrm>
           <a:prstGeom prst="rect">
@@ -10784,16 +10784,12 @@
           <a:lstStyle/>
           <a:p>
             <a:r>
-              <a:rPr lang="el-GR" altLang="en-US" sz="1800" b="1" kern="0" dirty="0"/>
+              <a:rPr lang="el-GR" altLang="en-US" b="1" kern="0" dirty="0"/>
               <a:t>Β</a:t>
             </a:r>
             <a:r>
               <a:rPr lang="en-US" altLang="en-US" b="1" kern="0" baseline="-25000" dirty="0" err="1"/>
-              <a:t>race,k_</a:t>
-            </a:r>
-            <a:r>
-              <a:rPr lang="en-US" altLang="en-US" sz="1800" b="1" kern="0" baseline="-25000" dirty="0" err="1"/>
-              <a:t>body</a:t>
+              <a:t>race,k_body</a:t>
             </a:r>
             <a:r>
               <a:rPr lang="en-US" altLang="en-US" b="1" kern="0" baseline="-25000" dirty="0"/>
@@ -10817,7 +10813,7 @@
         </p:nvSpPr>
         <p:spPr>
           <a:xfrm>
-            <a:off x="4565696" y="11494631"/>
+            <a:off x="3827420" y="12287095"/>
             <a:ext cx="699230" cy="369332"/>
           </a:xfrm>
           <a:prstGeom prst="rect">
@@ -10832,7 +10828,7 @@
           <a:lstStyle/>
           <a:p>
             <a:r>
-              <a:rPr lang="el-GR" altLang="en-US" sz="1800" b="1" kern="0" dirty="0"/>
+              <a:rPr lang="el-GR" altLang="en-US" b="1" kern="0" dirty="0"/>
               <a:t>Β</a:t>
             </a:r>
             <a:r>
@@ -10857,7 +10853,7 @@
         </p:nvSpPr>
         <p:spPr>
           <a:xfrm>
-            <a:off x="1234263" y="8263879"/>
+            <a:off x="86927" y="7994741"/>
             <a:ext cx="442750" cy="369332"/>
           </a:xfrm>
           <a:prstGeom prst="rect">
@@ -10892,7 +10888,7 @@
         </p:nvSpPr>
         <p:spPr>
           <a:xfrm>
-            <a:off x="1232706" y="9047495"/>
+            <a:off x="85370" y="8832963"/>
             <a:ext cx="442750" cy="369332"/>
           </a:xfrm>
           <a:prstGeom prst="rect">
@@ -10927,7 +10923,7 @@
         </p:nvSpPr>
         <p:spPr>
           <a:xfrm>
-            <a:off x="5544572" y="11037431"/>
+            <a:off x="4806296" y="11829895"/>
             <a:ext cx="442750" cy="369332"/>
           </a:xfrm>
           <a:prstGeom prst="rect">
@@ -10962,7 +10958,7 @@
         </p:nvSpPr>
         <p:spPr>
           <a:xfrm>
-            <a:off x="5544572" y="12044213"/>
+            <a:off x="4806296" y="12836677"/>
             <a:ext cx="442750" cy="369332"/>
           </a:xfrm>
           <a:prstGeom prst="rect">
@@ -10997,7 +10993,7 @@
         </p:nvSpPr>
         <p:spPr>
           <a:xfrm>
-            <a:off x="5543926" y="11527951"/>
+            <a:off x="4805650" y="12320415"/>
             <a:ext cx="442750" cy="369332"/>
           </a:xfrm>
           <a:prstGeom prst="rect">
@@ -11032,7 +11028,7 @@
         </p:nvSpPr>
         <p:spPr>
           <a:xfrm>
-            <a:off x="7630904" y="8269061"/>
+            <a:off x="7697406" y="7994741"/>
             <a:ext cx="442750" cy="369332"/>
           </a:xfrm>
           <a:prstGeom prst="rect">
@@ -11048,7 +11044,7 @@
           <a:p>
             <a:r>
               <a:rPr lang="en-US" dirty="0"/>
-              <a:t>(3)</a:t>
+              <a:t>(4)</a:t>
             </a:r>
           </a:p>
         </p:txBody>
@@ -11067,7 +11063,7 @@
         </p:nvSpPr>
         <p:spPr>
           <a:xfrm>
-            <a:off x="7636708" y="9107283"/>
+            <a:off x="7703210" y="8832963"/>
             <a:ext cx="442750" cy="369332"/>
           </a:xfrm>
           <a:prstGeom prst="rect">
@@ -11083,7 +11079,7 @@
           <a:p>
             <a:r>
               <a:rPr lang="en-US" dirty="0"/>
-              <a:t>(4)</a:t>
+              <a:t>(5)</a:t>
             </a:r>
           </a:p>
         </p:txBody>
@@ -11102,7 +11098,7 @@
         </p:nvSpPr>
         <p:spPr>
           <a:xfrm>
-            <a:off x="7279349" y="11384001"/>
+            <a:off x="7256152" y="12226730"/>
             <a:ext cx="1925207" cy="646331"/>
           </a:xfrm>
           <a:prstGeom prst="rect">
@@ -11145,7 +11141,7 @@
         </p:nvSpPr>
         <p:spPr>
           <a:xfrm flipH="1">
-            <a:off x="9476814" y="11106360"/>
+            <a:off x="9453617" y="11949088"/>
             <a:ext cx="199099" cy="436374"/>
           </a:xfrm>
           <a:prstGeom prst="upArrow">
@@ -11194,7 +11190,7 @@
         </p:nvSpPr>
         <p:spPr>
           <a:xfrm>
-            <a:off x="9471209" y="11552893"/>
+            <a:off x="9448011" y="12395622"/>
             <a:ext cx="199098" cy="183303"/>
           </a:xfrm>
           <a:prstGeom prst="ellipse">
@@ -11248,7 +11244,7 @@
         </p:nvSpPr>
         <p:spPr>
           <a:xfrm rot="10800000" flipH="1">
-            <a:off x="9464688" y="11750540"/>
+            <a:off x="9441491" y="12593268"/>
             <a:ext cx="199099" cy="436374"/>
           </a:xfrm>
           <a:prstGeom prst="upArrow">
@@ -11299,7 +11295,7 @@
         </p:nvCxnSpPr>
         <p:spPr bwMode="auto">
           <a:xfrm>
-            <a:off x="9241623" y="12468849"/>
+            <a:off x="9218425" y="13311577"/>
             <a:ext cx="3320430" cy="0"/>
           </a:xfrm>
           <a:prstGeom prst="line">
@@ -11336,7 +11332,7 @@
         </p:nvCxnSpPr>
         <p:spPr bwMode="auto">
           <a:xfrm flipV="1">
-            <a:off x="9241623" y="11065617"/>
+            <a:off x="9218425" y="11908346"/>
             <a:ext cx="0" cy="1423077"/>
           </a:xfrm>
           <a:prstGeom prst="line">
@@ -11373,7 +11369,7 @@
         </p:nvCxnSpPr>
         <p:spPr bwMode="auto">
           <a:xfrm>
-            <a:off x="10285951" y="10069884"/>
+            <a:off x="10262753" y="10912612"/>
             <a:ext cx="0" cy="457200"/>
           </a:xfrm>
           <a:prstGeom prst="straightConnector1">
@@ -11408,7 +11404,7 @@
         </p:nvSpPr>
         <p:spPr>
           <a:xfrm>
-            <a:off x="10291215" y="12819294"/>
+            <a:off x="10268017" y="13662023"/>
             <a:ext cx="1253998" cy="646331"/>
           </a:xfrm>
           <a:prstGeom prst="rect">
@@ -11451,7 +11447,7 @@
         </p:nvSpPr>
         <p:spPr>
           <a:xfrm flipH="1">
-            <a:off x="11220823" y="10958471"/>
+            <a:off x="11197626" y="11801199"/>
             <a:ext cx="193465" cy="670560"/>
           </a:xfrm>
           <a:prstGeom prst="upArrow">
@@ -11500,7 +11496,7 @@
         </p:nvSpPr>
         <p:spPr>
           <a:xfrm>
-            <a:off x="11215219" y="11639190"/>
+            <a:off x="11192021" y="12481919"/>
             <a:ext cx="199098" cy="183303"/>
           </a:xfrm>
           <a:prstGeom prst="ellipse">
@@ -11554,7 +11550,7 @@
         </p:nvSpPr>
         <p:spPr>
           <a:xfrm rot="10800000" flipH="1">
-            <a:off x="11208698" y="11836837"/>
+            <a:off x="11185501" y="12679566"/>
             <a:ext cx="220963" cy="311375"/>
           </a:xfrm>
           <a:prstGeom prst="upArrow">
@@ -11603,7 +11599,7 @@
         </p:nvSpPr>
         <p:spPr>
           <a:xfrm>
-            <a:off x="9866006" y="12504858"/>
+            <a:off x="9842808" y="13347586"/>
             <a:ext cx="300082" cy="369332"/>
           </a:xfrm>
           <a:prstGeom prst="rect">
@@ -11638,7 +11634,7 @@
         </p:nvSpPr>
         <p:spPr>
           <a:xfrm>
-            <a:off x="11524602" y="12487103"/>
+            <a:off x="11501404" y="13329831"/>
             <a:ext cx="255198" cy="369332"/>
           </a:xfrm>
           <a:prstGeom prst="rect">
@@ -11673,7 +11669,7 @@
         </p:nvSpPr>
         <p:spPr>
           <a:xfrm>
-            <a:off x="9743375" y="10954127"/>
+            <a:off x="9720178" y="11796855"/>
             <a:ext cx="1144865" cy="369332"/>
           </a:xfrm>
           <a:prstGeom prst="rect">
@@ -11688,15 +11684,15 @@
           <a:lstStyle/>
           <a:p>
             <a:r>
-              <a:rPr lang="el-GR" altLang="en-US" sz="1800" b="1" kern="0" dirty="0"/>
+              <a:rPr lang="el-GR" altLang="en-US" b="1" kern="0" dirty="0"/>
               <a:t>Β</a:t>
             </a:r>
             <a:r>
-              <a:rPr lang="en-US" altLang="en-US" sz="1800" b="1" kern="0" baseline="-25000" dirty="0" err="1"/>
+              <a:rPr lang="en-US" altLang="en-US" b="1" kern="0" baseline="-25000" dirty="0" err="1"/>
               <a:t>race,k_body</a:t>
             </a:r>
             <a:r>
-              <a:rPr lang="en-US" altLang="en-US" sz="1800" b="1" kern="0" baseline="-25000" dirty="0"/>
+              <a:rPr lang="en-US" altLang="en-US" b="1" kern="0" baseline="-25000" dirty="0"/>
               <a:t>-</a:t>
             </a:r>
             <a:endParaRPr lang="en-US" dirty="0"/>
@@ -11717,7 +11713,7 @@
         </p:nvSpPr>
         <p:spPr>
           <a:xfrm>
-            <a:off x="9743086" y="11962383"/>
+            <a:off x="9719888" y="12805111"/>
             <a:ext cx="1175322" cy="369332"/>
           </a:xfrm>
           <a:prstGeom prst="rect">
@@ -11732,16 +11728,12 @@
           <a:lstStyle/>
           <a:p>
             <a:r>
-              <a:rPr lang="el-GR" altLang="en-US" sz="1800" b="1" kern="0" dirty="0"/>
+              <a:rPr lang="el-GR" altLang="en-US" b="1" kern="0" dirty="0"/>
               <a:t>Β</a:t>
             </a:r>
             <a:r>
               <a:rPr lang="en-US" altLang="en-US" b="1" kern="0" baseline="-25000" dirty="0" err="1"/>
-              <a:t>race,k_</a:t>
-            </a:r>
-            <a:r>
-              <a:rPr lang="en-US" altLang="en-US" sz="1800" b="1" kern="0" baseline="-25000" dirty="0" err="1"/>
-              <a:t>body</a:t>
+              <a:t>race,k_body</a:t>
             </a:r>
             <a:r>
               <a:rPr lang="en-US" altLang="en-US" b="1" kern="0" baseline="-25000" dirty="0"/>
@@ -11765,7 +11757,7 @@
         </p:nvSpPr>
         <p:spPr>
           <a:xfrm>
-            <a:off x="9755059" y="11491910"/>
+            <a:off x="9731861" y="12334638"/>
             <a:ext cx="699230" cy="369332"/>
           </a:xfrm>
           <a:prstGeom prst="rect">
@@ -11780,7 +11772,7 @@
           <a:lstStyle/>
           <a:p>
             <a:r>
-              <a:rPr lang="el-GR" altLang="en-US" sz="1800" b="1" kern="0" dirty="0"/>
+              <a:rPr lang="el-GR" altLang="en-US" b="1" kern="0" dirty="0"/>
               <a:t>Β</a:t>
             </a:r>
             <a:r>
@@ -11805,7 +11797,7 @@
         </p:nvSpPr>
         <p:spPr>
           <a:xfrm>
-            <a:off x="11524891" y="10984696"/>
+            <a:off x="11501694" y="11827424"/>
             <a:ext cx="1144865" cy="369332"/>
           </a:xfrm>
           <a:prstGeom prst="rect">
@@ -11820,15 +11812,15 @@
           <a:lstStyle/>
           <a:p>
             <a:r>
-              <a:rPr lang="el-GR" altLang="en-US" sz="1800" b="1" kern="0" dirty="0"/>
+              <a:rPr lang="el-GR" altLang="en-US" b="1" kern="0" dirty="0"/>
               <a:t>Β</a:t>
             </a:r>
             <a:r>
-              <a:rPr lang="en-US" altLang="en-US" sz="1800" b="1" kern="0" baseline="-25000" dirty="0" err="1"/>
+              <a:rPr lang="en-US" altLang="en-US" b="1" kern="0" baseline="-25000" dirty="0" err="1"/>
               <a:t>race,k_body</a:t>
             </a:r>
             <a:r>
-              <a:rPr lang="en-US" altLang="en-US" sz="1800" b="1" kern="0" baseline="-25000" dirty="0"/>
+              <a:rPr lang="en-US" altLang="en-US" b="1" kern="0" baseline="-25000" dirty="0"/>
               <a:t>-</a:t>
             </a:r>
             <a:endParaRPr lang="en-US" dirty="0"/>
@@ -11849,7 +11841,7 @@
         </p:nvSpPr>
         <p:spPr>
           <a:xfrm>
-            <a:off x="11524602" y="11992952"/>
+            <a:off x="11501404" y="12835680"/>
             <a:ext cx="1175322" cy="369332"/>
           </a:xfrm>
           <a:prstGeom prst="rect">
@@ -11864,16 +11856,12 @@
           <a:lstStyle/>
           <a:p>
             <a:r>
-              <a:rPr lang="el-GR" altLang="en-US" sz="1800" b="1" kern="0" dirty="0"/>
+              <a:rPr lang="el-GR" altLang="en-US" b="1" kern="0" dirty="0"/>
               <a:t>Β</a:t>
             </a:r>
             <a:r>
               <a:rPr lang="en-US" altLang="en-US" b="1" kern="0" baseline="-25000" dirty="0" err="1"/>
-              <a:t>race,k_</a:t>
-            </a:r>
-            <a:r>
-              <a:rPr lang="en-US" altLang="en-US" sz="1800" b="1" kern="0" baseline="-25000" dirty="0" err="1"/>
-              <a:t>body</a:t>
+              <a:t>race,k_body</a:t>
             </a:r>
             <a:r>
               <a:rPr lang="en-US" altLang="en-US" b="1" kern="0" baseline="-25000" dirty="0"/>
@@ -11897,7 +11885,7 @@
         </p:nvSpPr>
         <p:spPr>
           <a:xfrm>
-            <a:off x="11536575" y="11522479"/>
+            <a:off x="11513377" y="12365207"/>
             <a:ext cx="699230" cy="369332"/>
           </a:xfrm>
           <a:prstGeom prst="rect">
@@ -11912,7 +11900,7 @@
           <a:lstStyle/>
           <a:p>
             <a:r>
-              <a:rPr lang="el-GR" altLang="en-US" sz="1800" b="1" kern="0" dirty="0"/>
+              <a:rPr lang="el-GR" altLang="en-US" b="1" kern="0" dirty="0"/>
               <a:t>Β</a:t>
             </a:r>
             <a:r>
@@ -11937,7 +11925,7 @@
         </p:nvSpPr>
         <p:spPr>
           <a:xfrm>
-            <a:off x="12515133" y="11569467"/>
+            <a:off x="12491935" y="12412195"/>
             <a:ext cx="442750" cy="369332"/>
           </a:xfrm>
           <a:prstGeom prst="rect">
@@ -11972,7 +11960,7 @@
         </p:nvSpPr>
         <p:spPr>
           <a:xfrm>
-            <a:off x="12523632" y="12002249"/>
+            <a:off x="12500434" y="12844977"/>
             <a:ext cx="442750" cy="369332"/>
           </a:xfrm>
           <a:prstGeom prst="rect">
@@ -12007,7 +11995,7 @@
         </p:nvSpPr>
         <p:spPr>
           <a:xfrm>
-            <a:off x="12510598" y="11025932"/>
+            <a:off x="12487400" y="11868660"/>
             <a:ext cx="442750" cy="369332"/>
           </a:xfrm>
           <a:prstGeom prst="rect">
@@ -12042,7 +12030,7 @@
         </p:nvSpPr>
         <p:spPr>
           <a:xfrm>
-            <a:off x="10726049" y="11025932"/>
+            <a:off x="10702851" y="11868660"/>
             <a:ext cx="442750" cy="369332"/>
           </a:xfrm>
           <a:prstGeom prst="rect">
@@ -12077,7 +12065,7 @@
         </p:nvSpPr>
         <p:spPr>
           <a:xfrm>
-            <a:off x="10718410" y="12002249"/>
+            <a:off x="10695212" y="12844977"/>
             <a:ext cx="442750" cy="369332"/>
           </a:xfrm>
           <a:prstGeom prst="rect">
@@ -12112,7 +12100,7 @@
         </p:nvSpPr>
         <p:spPr>
           <a:xfrm>
-            <a:off x="10718410" y="11530060"/>
+            <a:off x="10695212" y="12372788"/>
             <a:ext cx="442750" cy="369332"/>
           </a:xfrm>
           <a:prstGeom prst="rect">
@@ -12147,8 +12135,8 @@
         </p:nvSpPr>
         <p:spPr>
           <a:xfrm>
-            <a:off x="13650070" y="11597406"/>
-            <a:ext cx="633507" cy="369332"/>
+            <a:off x="14057975" y="12703970"/>
+            <a:ext cx="958917" cy="369332"/>
           </a:xfrm>
           <a:prstGeom prst="rect">
             <a:avLst/>
@@ -12163,7 +12151,7 @@
           <a:p>
             <a:r>
               <a:rPr lang="en-US" dirty="0"/>
-              <a:t>Race</a:t>
+              <a:t>Race = k</a:t>
             </a:r>
           </a:p>
         </p:txBody>
@@ -12184,7 +12172,7 @@
         </p:nvCxnSpPr>
         <p:spPr bwMode="auto">
           <a:xfrm>
-            <a:off x="14321731" y="12457698"/>
+            <a:off x="15068573" y="13246096"/>
             <a:ext cx="3320430" cy="0"/>
           </a:xfrm>
           <a:prstGeom prst="line">
@@ -12221,7 +12209,7 @@
         </p:nvCxnSpPr>
         <p:spPr bwMode="auto">
           <a:xfrm flipV="1">
-            <a:off x="14321731" y="11060533"/>
+            <a:off x="15068573" y="11848932"/>
             <a:ext cx="0" cy="1423077"/>
           </a:xfrm>
           <a:prstGeom prst="line">
@@ -12256,7 +12244,7 @@
         </p:nvSpPr>
         <p:spPr>
           <a:xfrm>
-            <a:off x="14372161" y="12774936"/>
+            <a:off x="15119004" y="13563334"/>
             <a:ext cx="3099503" cy="369332"/>
           </a:xfrm>
           <a:prstGeom prst="rect">
@@ -12297,7 +12285,7 @@
         </p:nvCxnSpPr>
         <p:spPr>
           <a:xfrm>
-            <a:off x="15042955" y="11780464"/>
+            <a:off x="15747755" y="12239102"/>
             <a:ext cx="1922888" cy="0"/>
           </a:xfrm>
           <a:prstGeom prst="line">
@@ -12338,7 +12326,7 @@
         </p:nvSpPr>
         <p:spPr>
           <a:xfrm>
-            <a:off x="14662329" y="11825159"/>
+            <a:off x="15367129" y="12219242"/>
             <a:ext cx="442750" cy="369332"/>
           </a:xfrm>
           <a:prstGeom prst="rect">
@@ -12373,7 +12361,7 @@
         </p:nvSpPr>
         <p:spPr>
           <a:xfrm>
-            <a:off x="16917913" y="11825159"/>
+            <a:off x="17622713" y="12200672"/>
             <a:ext cx="442750" cy="369332"/>
           </a:xfrm>
           <a:prstGeom prst="rect">
@@ -12389,7 +12377,7 @@
           <a:p>
             <a:r>
               <a:rPr lang="en-US" dirty="0"/>
-              <a:t>(4)</a:t>
+              <a:t>(5)</a:t>
             </a:r>
           </a:p>
         </p:txBody>
@@ -12410,8 +12398,8 @@
         </p:nvCxnSpPr>
         <p:spPr>
           <a:xfrm flipV="1">
-            <a:off x="15185798" y="12034943"/>
-            <a:ext cx="1712355" cy="2721"/>
+            <a:off x="15790848" y="12410457"/>
+            <a:ext cx="1828800" cy="2721"/>
           </a:xfrm>
           <a:prstGeom prst="line">
             <a:avLst/>
@@ -12451,7 +12439,7 @@
         </p:nvSpPr>
         <p:spPr>
           <a:xfrm>
-            <a:off x="14662329" y="11486572"/>
+            <a:off x="15367129" y="11945210"/>
             <a:ext cx="442750" cy="369332"/>
           </a:xfrm>
           <a:prstGeom prst="rect">
@@ -12486,7 +12474,7 @@
         </p:nvSpPr>
         <p:spPr>
           <a:xfrm>
-            <a:off x="16917913" y="11486572"/>
+            <a:off x="17622713" y="11945210"/>
             <a:ext cx="442750" cy="369332"/>
           </a:xfrm>
           <a:prstGeom prst="rect">
@@ -12502,7 +12490,1340 @@
           <a:p>
             <a:r>
               <a:rPr lang="en-US" dirty="0"/>
+              <a:t>(4)</a:t>
+            </a:r>
+          </a:p>
+        </p:txBody>
+      </p:sp>
+      <p:graphicFrame>
+        <p:nvGraphicFramePr>
+          <p:cNvPr id="15" name="Table 14">
+            <a:extLst>
+              <a:ext uri="{FF2B5EF4-FFF2-40B4-BE49-F238E27FC236}">
+                <a16:creationId xmlns:a16="http://schemas.microsoft.com/office/drawing/2014/main" id="{3AE89C9D-4637-4E42-44AE-10791F66F4C0}"/>
+              </a:ext>
+            </a:extLst>
+          </p:cNvPr>
+          <p:cNvGraphicFramePr>
+            <a:graphicFrameLocks noGrp="1"/>
+          </p:cNvGraphicFramePr>
+          <p:nvPr>
+            <p:extLst>
+              <p:ext uri="{D42A27DB-BD31-4B8C-83A1-F6EECF244321}">
+                <p14:modId xmlns:p14="http://schemas.microsoft.com/office/powerpoint/2010/main" val="3237258231"/>
+              </p:ext>
+            </p:extLst>
+          </p:nvPr>
+        </p:nvGraphicFramePr>
+        <p:xfrm>
+          <a:off x="480830" y="9662366"/>
+          <a:ext cx="6576394" cy="670560"/>
+        </p:xfrm>
+        <a:graphic>
+          <a:graphicData uri="http://schemas.openxmlformats.org/drawingml/2006/table">
+            <a:tbl>
+              <a:tblPr firstRow="1" bandRow="1">
+                <a:tableStyleId>{5C22544A-7EE6-4342-B048-85BDC9FD1C3A}</a:tableStyleId>
+              </a:tblPr>
+              <a:tblGrid>
+                <a:gridCol w="2501771">
+                  <a:extLst>
+                    <a:ext uri="{9D8B030D-6E8A-4147-A177-3AD203B41FA5}">
+                      <a16:colId xmlns:a16="http://schemas.microsoft.com/office/drawing/2014/main" val="228771411"/>
+                    </a:ext>
+                  </a:extLst>
+                </a:gridCol>
+                <a:gridCol w="426145">
+                  <a:extLst>
+                    <a:ext uri="{9D8B030D-6E8A-4147-A177-3AD203B41FA5}">
+                      <a16:colId xmlns:a16="http://schemas.microsoft.com/office/drawing/2014/main" val="2948560317"/>
+                    </a:ext>
+                  </a:extLst>
+                </a:gridCol>
+                <a:gridCol w="3648478">
+                  <a:extLst>
+                    <a:ext uri="{9D8B030D-6E8A-4147-A177-3AD203B41FA5}">
+                      <a16:colId xmlns:a16="http://schemas.microsoft.com/office/drawing/2014/main" val="1248625941"/>
+                    </a:ext>
+                  </a:extLst>
+                </a:gridCol>
+              </a:tblGrid>
+              <a:tr h="235756">
+                <a:tc>
+                  <a:txBody>
+                    <a:bodyPr/>
+                    <a:lstStyle/>
+                    <a:p>
+                      <a:pPr algn="r"/>
+                      <a:r>
+                        <a:rPr kumimoji="0" lang="en-US" altLang="en-US" sz="1900" b="0" i="0" u="none" strike="noStrike" kern="0" cap="none" spc="0" normalizeH="0" baseline="0" noProof="0" dirty="0">
+                          <a:ln>
+                            <a:noFill/>
+                          </a:ln>
+                          <a:solidFill>
+                            <a:srgbClr val="C00000"/>
+                          </a:solidFill>
+                          <a:effectLst/>
+                          <a:uLnTx/>
+                          <a:uFillTx/>
+                          <a:latin typeface="Arial" panose="020B0604020202020204" pitchFamily="34" charset="0"/>
+                        </a:rPr>
+                        <a:t>log10(X</a:t>
+                      </a:r>
+                      <a:r>
+                        <a:rPr kumimoji="0" lang="en-US" altLang="en-US" sz="1900" b="0" i="0" u="none" strike="noStrike" kern="0" cap="none" spc="0" normalizeH="0" baseline="-25000" noProof="0" dirty="0">
+                          <a:ln>
+                            <a:noFill/>
+                          </a:ln>
+                          <a:solidFill>
+                            <a:srgbClr val="C00000"/>
+                          </a:solidFill>
+                          <a:effectLst/>
+                          <a:uLnTx/>
+                          <a:uFillTx/>
+                          <a:latin typeface="Arial" panose="020B0604020202020204" pitchFamily="34" charset="0"/>
+                        </a:rPr>
+                        <a:t>BP3</a:t>
+                      </a:r>
+                      <a:r>
+                        <a:rPr kumimoji="0" lang="en-US" altLang="en-US" sz="1900" b="0" i="0" u="none" strike="noStrike" kern="0" cap="none" spc="0" normalizeH="0" baseline="0" noProof="0" dirty="0">
+                          <a:ln>
+                            <a:noFill/>
+                          </a:ln>
+                          <a:solidFill>
+                            <a:srgbClr val="C00000"/>
+                          </a:solidFill>
+                          <a:effectLst/>
+                          <a:uLnTx/>
+                          <a:uFillTx/>
+                          <a:latin typeface="Arial" panose="020B0604020202020204" pitchFamily="34" charset="0"/>
+                        </a:rPr>
+                        <a:t>[race = k]) </a:t>
+                      </a:r>
+                      <a:endParaRPr lang="en-US" sz="1900" dirty="0">
+                        <a:solidFill>
+                          <a:srgbClr val="C00000"/>
+                        </a:solidFill>
+                      </a:endParaRPr>
+                    </a:p>
+                  </a:txBody>
+                  <a:tcPr>
+                    <a:lnL w="12700" cap="flat" cmpd="sng" algn="ctr">
+                      <a:noFill/>
+                      <a:prstDash val="solid"/>
+                      <a:round/>
+                      <a:headEnd type="none" w="med" len="med"/>
+                      <a:tailEnd type="none" w="med" len="med"/>
+                    </a:lnL>
+                    <a:lnR w="12700" cap="flat" cmpd="sng" algn="ctr">
+                      <a:noFill/>
+                      <a:prstDash val="solid"/>
+                      <a:round/>
+                      <a:headEnd type="none" w="med" len="med"/>
+                      <a:tailEnd type="none" w="med" len="med"/>
+                    </a:lnR>
+                    <a:lnT w="12700" cap="flat" cmpd="sng" algn="ctr">
+                      <a:noFill/>
+                      <a:prstDash val="solid"/>
+                      <a:round/>
+                      <a:headEnd type="none" w="med" len="med"/>
+                      <a:tailEnd type="none" w="med" len="med"/>
+                    </a:lnT>
+                    <a:lnB w="12700" cap="flat" cmpd="sng" algn="ctr">
+                      <a:noFill/>
+                      <a:prstDash val="solid"/>
+                      <a:round/>
+                      <a:headEnd type="none" w="med" len="med"/>
+                      <a:tailEnd type="none" w="med" len="med"/>
+                    </a:lnB>
+                    <a:lnTlToBr w="12700" cmpd="sng">
+                      <a:noFill/>
+                      <a:prstDash val="solid"/>
+                    </a:lnTlToBr>
+                    <a:lnBlToTr w="12700" cmpd="sng">
+                      <a:noFill/>
+                      <a:prstDash val="solid"/>
+                    </a:lnBlToTr>
+                    <a:noFill/>
+                  </a:tcPr>
+                </a:tc>
+                <a:tc>
+                  <a:txBody>
+                    <a:bodyPr/>
+                    <a:lstStyle/>
+                    <a:p>
+                      <a:pPr algn="l"/>
+                      <a:r>
+                        <a:rPr kumimoji="0" lang="en-US" altLang="en-US" sz="1900" b="0" i="0" u="none" strike="noStrike" kern="0" cap="none" spc="0" normalizeH="0" baseline="0" noProof="0" dirty="0">
+                          <a:ln>
+                            <a:noFill/>
+                          </a:ln>
+                          <a:solidFill>
+                            <a:srgbClr val="C00000"/>
+                          </a:solidFill>
+                          <a:effectLst/>
+                          <a:uLnTx/>
+                          <a:uFillTx/>
+                          <a:latin typeface="Arial" panose="020B0604020202020204" pitchFamily="34" charset="0"/>
+                        </a:rPr>
+                        <a:t>=</a:t>
+                      </a:r>
+                      <a:endParaRPr lang="en-US" sz="1900" dirty="0">
+                        <a:solidFill>
+                          <a:srgbClr val="C00000"/>
+                        </a:solidFill>
+                      </a:endParaRPr>
+                    </a:p>
+                  </a:txBody>
+                  <a:tcPr>
+                    <a:lnL w="12700" cap="flat" cmpd="sng" algn="ctr">
+                      <a:noFill/>
+                      <a:prstDash val="solid"/>
+                      <a:round/>
+                      <a:headEnd type="none" w="med" len="med"/>
+                      <a:tailEnd type="none" w="med" len="med"/>
+                    </a:lnL>
+                    <a:lnR w="12700" cap="flat" cmpd="sng" algn="ctr">
+                      <a:noFill/>
+                      <a:prstDash val="solid"/>
+                      <a:round/>
+                      <a:headEnd type="none" w="med" len="med"/>
+                      <a:tailEnd type="none" w="med" len="med"/>
+                    </a:lnR>
+                    <a:lnT w="12700" cap="flat" cmpd="sng" algn="ctr">
+                      <a:noFill/>
+                      <a:prstDash val="solid"/>
+                      <a:round/>
+                      <a:headEnd type="none" w="med" len="med"/>
+                      <a:tailEnd type="none" w="med" len="med"/>
+                    </a:lnT>
+                    <a:lnB w="12700" cap="flat" cmpd="sng" algn="ctr">
+                      <a:noFill/>
+                      <a:prstDash val="solid"/>
+                      <a:round/>
+                      <a:headEnd type="none" w="med" len="med"/>
+                      <a:tailEnd type="none" w="med" len="med"/>
+                    </a:lnB>
+                    <a:lnTlToBr w="12700" cmpd="sng">
+                      <a:noFill/>
+                      <a:prstDash val="solid"/>
+                    </a:lnTlToBr>
+                    <a:lnBlToTr w="12700" cmpd="sng">
+                      <a:noFill/>
+                      <a:prstDash val="solid"/>
+                    </a:lnBlToTr>
+                    <a:noFill/>
+                  </a:tcPr>
+                </a:tc>
+                <a:tc>
+                  <a:txBody>
+                    <a:bodyPr/>
+                    <a:lstStyle/>
+                    <a:p>
+                      <a:pPr marL="0" marR="0" lvl="0" indent="0" defTabSz="3298825" eaLnBrk="0" fontAlgn="base" latinLnBrk="0" hangingPunct="0">
+                        <a:lnSpc>
+                          <a:spcPct val="100000"/>
+                        </a:lnSpc>
+                        <a:spcBef>
+                          <a:spcPct val="0"/>
+                        </a:spcBef>
+                        <a:spcAft>
+                          <a:spcPct val="0"/>
+                        </a:spcAft>
+                        <a:buClrTx/>
+                        <a:buSzTx/>
+                        <a:buFontTx/>
+                        <a:buNone/>
+                        <a:tabLst/>
+                        <a:defRPr/>
+                      </a:pPr>
+                      <a:r>
+                        <a:rPr kumimoji="0" lang="en-US" altLang="en-US" sz="1900" b="1" i="0" u="none" strike="noStrike" kern="0" cap="none" spc="0" normalizeH="0" baseline="0" noProof="0" dirty="0">
+                          <a:ln>
+                            <a:noFill/>
+                          </a:ln>
+                          <a:solidFill>
+                            <a:srgbClr val="C00000"/>
+                          </a:solidFill>
+                          <a:effectLst/>
+                          <a:uLnTx/>
+                          <a:uFillTx/>
+                          <a:latin typeface="Arial" panose="020B0604020202020204" pitchFamily="34" charset="0"/>
+                        </a:rPr>
+                        <a:t>β</a:t>
+                      </a:r>
+                      <a:r>
+                        <a:rPr kumimoji="0" lang="en-US" altLang="en-US" sz="2100" b="1" i="0" u="none" strike="noStrike" kern="0" cap="none" spc="0" normalizeH="0" baseline="-25000" noProof="0" dirty="0" err="1">
+                          <a:ln>
+                            <a:noFill/>
+                          </a:ln>
+                          <a:solidFill>
+                            <a:srgbClr val="C00000"/>
+                          </a:solidFill>
+                          <a:effectLst/>
+                          <a:uLnTx/>
+                          <a:uFillTx/>
+                          <a:latin typeface="Arial" panose="020B0604020202020204" pitchFamily="34" charset="0"/>
+                        </a:rPr>
+                        <a:t>body,k</a:t>
+                      </a:r>
+                      <a:r>
+                        <a:rPr kumimoji="0" lang="en-US" altLang="en-US" sz="1900" b="0" i="0" u="none" strike="noStrike" kern="0" cap="none" spc="0" normalizeH="0" baseline="0" noProof="0" dirty="0">
+                          <a:ln>
+                            <a:noFill/>
+                          </a:ln>
+                          <a:solidFill>
+                            <a:srgbClr val="C00000"/>
+                          </a:solidFill>
+                          <a:effectLst/>
+                          <a:uLnTx/>
+                          <a:uFillTx/>
+                          <a:latin typeface="Arial" panose="020B0604020202020204" pitchFamily="34" charset="0"/>
+                        </a:rPr>
+                        <a:t>+ β</a:t>
+                      </a:r>
+                      <a:r>
+                        <a:rPr kumimoji="0" lang="en-US" altLang="en-US" sz="1900" b="0" i="0" u="none" strike="noStrike" kern="0" cap="none" spc="0" normalizeH="0" baseline="-25000" noProof="0" dirty="0">
+                          <a:ln>
+                            <a:noFill/>
+                          </a:ln>
+                          <a:solidFill>
+                            <a:srgbClr val="C00000"/>
+                          </a:solidFill>
+                          <a:effectLst/>
+                          <a:uLnTx/>
+                          <a:uFillTx/>
+                          <a:latin typeface="Arial" panose="020B0604020202020204" pitchFamily="34" charset="0"/>
+                        </a:rPr>
+                        <a:t>Age</a:t>
+                      </a:r>
+                      <a:r>
+                        <a:rPr kumimoji="0" lang="en-US" altLang="en-US" sz="1900" b="0" i="0" u="none" strike="noStrike" kern="0" cap="none" spc="0" normalizeH="0" baseline="0" noProof="0" dirty="0">
+                          <a:ln>
+                            <a:noFill/>
+                          </a:ln>
+                          <a:solidFill>
+                            <a:srgbClr val="C00000"/>
+                          </a:solidFill>
+                          <a:effectLst/>
+                          <a:uLnTx/>
+                          <a:uFillTx/>
+                          <a:latin typeface="Arial" panose="020B0604020202020204" pitchFamily="34" charset="0"/>
+                        </a:rPr>
+                        <a:t>+ β</a:t>
+                      </a:r>
+                      <a:r>
+                        <a:rPr kumimoji="0" lang="en-US" altLang="en-US" sz="1900" b="0" i="0" u="none" strike="noStrike" kern="0" cap="none" spc="0" normalizeH="0" baseline="-25000" noProof="0" dirty="0">
+                          <a:ln>
+                            <a:noFill/>
+                          </a:ln>
+                          <a:solidFill>
+                            <a:srgbClr val="C00000"/>
+                          </a:solidFill>
+                          <a:effectLst/>
+                          <a:uLnTx/>
+                          <a:uFillTx/>
+                          <a:latin typeface="Arial" panose="020B0604020202020204" pitchFamily="34" charset="0"/>
+                        </a:rPr>
+                        <a:t>cycle</a:t>
+                      </a:r>
+                      <a:r>
+                        <a:rPr kumimoji="0" lang="en-US" altLang="en-US" sz="1900" b="0" i="0" u="none" strike="noStrike" kern="0" cap="none" spc="0" normalizeH="0" baseline="0" noProof="0" dirty="0">
+                          <a:ln>
+                            <a:noFill/>
+                          </a:ln>
+                          <a:solidFill>
+                            <a:srgbClr val="C00000"/>
+                          </a:solidFill>
+                          <a:effectLst/>
+                          <a:uLnTx/>
+                          <a:uFillTx/>
+                          <a:latin typeface="Arial" panose="020B0604020202020204" pitchFamily="34" charset="0"/>
+                        </a:rPr>
+                        <a:t>+ β</a:t>
+                      </a:r>
+                      <a:r>
+                        <a:rPr kumimoji="0" lang="en-US" altLang="en-US" sz="1900" b="0" i="0" u="none" strike="noStrike" kern="0" cap="none" spc="0" normalizeH="0" baseline="-25000" noProof="0" dirty="0">
+                          <a:ln>
+                            <a:noFill/>
+                          </a:ln>
+                          <a:solidFill>
+                            <a:srgbClr val="C00000"/>
+                          </a:solidFill>
+                          <a:effectLst/>
+                          <a:uLnTx/>
+                          <a:uFillTx/>
+                          <a:latin typeface="Arial" panose="020B0604020202020204" pitchFamily="34" charset="0"/>
+                        </a:rPr>
+                        <a:t>BMI</a:t>
+                      </a:r>
+                    </a:p>
+                    <a:p>
+                      <a:pPr marL="0" marR="0" lvl="0" indent="0" defTabSz="3298825" eaLnBrk="0" fontAlgn="base" latinLnBrk="0" hangingPunct="0">
+                        <a:lnSpc>
+                          <a:spcPct val="100000"/>
+                        </a:lnSpc>
+                        <a:spcBef>
+                          <a:spcPct val="0"/>
+                        </a:spcBef>
+                        <a:spcAft>
+                          <a:spcPct val="0"/>
+                        </a:spcAft>
+                        <a:buClrTx/>
+                        <a:buSzTx/>
+                        <a:buFontTx/>
+                        <a:buNone/>
+                        <a:tabLst/>
+                        <a:defRPr/>
+                      </a:pPr>
+                      <a:r>
+                        <a:rPr kumimoji="0" lang="en-US" altLang="en-US" sz="1900" b="0" i="0" u="none" strike="noStrike" kern="0" cap="none" spc="0" normalizeH="0" baseline="0" noProof="0" dirty="0">
+                          <a:ln>
+                            <a:noFill/>
+                          </a:ln>
+                          <a:solidFill>
+                            <a:srgbClr val="C00000"/>
+                          </a:solidFill>
+                          <a:effectLst/>
+                          <a:uLnTx/>
+                          <a:uFillTx/>
+                          <a:latin typeface="Arial" panose="020B0604020202020204" pitchFamily="34" charset="0"/>
+                        </a:rPr>
+                        <a:t>+ β</a:t>
+                      </a:r>
+                      <a:r>
+                        <a:rPr kumimoji="0" lang="en-US" altLang="en-US" sz="1900" b="0" i="0" u="none" strike="noStrike" kern="0" cap="none" spc="0" normalizeH="0" baseline="-25000" noProof="0" dirty="0">
+                          <a:ln>
+                            <a:noFill/>
+                          </a:ln>
+                          <a:solidFill>
+                            <a:srgbClr val="C00000"/>
+                          </a:solidFill>
+                          <a:effectLst/>
+                          <a:uLnTx/>
+                          <a:uFillTx/>
+                          <a:latin typeface="Arial" panose="020B0604020202020204" pitchFamily="34" charset="0"/>
+                        </a:rPr>
+                        <a:t>creatinine</a:t>
+                      </a:r>
+                      <a:r>
+                        <a:rPr kumimoji="0" lang="en-US" altLang="en-US" sz="1900" b="0" i="0" u="none" strike="noStrike" kern="0" cap="none" spc="0" normalizeH="0" baseline="0" noProof="0" dirty="0">
+                          <a:ln>
+                            <a:noFill/>
+                          </a:ln>
+                          <a:solidFill>
+                            <a:srgbClr val="C00000"/>
+                          </a:solidFill>
+                          <a:effectLst/>
+                          <a:uLnTx/>
+                          <a:uFillTx/>
+                          <a:latin typeface="Arial" panose="020B0604020202020204" pitchFamily="34" charset="0"/>
+                        </a:rPr>
+                        <a:t> + β</a:t>
+                      </a:r>
+                      <a:r>
+                        <a:rPr kumimoji="0" lang="en-US" altLang="en-US" sz="1900" b="0" i="0" u="none" strike="noStrike" kern="0" cap="none" spc="0" normalizeH="0" baseline="-25000" noProof="0" dirty="0">
+                          <a:ln>
+                            <a:noFill/>
+                          </a:ln>
+                          <a:solidFill>
+                            <a:srgbClr val="C00000"/>
+                          </a:solidFill>
+                          <a:effectLst/>
+                          <a:uLnTx/>
+                          <a:uFillTx/>
+                          <a:latin typeface="Arial" panose="020B0604020202020204" pitchFamily="34" charset="0"/>
+                        </a:rPr>
+                        <a:t>PIR </a:t>
+                      </a:r>
+                      <a:r>
+                        <a:rPr kumimoji="0" lang="en-US" altLang="en-US" sz="1900" b="0" i="0" u="none" strike="noStrike" kern="0" cap="none" spc="0" normalizeH="0" baseline="0" noProof="0" dirty="0">
+                          <a:ln>
+                            <a:noFill/>
+                          </a:ln>
+                          <a:solidFill>
+                            <a:srgbClr val="C00000"/>
+                          </a:solidFill>
+                          <a:effectLst/>
+                          <a:uLnTx/>
+                          <a:uFillTx/>
+                          <a:latin typeface="Arial" panose="020B0604020202020204" pitchFamily="34" charset="0"/>
+                        </a:rPr>
+                        <a:t>+ β</a:t>
+                      </a:r>
+                      <a:r>
+                        <a:rPr kumimoji="0" lang="en-US" altLang="en-US" sz="1900" b="0" i="0" u="none" strike="noStrike" kern="0" cap="none" spc="0" normalizeH="0" baseline="-25000" noProof="0" dirty="0">
+                          <a:ln>
+                            <a:noFill/>
+                          </a:ln>
+                          <a:solidFill>
+                            <a:srgbClr val="C00000"/>
+                          </a:solidFill>
+                          <a:effectLst/>
+                          <a:uLnTx/>
+                          <a:uFillTx/>
+                          <a:latin typeface="Arial" panose="020B0604020202020204" pitchFamily="34" charset="0"/>
+                        </a:rPr>
+                        <a:t>0</a:t>
+                      </a:r>
+                      <a:endParaRPr kumimoji="0" lang="en-US" altLang="en-US" sz="1900" b="0" i="0" u="none" strike="noStrike" kern="0" cap="none" spc="0" normalizeH="0" baseline="0" noProof="0" dirty="0">
+                        <a:ln>
+                          <a:noFill/>
+                        </a:ln>
+                        <a:solidFill>
+                          <a:srgbClr val="C00000"/>
+                        </a:solidFill>
+                        <a:effectLst/>
+                        <a:uLnTx/>
+                        <a:uFillTx/>
+                        <a:latin typeface="Arial" panose="020B0604020202020204" pitchFamily="34" charset="0"/>
+                      </a:endParaRPr>
+                    </a:p>
+                  </a:txBody>
+                  <a:tcPr>
+                    <a:lnL w="12700" cap="flat" cmpd="sng" algn="ctr">
+                      <a:noFill/>
+                      <a:prstDash val="solid"/>
+                      <a:round/>
+                      <a:headEnd type="none" w="med" len="med"/>
+                      <a:tailEnd type="none" w="med" len="med"/>
+                    </a:lnL>
+                    <a:lnR w="12700" cap="flat" cmpd="sng" algn="ctr">
+                      <a:noFill/>
+                      <a:prstDash val="solid"/>
+                      <a:round/>
+                      <a:headEnd type="none" w="med" len="med"/>
+                      <a:tailEnd type="none" w="med" len="med"/>
+                    </a:lnR>
+                    <a:lnT w="12700" cap="flat" cmpd="sng" algn="ctr">
+                      <a:noFill/>
+                      <a:prstDash val="solid"/>
+                      <a:round/>
+                      <a:headEnd type="none" w="med" len="med"/>
+                      <a:tailEnd type="none" w="med" len="med"/>
+                    </a:lnT>
+                    <a:lnB w="12700" cap="flat" cmpd="sng" algn="ctr">
+                      <a:noFill/>
+                      <a:prstDash val="solid"/>
+                      <a:round/>
+                      <a:headEnd type="none" w="med" len="med"/>
+                      <a:tailEnd type="none" w="med" len="med"/>
+                    </a:lnB>
+                    <a:lnTlToBr w="12700" cmpd="sng">
+                      <a:noFill/>
+                      <a:prstDash val="solid"/>
+                    </a:lnTlToBr>
+                    <a:lnBlToTr w="12700" cmpd="sng">
+                      <a:noFill/>
+                      <a:prstDash val="solid"/>
+                    </a:lnBlToTr>
+                    <a:noFill/>
+                  </a:tcPr>
+                </a:tc>
+                <a:extLst>
+                  <a:ext uri="{0D108BD9-81ED-4DB2-BD59-A6C34878D82A}">
+                    <a16:rowId xmlns:a16="http://schemas.microsoft.com/office/drawing/2014/main" val="3499217427"/>
+                  </a:ext>
+                </a:extLst>
+              </a:tr>
+            </a:tbl>
+          </a:graphicData>
+        </a:graphic>
+      </p:graphicFrame>
+      <p:sp>
+        <p:nvSpPr>
+          <p:cNvPr id="17" name="TextBox 16">
+            <a:extLst>
+              <a:ext uri="{FF2B5EF4-FFF2-40B4-BE49-F238E27FC236}">
+                <a16:creationId xmlns:a16="http://schemas.microsoft.com/office/drawing/2014/main" id="{1CF1B4A4-E2FE-ECF7-B3A5-14A80AEBDEB0}"/>
+              </a:ext>
+            </a:extLst>
+          </p:cNvPr>
+          <p:cNvSpPr txBox="1"/>
+          <p:nvPr/>
+        </p:nvSpPr>
+        <p:spPr>
+          <a:xfrm>
+            <a:off x="104767" y="9691624"/>
+            <a:ext cx="442750" cy="369332"/>
+          </a:xfrm>
+          <a:prstGeom prst="rect">
+            <a:avLst/>
+          </a:prstGeom>
+          <a:noFill/>
+        </p:spPr>
+        <p:txBody>
+          <a:bodyPr wrap="none" rtlCol="0">
+            <a:spAutoFit/>
+          </a:bodyPr>
+          <a:lstStyle/>
+          <a:p>
+            <a:r>
+              <a:rPr lang="en-US" dirty="0"/>
               <a:t>(3)</a:t>
+            </a:r>
+          </a:p>
+        </p:txBody>
+      </p:sp>
+      <p:graphicFrame>
+        <p:nvGraphicFramePr>
+          <p:cNvPr id="18" name="Table 17">
+            <a:extLst>
+              <a:ext uri="{FF2B5EF4-FFF2-40B4-BE49-F238E27FC236}">
+                <a16:creationId xmlns:a16="http://schemas.microsoft.com/office/drawing/2014/main" id="{E5D325F7-D441-B7A7-098D-F469276CAF64}"/>
+              </a:ext>
+            </a:extLst>
+          </p:cNvPr>
+          <p:cNvGraphicFramePr>
+            <a:graphicFrameLocks noGrp="1"/>
+          </p:cNvGraphicFramePr>
+          <p:nvPr>
+            <p:extLst>
+              <p:ext uri="{D42A27DB-BD31-4B8C-83A1-F6EECF244321}">
+                <p14:modId xmlns:p14="http://schemas.microsoft.com/office/powerpoint/2010/main" val="1905873387"/>
+              </p:ext>
+            </p:extLst>
+          </p:nvPr>
+        </p:nvGraphicFramePr>
+        <p:xfrm>
+          <a:off x="7882285" y="9662366"/>
+          <a:ext cx="7004073" cy="670560"/>
+        </p:xfrm>
+        <a:graphic>
+          <a:graphicData uri="http://schemas.openxmlformats.org/drawingml/2006/table">
+            <a:tbl>
+              <a:tblPr firstRow="1" bandRow="1">
+                <a:tableStyleId>{5C22544A-7EE6-4342-B048-85BDC9FD1C3A}</a:tableStyleId>
+              </a:tblPr>
+              <a:tblGrid>
+                <a:gridCol w="2664468">
+                  <a:extLst>
+                    <a:ext uri="{9D8B030D-6E8A-4147-A177-3AD203B41FA5}">
+                      <a16:colId xmlns:a16="http://schemas.microsoft.com/office/drawing/2014/main" val="228771411"/>
+                    </a:ext>
+                  </a:extLst>
+                </a:gridCol>
+                <a:gridCol w="453858">
+                  <a:extLst>
+                    <a:ext uri="{9D8B030D-6E8A-4147-A177-3AD203B41FA5}">
+                      <a16:colId xmlns:a16="http://schemas.microsoft.com/office/drawing/2014/main" val="2948560317"/>
+                    </a:ext>
+                  </a:extLst>
+                </a:gridCol>
+                <a:gridCol w="3885747">
+                  <a:extLst>
+                    <a:ext uri="{9D8B030D-6E8A-4147-A177-3AD203B41FA5}">
+                      <a16:colId xmlns:a16="http://schemas.microsoft.com/office/drawing/2014/main" val="1248625941"/>
+                    </a:ext>
+                  </a:extLst>
+                </a:gridCol>
+              </a:tblGrid>
+              <a:tr h="235756">
+                <a:tc>
+                  <a:txBody>
+                    <a:bodyPr/>
+                    <a:lstStyle/>
+                    <a:p>
+                      <a:pPr algn="r"/>
+                      <a:r>
+                        <a:rPr kumimoji="0" lang="en-US" altLang="en-US" sz="1900" b="0" i="0" u="none" strike="noStrike" kern="0" cap="none" spc="0" normalizeH="0" baseline="0" noProof="0" dirty="0">
+                          <a:ln>
+                            <a:noFill/>
+                          </a:ln>
+                          <a:solidFill>
+                            <a:srgbClr val="C00000"/>
+                          </a:solidFill>
+                          <a:effectLst/>
+                          <a:uLnTx/>
+                          <a:uFillTx/>
+                          <a:latin typeface="Arial" panose="020B0604020202020204" pitchFamily="34" charset="0"/>
+                        </a:rPr>
+                        <a:t>log10(X</a:t>
+                      </a:r>
+                      <a:r>
+                        <a:rPr kumimoji="0" lang="en-US" altLang="en-US" sz="1900" b="0" i="0" u="none" strike="noStrike" kern="0" cap="none" spc="0" normalizeH="0" baseline="-25000" noProof="0" dirty="0">
+                          <a:ln>
+                            <a:noFill/>
+                          </a:ln>
+                          <a:solidFill>
+                            <a:srgbClr val="C00000"/>
+                          </a:solidFill>
+                          <a:effectLst/>
+                          <a:uLnTx/>
+                          <a:uFillTx/>
+                          <a:latin typeface="Arial" panose="020B0604020202020204" pitchFamily="34" charset="0"/>
+                        </a:rPr>
+                        <a:t>BP3</a:t>
+                      </a:r>
+                      <a:r>
+                        <a:rPr kumimoji="0" lang="en-US" altLang="en-US" sz="1900" b="0" i="0" u="none" strike="noStrike" kern="0" cap="none" spc="0" normalizeH="0" baseline="0" noProof="0" dirty="0">
+                          <a:ln>
+                            <a:noFill/>
+                          </a:ln>
+                          <a:solidFill>
+                            <a:srgbClr val="C00000"/>
+                          </a:solidFill>
+                          <a:effectLst/>
+                          <a:uLnTx/>
+                          <a:uFillTx/>
+                          <a:latin typeface="Arial" panose="020B0604020202020204" pitchFamily="34" charset="0"/>
+                        </a:rPr>
+                        <a:t>[race = k]) </a:t>
+                      </a:r>
+                      <a:endParaRPr lang="en-US" sz="1900" dirty="0">
+                        <a:solidFill>
+                          <a:srgbClr val="C00000"/>
+                        </a:solidFill>
+                      </a:endParaRPr>
+                    </a:p>
+                  </a:txBody>
+                  <a:tcPr>
+                    <a:lnL w="12700" cap="flat" cmpd="sng" algn="ctr">
+                      <a:noFill/>
+                      <a:prstDash val="solid"/>
+                      <a:round/>
+                      <a:headEnd type="none" w="med" len="med"/>
+                      <a:tailEnd type="none" w="med" len="med"/>
+                    </a:lnL>
+                    <a:lnR w="12700" cap="flat" cmpd="sng" algn="ctr">
+                      <a:noFill/>
+                      <a:prstDash val="solid"/>
+                      <a:round/>
+                      <a:headEnd type="none" w="med" len="med"/>
+                      <a:tailEnd type="none" w="med" len="med"/>
+                    </a:lnR>
+                    <a:lnT w="12700" cap="flat" cmpd="sng" algn="ctr">
+                      <a:noFill/>
+                      <a:prstDash val="solid"/>
+                      <a:round/>
+                      <a:headEnd type="none" w="med" len="med"/>
+                      <a:tailEnd type="none" w="med" len="med"/>
+                    </a:lnT>
+                    <a:lnB w="12700" cap="flat" cmpd="sng" algn="ctr">
+                      <a:noFill/>
+                      <a:prstDash val="solid"/>
+                      <a:round/>
+                      <a:headEnd type="none" w="med" len="med"/>
+                      <a:tailEnd type="none" w="med" len="med"/>
+                    </a:lnB>
+                    <a:lnTlToBr w="12700" cmpd="sng">
+                      <a:noFill/>
+                      <a:prstDash val="solid"/>
+                    </a:lnTlToBr>
+                    <a:lnBlToTr w="12700" cmpd="sng">
+                      <a:noFill/>
+                      <a:prstDash val="solid"/>
+                    </a:lnBlToTr>
+                    <a:noFill/>
+                  </a:tcPr>
+                </a:tc>
+                <a:tc>
+                  <a:txBody>
+                    <a:bodyPr/>
+                    <a:lstStyle/>
+                    <a:p>
+                      <a:pPr algn="l"/>
+                      <a:r>
+                        <a:rPr kumimoji="0" lang="en-US" altLang="en-US" sz="1900" b="0" i="0" u="none" strike="noStrike" kern="0" cap="none" spc="0" normalizeH="0" baseline="0" noProof="0" dirty="0">
+                          <a:ln>
+                            <a:noFill/>
+                          </a:ln>
+                          <a:solidFill>
+                            <a:srgbClr val="C00000"/>
+                          </a:solidFill>
+                          <a:effectLst/>
+                          <a:uLnTx/>
+                          <a:uFillTx/>
+                          <a:latin typeface="Arial" panose="020B0604020202020204" pitchFamily="34" charset="0"/>
+                        </a:rPr>
+                        <a:t>=</a:t>
+                      </a:r>
+                      <a:endParaRPr lang="en-US" sz="1900" dirty="0">
+                        <a:solidFill>
+                          <a:srgbClr val="C00000"/>
+                        </a:solidFill>
+                      </a:endParaRPr>
+                    </a:p>
+                  </a:txBody>
+                  <a:tcPr>
+                    <a:lnL w="12700" cap="flat" cmpd="sng" algn="ctr">
+                      <a:noFill/>
+                      <a:prstDash val="solid"/>
+                      <a:round/>
+                      <a:headEnd type="none" w="med" len="med"/>
+                      <a:tailEnd type="none" w="med" len="med"/>
+                    </a:lnL>
+                    <a:lnR w="12700" cap="flat" cmpd="sng" algn="ctr">
+                      <a:noFill/>
+                      <a:prstDash val="solid"/>
+                      <a:round/>
+                      <a:headEnd type="none" w="med" len="med"/>
+                      <a:tailEnd type="none" w="med" len="med"/>
+                    </a:lnR>
+                    <a:lnT w="12700" cap="flat" cmpd="sng" algn="ctr">
+                      <a:noFill/>
+                      <a:prstDash val="solid"/>
+                      <a:round/>
+                      <a:headEnd type="none" w="med" len="med"/>
+                      <a:tailEnd type="none" w="med" len="med"/>
+                    </a:lnT>
+                    <a:lnB w="12700" cap="flat" cmpd="sng" algn="ctr">
+                      <a:noFill/>
+                      <a:prstDash val="solid"/>
+                      <a:round/>
+                      <a:headEnd type="none" w="med" len="med"/>
+                      <a:tailEnd type="none" w="med" len="med"/>
+                    </a:lnB>
+                    <a:lnTlToBr w="12700" cmpd="sng">
+                      <a:noFill/>
+                      <a:prstDash val="solid"/>
+                    </a:lnTlToBr>
+                    <a:lnBlToTr w="12700" cmpd="sng">
+                      <a:noFill/>
+                      <a:prstDash val="solid"/>
+                    </a:lnBlToTr>
+                    <a:noFill/>
+                  </a:tcPr>
+                </a:tc>
+                <a:tc>
+                  <a:txBody>
+                    <a:bodyPr/>
+                    <a:lstStyle/>
+                    <a:p>
+                      <a:pPr marL="0" marR="0" lvl="0" indent="0" defTabSz="3298825" eaLnBrk="0" fontAlgn="base" latinLnBrk="0" hangingPunct="0">
+                        <a:lnSpc>
+                          <a:spcPct val="100000"/>
+                        </a:lnSpc>
+                        <a:spcBef>
+                          <a:spcPct val="0"/>
+                        </a:spcBef>
+                        <a:spcAft>
+                          <a:spcPct val="0"/>
+                        </a:spcAft>
+                        <a:buClrTx/>
+                        <a:buSzTx/>
+                        <a:buFontTx/>
+                        <a:buNone/>
+                        <a:tabLst/>
+                        <a:defRPr/>
+                      </a:pPr>
+                      <a:r>
+                        <a:rPr kumimoji="0" lang="en-US" altLang="en-US" sz="1900" b="1" i="0" u="none" strike="noStrike" kern="0" cap="none" spc="0" normalizeH="0" baseline="0" noProof="0" dirty="0">
+                          <a:ln>
+                            <a:noFill/>
+                          </a:ln>
+                          <a:solidFill>
+                            <a:srgbClr val="C00000"/>
+                          </a:solidFill>
+                          <a:effectLst/>
+                          <a:uLnTx/>
+                          <a:uFillTx/>
+                          <a:latin typeface="Arial" panose="020B0604020202020204" pitchFamily="34" charset="0"/>
+                        </a:rPr>
+                        <a:t>β</a:t>
+                      </a:r>
+                      <a:r>
+                        <a:rPr kumimoji="0" lang="en-US" altLang="en-US" sz="2100" b="1" i="0" u="none" strike="noStrike" kern="0" cap="none" spc="0" normalizeH="0" baseline="-25000" noProof="0" dirty="0" err="1">
+                          <a:ln>
+                            <a:noFill/>
+                          </a:ln>
+                          <a:solidFill>
+                            <a:srgbClr val="C00000"/>
+                          </a:solidFill>
+                          <a:effectLst/>
+                          <a:uLnTx/>
+                          <a:uFillTx/>
+                          <a:latin typeface="Arial" panose="020B0604020202020204" pitchFamily="34" charset="0"/>
+                        </a:rPr>
+                        <a:t>body,k</a:t>
+                      </a:r>
+                      <a:r>
+                        <a:rPr kumimoji="0" lang="en-US" altLang="en-US" sz="1900" b="0" i="0" u="none" strike="noStrike" kern="0" cap="none" spc="0" normalizeH="0" baseline="0" noProof="0" dirty="0">
+                          <a:ln>
+                            <a:noFill/>
+                          </a:ln>
+                          <a:solidFill>
+                            <a:srgbClr val="C00000"/>
+                          </a:solidFill>
+                          <a:effectLst/>
+                          <a:uLnTx/>
+                          <a:uFillTx/>
+                          <a:latin typeface="Arial" panose="020B0604020202020204" pitchFamily="34" charset="0"/>
+                        </a:rPr>
+                        <a:t>+ β</a:t>
+                      </a:r>
+                      <a:r>
+                        <a:rPr kumimoji="0" lang="en-US" altLang="en-US" sz="1900" b="0" i="0" u="none" strike="noStrike" kern="0" cap="none" spc="0" normalizeH="0" baseline="-25000" noProof="0" dirty="0">
+                          <a:ln>
+                            <a:noFill/>
+                          </a:ln>
+                          <a:solidFill>
+                            <a:srgbClr val="C00000"/>
+                          </a:solidFill>
+                          <a:effectLst/>
+                          <a:uLnTx/>
+                          <a:uFillTx/>
+                          <a:latin typeface="Arial" panose="020B0604020202020204" pitchFamily="34" charset="0"/>
+                        </a:rPr>
+                        <a:t>Age</a:t>
+                      </a:r>
+                      <a:r>
+                        <a:rPr kumimoji="0" lang="en-US" altLang="en-US" sz="1900" b="0" i="0" u="none" strike="noStrike" kern="0" cap="none" spc="0" normalizeH="0" baseline="0" noProof="0" dirty="0">
+                          <a:ln>
+                            <a:noFill/>
+                          </a:ln>
+                          <a:solidFill>
+                            <a:srgbClr val="C00000"/>
+                          </a:solidFill>
+                          <a:effectLst/>
+                          <a:uLnTx/>
+                          <a:uFillTx/>
+                          <a:latin typeface="Arial" panose="020B0604020202020204" pitchFamily="34" charset="0"/>
+                        </a:rPr>
+                        <a:t>+ β</a:t>
+                      </a:r>
+                      <a:r>
+                        <a:rPr kumimoji="0" lang="en-US" altLang="en-US" sz="1900" b="0" i="0" u="none" strike="noStrike" kern="0" cap="none" spc="0" normalizeH="0" baseline="-25000" noProof="0" dirty="0">
+                          <a:ln>
+                            <a:noFill/>
+                          </a:ln>
+                          <a:solidFill>
+                            <a:srgbClr val="C00000"/>
+                          </a:solidFill>
+                          <a:effectLst/>
+                          <a:uLnTx/>
+                          <a:uFillTx/>
+                          <a:latin typeface="Arial" panose="020B0604020202020204" pitchFamily="34" charset="0"/>
+                        </a:rPr>
+                        <a:t>cycle</a:t>
+                      </a:r>
+                      <a:r>
+                        <a:rPr kumimoji="0" lang="en-US" altLang="en-US" sz="1900" b="0" i="0" u="none" strike="noStrike" kern="0" cap="none" spc="0" normalizeH="0" baseline="0" noProof="0" dirty="0">
+                          <a:ln>
+                            <a:noFill/>
+                          </a:ln>
+                          <a:solidFill>
+                            <a:srgbClr val="C00000"/>
+                          </a:solidFill>
+                          <a:effectLst/>
+                          <a:uLnTx/>
+                          <a:uFillTx/>
+                          <a:latin typeface="Arial" panose="020B0604020202020204" pitchFamily="34" charset="0"/>
+                        </a:rPr>
+                        <a:t>+ β</a:t>
+                      </a:r>
+                      <a:r>
+                        <a:rPr kumimoji="0" lang="en-US" altLang="en-US" sz="1900" b="0" i="0" u="none" strike="noStrike" kern="0" cap="none" spc="0" normalizeH="0" baseline="-25000" noProof="0" dirty="0">
+                          <a:ln>
+                            <a:noFill/>
+                          </a:ln>
+                          <a:solidFill>
+                            <a:srgbClr val="C00000"/>
+                          </a:solidFill>
+                          <a:effectLst/>
+                          <a:uLnTx/>
+                          <a:uFillTx/>
+                          <a:latin typeface="Arial" panose="020B0604020202020204" pitchFamily="34" charset="0"/>
+                        </a:rPr>
+                        <a:t>BMI</a:t>
+                      </a:r>
+                    </a:p>
+                    <a:p>
+                      <a:pPr marL="0" marR="0" lvl="0" indent="0" defTabSz="3298825" eaLnBrk="0" fontAlgn="base" latinLnBrk="0" hangingPunct="0">
+                        <a:lnSpc>
+                          <a:spcPct val="100000"/>
+                        </a:lnSpc>
+                        <a:spcBef>
+                          <a:spcPct val="0"/>
+                        </a:spcBef>
+                        <a:spcAft>
+                          <a:spcPct val="0"/>
+                        </a:spcAft>
+                        <a:buClrTx/>
+                        <a:buSzTx/>
+                        <a:buFontTx/>
+                        <a:buNone/>
+                        <a:tabLst/>
+                        <a:defRPr/>
+                      </a:pPr>
+                      <a:r>
+                        <a:rPr kumimoji="0" lang="en-US" altLang="en-US" sz="1900" b="0" i="0" u="none" strike="noStrike" kern="0" cap="none" spc="0" normalizeH="0" baseline="0" noProof="0" dirty="0">
+                          <a:ln>
+                            <a:noFill/>
+                          </a:ln>
+                          <a:solidFill>
+                            <a:srgbClr val="C00000"/>
+                          </a:solidFill>
+                          <a:effectLst/>
+                          <a:uLnTx/>
+                          <a:uFillTx/>
+                          <a:latin typeface="Arial" panose="020B0604020202020204" pitchFamily="34" charset="0"/>
+                        </a:rPr>
+                        <a:t>+ β</a:t>
+                      </a:r>
+                      <a:r>
+                        <a:rPr kumimoji="0" lang="en-US" altLang="en-US" sz="1900" b="0" i="0" u="none" strike="noStrike" kern="0" cap="none" spc="0" normalizeH="0" baseline="-25000" noProof="0" dirty="0">
+                          <a:ln>
+                            <a:noFill/>
+                          </a:ln>
+                          <a:solidFill>
+                            <a:srgbClr val="C00000"/>
+                          </a:solidFill>
+                          <a:effectLst/>
+                          <a:uLnTx/>
+                          <a:uFillTx/>
+                          <a:latin typeface="Arial" panose="020B0604020202020204" pitchFamily="34" charset="0"/>
+                        </a:rPr>
+                        <a:t>creatinine</a:t>
+                      </a:r>
+                      <a:r>
+                        <a:rPr kumimoji="0" lang="en-US" altLang="en-US" sz="1900" b="0" i="0" u="none" strike="noStrike" kern="0" cap="none" spc="0" normalizeH="0" baseline="0" noProof="0" dirty="0">
+                          <a:ln>
+                            <a:noFill/>
+                          </a:ln>
+                          <a:solidFill>
+                            <a:srgbClr val="C00000"/>
+                          </a:solidFill>
+                          <a:effectLst/>
+                          <a:uLnTx/>
+                          <a:uFillTx/>
+                          <a:latin typeface="Arial" panose="020B0604020202020204" pitchFamily="34" charset="0"/>
+                        </a:rPr>
+                        <a:t> + β</a:t>
+                      </a:r>
+                      <a:r>
+                        <a:rPr kumimoji="0" lang="en-US" altLang="en-US" sz="1900" b="0" i="0" u="none" strike="noStrike" kern="0" cap="none" spc="0" normalizeH="0" baseline="-25000" noProof="0" dirty="0">
+                          <a:ln>
+                            <a:noFill/>
+                          </a:ln>
+                          <a:solidFill>
+                            <a:srgbClr val="C00000"/>
+                          </a:solidFill>
+                          <a:effectLst/>
+                          <a:uLnTx/>
+                          <a:uFillTx/>
+                          <a:latin typeface="Arial" panose="020B0604020202020204" pitchFamily="34" charset="0"/>
+                        </a:rPr>
+                        <a:t>PIR </a:t>
+                      </a:r>
+                      <a:r>
+                        <a:rPr kumimoji="0" lang="en-US" altLang="en-US" sz="1900" b="0" i="0" u="none" strike="noStrike" kern="0" cap="none" spc="0" normalizeH="0" baseline="0" noProof="0" dirty="0">
+                          <a:ln>
+                            <a:noFill/>
+                          </a:ln>
+                          <a:solidFill>
+                            <a:srgbClr val="C00000"/>
+                          </a:solidFill>
+                          <a:effectLst/>
+                          <a:uLnTx/>
+                          <a:uFillTx/>
+                          <a:latin typeface="Arial" panose="020B0604020202020204" pitchFamily="34" charset="0"/>
+                        </a:rPr>
+                        <a:t>+ </a:t>
+                      </a:r>
+                      <a:r>
+                        <a:rPr kumimoji="0" lang="en-US" altLang="en-US" sz="1900" b="1" i="0" u="none" strike="noStrike" kern="0" cap="none" spc="0" normalizeH="0" baseline="0" noProof="0" dirty="0">
+                          <a:ln>
+                            <a:noFill/>
+                          </a:ln>
+                          <a:solidFill>
+                            <a:srgbClr val="C00000"/>
+                          </a:solidFill>
+                          <a:effectLst/>
+                          <a:uLnTx/>
+                          <a:uFillTx/>
+                          <a:latin typeface="Arial" panose="020B0604020202020204" pitchFamily="34" charset="0"/>
+                        </a:rPr>
+                        <a:t>β</a:t>
+                      </a:r>
+                      <a:r>
+                        <a:rPr kumimoji="0" lang="en-US" altLang="en-US" sz="1900" b="1" i="0" u="none" strike="noStrike" kern="0" cap="none" spc="0" normalizeH="0" baseline="-25000" noProof="0" dirty="0">
+                          <a:ln>
+                            <a:noFill/>
+                          </a:ln>
+                          <a:solidFill>
+                            <a:srgbClr val="C00000"/>
+                          </a:solidFill>
+                          <a:effectLst/>
+                          <a:uLnTx/>
+                          <a:uFillTx/>
+                          <a:latin typeface="Arial" panose="020B0604020202020204" pitchFamily="34" charset="0"/>
+                        </a:rPr>
+                        <a:t>sunscreen </a:t>
+                      </a:r>
+                      <a:r>
+                        <a:rPr kumimoji="0" lang="en-US" altLang="en-US" sz="1900" b="0" i="0" u="none" strike="noStrike" kern="0" cap="none" spc="0" normalizeH="0" baseline="0" noProof="0" dirty="0">
+                          <a:ln>
+                            <a:noFill/>
+                          </a:ln>
+                          <a:solidFill>
+                            <a:srgbClr val="C00000"/>
+                          </a:solidFill>
+                          <a:effectLst/>
+                          <a:uLnTx/>
+                          <a:uFillTx/>
+                          <a:latin typeface="Arial" panose="020B0604020202020204" pitchFamily="34" charset="0"/>
+                        </a:rPr>
+                        <a:t>+ β</a:t>
+                      </a:r>
+                      <a:r>
+                        <a:rPr kumimoji="0" lang="en-US" altLang="en-US" sz="1900" b="0" i="0" u="none" strike="noStrike" kern="0" cap="none" spc="0" normalizeH="0" baseline="-25000" noProof="0" dirty="0">
+                          <a:ln>
+                            <a:noFill/>
+                          </a:ln>
+                          <a:solidFill>
+                            <a:srgbClr val="C00000"/>
+                          </a:solidFill>
+                          <a:effectLst/>
+                          <a:uLnTx/>
+                          <a:uFillTx/>
+                          <a:latin typeface="Arial" panose="020B0604020202020204" pitchFamily="34" charset="0"/>
+                        </a:rPr>
+                        <a:t>0</a:t>
+                      </a:r>
+                      <a:endParaRPr kumimoji="0" lang="en-US" altLang="en-US" sz="1900" b="0" i="0" u="none" strike="noStrike" kern="0" cap="none" spc="0" normalizeH="0" baseline="0" noProof="0" dirty="0">
+                        <a:ln>
+                          <a:noFill/>
+                        </a:ln>
+                        <a:solidFill>
+                          <a:srgbClr val="C00000"/>
+                        </a:solidFill>
+                        <a:effectLst/>
+                        <a:uLnTx/>
+                        <a:uFillTx/>
+                        <a:latin typeface="Arial" panose="020B0604020202020204" pitchFamily="34" charset="0"/>
+                      </a:endParaRPr>
+                    </a:p>
+                  </a:txBody>
+                  <a:tcPr>
+                    <a:lnL w="12700" cap="flat" cmpd="sng" algn="ctr">
+                      <a:noFill/>
+                      <a:prstDash val="solid"/>
+                      <a:round/>
+                      <a:headEnd type="none" w="med" len="med"/>
+                      <a:tailEnd type="none" w="med" len="med"/>
+                    </a:lnL>
+                    <a:lnR w="12700" cap="flat" cmpd="sng" algn="ctr">
+                      <a:noFill/>
+                      <a:prstDash val="solid"/>
+                      <a:round/>
+                      <a:headEnd type="none" w="med" len="med"/>
+                      <a:tailEnd type="none" w="med" len="med"/>
+                    </a:lnR>
+                    <a:lnT w="12700" cap="flat" cmpd="sng" algn="ctr">
+                      <a:noFill/>
+                      <a:prstDash val="solid"/>
+                      <a:round/>
+                      <a:headEnd type="none" w="med" len="med"/>
+                      <a:tailEnd type="none" w="med" len="med"/>
+                    </a:lnT>
+                    <a:lnB w="12700" cap="flat" cmpd="sng" algn="ctr">
+                      <a:noFill/>
+                      <a:prstDash val="solid"/>
+                      <a:round/>
+                      <a:headEnd type="none" w="med" len="med"/>
+                      <a:tailEnd type="none" w="med" len="med"/>
+                    </a:lnB>
+                    <a:lnTlToBr w="12700" cmpd="sng">
+                      <a:noFill/>
+                      <a:prstDash val="solid"/>
+                    </a:lnTlToBr>
+                    <a:lnBlToTr w="12700" cmpd="sng">
+                      <a:noFill/>
+                      <a:prstDash val="solid"/>
+                    </a:lnBlToTr>
+                    <a:noFill/>
+                  </a:tcPr>
+                </a:tc>
+                <a:extLst>
+                  <a:ext uri="{0D108BD9-81ED-4DB2-BD59-A6C34878D82A}">
+                    <a16:rowId xmlns:a16="http://schemas.microsoft.com/office/drawing/2014/main" val="3499217427"/>
+                  </a:ext>
+                </a:extLst>
+              </a:tr>
+            </a:tbl>
+          </a:graphicData>
+        </a:graphic>
+      </p:graphicFrame>
+      <p:sp>
+        <p:nvSpPr>
+          <p:cNvPr id="23" name="TextBox 22">
+            <a:extLst>
+              <a:ext uri="{FF2B5EF4-FFF2-40B4-BE49-F238E27FC236}">
+                <a16:creationId xmlns:a16="http://schemas.microsoft.com/office/drawing/2014/main" id="{58A25B44-2F3D-AEA2-E619-F7CDBB458395}"/>
+              </a:ext>
+            </a:extLst>
+          </p:cNvPr>
+          <p:cNvSpPr txBox="1"/>
+          <p:nvPr/>
+        </p:nvSpPr>
+        <p:spPr>
+          <a:xfrm>
+            <a:off x="7697406" y="9691624"/>
+            <a:ext cx="442750" cy="369332"/>
+          </a:xfrm>
+          <a:prstGeom prst="rect">
+            <a:avLst/>
+          </a:prstGeom>
+          <a:noFill/>
+        </p:spPr>
+        <p:txBody>
+          <a:bodyPr wrap="none" rtlCol="0">
+            <a:spAutoFit/>
+          </a:bodyPr>
+          <a:lstStyle/>
+          <a:p>
+            <a:r>
+              <a:rPr lang="en-US" dirty="0"/>
+              <a:t>(6)</a:t>
+            </a:r>
+          </a:p>
+        </p:txBody>
+      </p:sp>
+      <p:sp>
+        <p:nvSpPr>
+          <p:cNvPr id="31" name="TextBox 30">
+            <a:extLst>
+              <a:ext uri="{FF2B5EF4-FFF2-40B4-BE49-F238E27FC236}">
+                <a16:creationId xmlns:a16="http://schemas.microsoft.com/office/drawing/2014/main" id="{5D527206-4C2F-C753-AC35-7047767DF790}"/>
+              </a:ext>
+            </a:extLst>
+          </p:cNvPr>
+          <p:cNvSpPr txBox="1"/>
+          <p:nvPr/>
+        </p:nvSpPr>
+        <p:spPr>
+          <a:xfrm>
+            <a:off x="15367129" y="12734963"/>
+            <a:ext cx="442750" cy="369332"/>
+          </a:xfrm>
+          <a:prstGeom prst="rect">
+            <a:avLst/>
+          </a:prstGeom>
+          <a:noFill/>
+        </p:spPr>
+        <p:txBody>
+          <a:bodyPr wrap="none" rtlCol="0">
+            <a:spAutoFit/>
+          </a:bodyPr>
+          <a:lstStyle/>
+          <a:p>
+            <a:r>
+              <a:rPr lang="en-US" dirty="0"/>
+              <a:t>(3)</a:t>
+            </a:r>
+          </a:p>
+        </p:txBody>
+      </p:sp>
+      <p:sp>
+        <p:nvSpPr>
+          <p:cNvPr id="33" name="TextBox 32">
+            <a:extLst>
+              <a:ext uri="{FF2B5EF4-FFF2-40B4-BE49-F238E27FC236}">
+                <a16:creationId xmlns:a16="http://schemas.microsoft.com/office/drawing/2014/main" id="{62CFE809-EB9F-B0A7-27C2-4139EB21F37C}"/>
+              </a:ext>
+            </a:extLst>
+          </p:cNvPr>
+          <p:cNvSpPr txBox="1"/>
+          <p:nvPr/>
+        </p:nvSpPr>
+        <p:spPr>
+          <a:xfrm>
+            <a:off x="17622713" y="12734963"/>
+            <a:ext cx="442750" cy="369332"/>
+          </a:xfrm>
+          <a:prstGeom prst="rect">
+            <a:avLst/>
+          </a:prstGeom>
+          <a:noFill/>
+        </p:spPr>
+        <p:txBody>
+          <a:bodyPr wrap="none" rtlCol="0">
+            <a:spAutoFit/>
+          </a:bodyPr>
+          <a:lstStyle/>
+          <a:p>
+            <a:r>
+              <a:rPr lang="en-US" dirty="0"/>
+              <a:t>(6)</a:t>
+            </a:r>
+          </a:p>
+        </p:txBody>
+      </p:sp>
+      <p:cxnSp>
+        <p:nvCxnSpPr>
+          <p:cNvPr id="35" name="Straight Connector 34">
+            <a:extLst>
+              <a:ext uri="{FF2B5EF4-FFF2-40B4-BE49-F238E27FC236}">
+                <a16:creationId xmlns:a16="http://schemas.microsoft.com/office/drawing/2014/main" id="{B45934F3-3532-DCF0-CA78-F9BE4F678CB9}"/>
+              </a:ext>
+            </a:extLst>
+          </p:cNvPr>
+          <p:cNvCxnSpPr>
+            <a:cxnSpLocks/>
+          </p:cNvCxnSpPr>
+          <p:nvPr/>
+        </p:nvCxnSpPr>
+        <p:spPr>
+          <a:xfrm flipV="1">
+            <a:off x="15809879" y="12911163"/>
+            <a:ext cx="1712355" cy="2721"/>
+          </a:xfrm>
+          <a:prstGeom prst="line">
+            <a:avLst/>
+          </a:prstGeom>
+          <a:ln w="31750">
+            <a:solidFill>
+              <a:srgbClr val="00B050"/>
+            </a:solidFill>
+          </a:ln>
+        </p:spPr>
+        <p:style>
+          <a:lnRef idx="3">
+            <a:schemeClr val="dk1"/>
+          </a:lnRef>
+          <a:fillRef idx="0">
+            <a:schemeClr val="dk1"/>
+          </a:fillRef>
+          <a:effectRef idx="2">
+            <a:schemeClr val="dk1"/>
+          </a:effectRef>
+          <a:fontRef idx="minor">
+            <a:schemeClr val="tx1"/>
+          </a:fontRef>
+        </p:style>
+      </p:cxnSp>
+      <p:sp>
+        <p:nvSpPr>
+          <p:cNvPr id="36" name="TextBox 35">
+            <a:extLst>
+              <a:ext uri="{FF2B5EF4-FFF2-40B4-BE49-F238E27FC236}">
+                <a16:creationId xmlns:a16="http://schemas.microsoft.com/office/drawing/2014/main" id="{635071A0-916C-99FC-BFD6-C9CB0340549B}"/>
+              </a:ext>
+            </a:extLst>
+          </p:cNvPr>
+          <p:cNvSpPr txBox="1"/>
+          <p:nvPr/>
+        </p:nvSpPr>
+        <p:spPr>
+          <a:xfrm>
+            <a:off x="13863635" y="12111011"/>
+            <a:ext cx="1215333" cy="369332"/>
+          </a:xfrm>
+          <a:prstGeom prst="rect">
+            <a:avLst/>
+          </a:prstGeom>
+          <a:noFill/>
+        </p:spPr>
+        <p:txBody>
+          <a:bodyPr wrap="none" rtlCol="0">
+            <a:spAutoFit/>
+          </a:bodyPr>
+          <a:lstStyle/>
+          <a:p>
+            <a:r>
+              <a:rPr lang="en-US" dirty="0"/>
+              <a:t>All Women</a:t>
             </a:r>
           </a:p>
         </p:txBody>
@@ -12775,7 +14096,7 @@
   <a:extraClrSchemeLst/>
   <a:extLst>
     <a:ext uri="{05A4C25C-085E-4340-85A3-A5531E510DB2}">
-      <thm15:themeFamily xmlns:thm15="http://schemas.microsoft.com/office/thememl/2012/main" name="Office Theme" id="{62F939B6-93AF-4DB8-9C6B-D6C7DFDC589F}" vid="{4A3C46E8-61CC-4603-A589-7422A47A8E4A}"/>
+      <thm15:themeFamily xmlns:thm15="http://schemas.microsoft.com/office/thememl/2012/main" name="Office 2013 - 2022 Theme" id="{62F939B6-93AF-4DB8-9C6B-D6C7DFDC589F}" vid="{4A3C46E8-61CC-4603-A589-7422A47A8E4A}"/>
     </a:ext>
   </a:extLst>
 </a:theme>

</xml_diff>

<commit_message>
correct final number of youths and adults for analysis
</commit_message>
<xml_diff>
--- a/Workflow Figure - Weight Perception BP3 1a_SZ_v3.pptx
+++ b/Workflow Figure - Weight Perception BP3 1a_SZ_v3.pptx
@@ -243,7 +243,7 @@
           <a:p>
             <a:fld id="{3A8AD564-B736-0C45-B96E-1A374E4A831F}" type="datetimeFigureOut">
               <a:rPr lang="en-US" smtClean="0"/>
-              <a:t>1/15/24</a:t>
+              <a:t>1/21/24</a:t>
             </a:fld>
             <a:endParaRPr lang="en-US"/>
           </a:p>
@@ -413,7 +413,7 @@
           <a:p>
             <a:fld id="{3A8AD564-B736-0C45-B96E-1A374E4A831F}" type="datetimeFigureOut">
               <a:rPr lang="en-US" smtClean="0"/>
-              <a:t>1/15/24</a:t>
+              <a:t>1/21/24</a:t>
             </a:fld>
             <a:endParaRPr lang="en-US"/>
           </a:p>
@@ -593,7 +593,7 @@
           <a:p>
             <a:fld id="{3A8AD564-B736-0C45-B96E-1A374E4A831F}" type="datetimeFigureOut">
               <a:rPr lang="en-US" smtClean="0"/>
-              <a:t>1/15/24</a:t>
+              <a:t>1/21/24</a:t>
             </a:fld>
             <a:endParaRPr lang="en-US"/>
           </a:p>
@@ -763,7 +763,7 @@
           <a:p>
             <a:fld id="{3A8AD564-B736-0C45-B96E-1A374E4A831F}" type="datetimeFigureOut">
               <a:rPr lang="en-US" smtClean="0"/>
-              <a:t>1/15/24</a:t>
+              <a:t>1/21/24</a:t>
             </a:fld>
             <a:endParaRPr lang="en-US"/>
           </a:p>
@@ -1007,7 +1007,7 @@
           <a:p>
             <a:fld id="{3A8AD564-B736-0C45-B96E-1A374E4A831F}" type="datetimeFigureOut">
               <a:rPr lang="en-US" smtClean="0"/>
-              <a:t>1/15/24</a:t>
+              <a:t>1/21/24</a:t>
             </a:fld>
             <a:endParaRPr lang="en-US"/>
           </a:p>
@@ -1239,7 +1239,7 @@
           <a:p>
             <a:fld id="{3A8AD564-B736-0C45-B96E-1A374E4A831F}" type="datetimeFigureOut">
               <a:rPr lang="en-US" smtClean="0"/>
-              <a:t>1/15/24</a:t>
+              <a:t>1/21/24</a:t>
             </a:fld>
             <a:endParaRPr lang="en-US"/>
           </a:p>
@@ -1606,7 +1606,7 @@
           <a:p>
             <a:fld id="{3A8AD564-B736-0C45-B96E-1A374E4A831F}" type="datetimeFigureOut">
               <a:rPr lang="en-US" smtClean="0"/>
-              <a:t>1/15/24</a:t>
+              <a:t>1/21/24</a:t>
             </a:fld>
             <a:endParaRPr lang="en-US"/>
           </a:p>
@@ -1724,7 +1724,7 @@
           <a:p>
             <a:fld id="{3A8AD564-B736-0C45-B96E-1A374E4A831F}" type="datetimeFigureOut">
               <a:rPr lang="en-US" smtClean="0"/>
-              <a:t>1/15/24</a:t>
+              <a:t>1/21/24</a:t>
             </a:fld>
             <a:endParaRPr lang="en-US"/>
           </a:p>
@@ -1819,7 +1819,7 @@
           <a:p>
             <a:fld id="{3A8AD564-B736-0C45-B96E-1A374E4A831F}" type="datetimeFigureOut">
               <a:rPr lang="en-US" smtClean="0"/>
-              <a:t>1/15/24</a:t>
+              <a:t>1/21/24</a:t>
             </a:fld>
             <a:endParaRPr lang="en-US"/>
           </a:p>
@@ -2096,7 +2096,7 @@
           <a:p>
             <a:fld id="{3A8AD564-B736-0C45-B96E-1A374E4A831F}" type="datetimeFigureOut">
               <a:rPr lang="en-US" smtClean="0"/>
-              <a:t>1/15/24</a:t>
+              <a:t>1/21/24</a:t>
             </a:fld>
             <a:endParaRPr lang="en-US"/>
           </a:p>
@@ -2353,7 +2353,7 @@
           <a:p>
             <a:fld id="{3A8AD564-B736-0C45-B96E-1A374E4A831F}" type="datetimeFigureOut">
               <a:rPr lang="en-US" smtClean="0"/>
-              <a:t>1/15/24</a:t>
+              <a:t>1/21/24</a:t>
             </a:fld>
             <a:endParaRPr lang="en-US"/>
           </a:p>
@@ -2566,7 +2566,7 @@
           <a:p>
             <a:fld id="{3A8AD564-B736-0C45-B96E-1A374E4A831F}" type="datetimeFigureOut">
               <a:rPr lang="en-US" smtClean="0"/>
-              <a:t>1/15/24</a:t>
+              <a:t>1/21/24</a:t>
             </a:fld>
             <a:endParaRPr lang="en-US"/>
           </a:p>
@@ -2986,13 +2986,13 @@
           <p:nvPr>
             <p:extLst>
               <p:ext uri="{D42A27DB-BD31-4B8C-83A1-F6EECF244321}">
-                <p14:modId xmlns:p14="http://schemas.microsoft.com/office/powerpoint/2010/main" val="3549214504"/>
+                <p14:modId xmlns:p14="http://schemas.microsoft.com/office/powerpoint/2010/main" val="3281943244"/>
               </p:ext>
             </p:extLst>
           </p:nvPr>
         </p:nvGraphicFramePr>
         <p:xfrm>
-          <a:off x="933447" y="8838754"/>
+          <a:off x="933447" y="9071831"/>
           <a:ext cx="6390389" cy="670560"/>
         </p:xfrm>
         <a:graphic>
@@ -3521,13 +3521,13 @@
           <p:nvPr>
             <p:extLst>
               <p:ext uri="{D42A27DB-BD31-4B8C-83A1-F6EECF244321}">
-                <p14:modId xmlns:p14="http://schemas.microsoft.com/office/powerpoint/2010/main" val="3174078575"/>
+                <p14:modId xmlns:p14="http://schemas.microsoft.com/office/powerpoint/2010/main" val="961859208"/>
               </p:ext>
             </p:extLst>
           </p:nvPr>
         </p:nvGraphicFramePr>
         <p:xfrm>
-          <a:off x="963208" y="8054166"/>
+          <a:off x="963208" y="8287243"/>
           <a:ext cx="6390389" cy="670560"/>
         </p:xfrm>
         <a:graphic>
@@ -4116,13 +4116,13 @@
           <p:nvPr>
             <p:extLst>
               <p:ext uri="{D42A27DB-BD31-4B8C-83A1-F6EECF244321}">
-                <p14:modId xmlns:p14="http://schemas.microsoft.com/office/powerpoint/2010/main" val="1256531757"/>
+                <p14:modId xmlns:p14="http://schemas.microsoft.com/office/powerpoint/2010/main" val="528310052"/>
               </p:ext>
             </p:extLst>
           </p:nvPr>
         </p:nvGraphicFramePr>
         <p:xfrm>
-          <a:off x="8495969" y="8838754"/>
+          <a:off x="8495969" y="9071831"/>
           <a:ext cx="6390389" cy="670560"/>
         </p:xfrm>
         <a:graphic>
@@ -4711,13 +4711,13 @@
           <p:nvPr>
             <p:extLst>
               <p:ext uri="{D42A27DB-BD31-4B8C-83A1-F6EECF244321}">
-                <p14:modId xmlns:p14="http://schemas.microsoft.com/office/powerpoint/2010/main" val="4234739395"/>
+                <p14:modId xmlns:p14="http://schemas.microsoft.com/office/powerpoint/2010/main" val="3919780371"/>
               </p:ext>
             </p:extLst>
           </p:nvPr>
         </p:nvGraphicFramePr>
         <p:xfrm>
-          <a:off x="8474919" y="8054166"/>
+          <a:off x="8474919" y="8287243"/>
           <a:ext cx="6390389" cy="670560"/>
         </p:xfrm>
         <a:graphic>
@@ -5365,7 +5365,7 @@
         </p:nvSpPr>
         <p:spPr>
           <a:xfrm>
-            <a:off x="16013859" y="11856994"/>
+            <a:off x="16013859" y="12090071"/>
             <a:ext cx="1374287" cy="369332"/>
           </a:xfrm>
           <a:prstGeom prst="rect">
@@ -5402,7 +5402,7 @@
         </p:nvCxnSpPr>
         <p:spPr bwMode="auto">
           <a:xfrm>
-            <a:off x="3743680" y="5115657"/>
+            <a:off x="3743680" y="5348734"/>
             <a:ext cx="12893040" cy="0"/>
           </a:xfrm>
           <a:prstGeom prst="line">
@@ -5529,7 +5529,7 @@
         </p:nvSpPr>
         <p:spPr bwMode="auto">
           <a:xfrm>
-            <a:off x="1646037" y="5786977"/>
+            <a:off x="1646037" y="6020054"/>
             <a:ext cx="4114800" cy="365760"/>
           </a:xfrm>
           <a:prstGeom prst="roundRect">
@@ -5587,7 +5587,7 @@
         </p:nvSpPr>
         <p:spPr bwMode="auto">
           <a:xfrm>
-            <a:off x="8334418" y="5794482"/>
+            <a:off x="8334418" y="6027559"/>
             <a:ext cx="4114800" cy="365760"/>
           </a:xfrm>
           <a:prstGeom prst="roundRect">
@@ -5841,7 +5841,7 @@
         </p:nvSpPr>
         <p:spPr bwMode="auto">
           <a:xfrm>
-            <a:off x="1547171" y="6246192"/>
+            <a:off x="1547171" y="6479269"/>
             <a:ext cx="4305106" cy="969496"/>
           </a:xfrm>
           <a:prstGeom prst="rect">
@@ -6066,7 +6066,7 @@
         </p:nvCxnSpPr>
         <p:spPr bwMode="auto">
           <a:xfrm>
-            <a:off x="10330683" y="4316456"/>
+            <a:off x="10332919" y="4566842"/>
             <a:ext cx="6043" cy="546950"/>
           </a:xfrm>
           <a:prstGeom prst="straightConnector1">
@@ -6338,8 +6338,8 @@
         </p:nvSpPr>
         <p:spPr bwMode="auto">
           <a:xfrm>
-            <a:off x="10534906" y="4440101"/>
-            <a:ext cx="2939790" cy="384721"/>
+            <a:off x="10534905" y="4673178"/>
+            <a:ext cx="4040483" cy="384721"/>
           </a:xfrm>
           <a:prstGeom prst="rect">
             <a:avLst/>
@@ -6506,8 +6506,16 @@
               <a:defRPr/>
             </a:pPr>
             <a:r>
+              <a:rPr lang="en-US" altLang="en-US" sz="1900" b="1" kern="0" dirty="0" err="1"/>
+              <a:t>N</a:t>
+            </a:r>
+            <a:r>
+              <a:rPr lang="en-US" altLang="en-US" sz="1900" b="1" kern="0" baseline="-25000" dirty="0" err="1"/>
+              <a:t>Adults</a:t>
+            </a:r>
+            <a:r>
               <a:rPr lang="en-US" altLang="en-US" sz="1900" b="1" kern="0" dirty="0"/>
-              <a:t>N = 3,517 participants</a:t>
+              <a:t> = 3,072 participants</a:t>
             </a:r>
           </a:p>
         </p:txBody>
@@ -6775,7 +6783,7 @@
         </p:nvSpPr>
         <p:spPr bwMode="auto">
           <a:xfrm>
-            <a:off x="7057224" y="4951569"/>
+            <a:off x="7057224" y="5184646"/>
             <a:ext cx="6691310" cy="438150"/>
           </a:xfrm>
           <a:prstGeom prst="roundRect">
@@ -6832,7 +6840,7 @@
         </p:nvSpPr>
         <p:spPr bwMode="auto">
           <a:xfrm>
-            <a:off x="8496232" y="4935893"/>
+            <a:off x="8496232" y="5168970"/>
             <a:ext cx="3539900" cy="430887"/>
           </a:xfrm>
           <a:prstGeom prst="rect">
@@ -7026,7 +7034,7 @@
         </p:nvCxnSpPr>
         <p:spPr bwMode="auto">
           <a:xfrm>
-            <a:off x="10352453" y="7560434"/>
+            <a:off x="10352453" y="7793511"/>
             <a:ext cx="0" cy="457200"/>
           </a:xfrm>
           <a:prstGeom prst="straightConnector1">
@@ -7061,7 +7069,7 @@
         </p:nvCxnSpPr>
         <p:spPr bwMode="auto">
           <a:xfrm>
-            <a:off x="3738562" y="5096632"/>
+            <a:off x="3738562" y="5329709"/>
             <a:ext cx="0" cy="640080"/>
           </a:xfrm>
           <a:prstGeom prst="straightConnector1">
@@ -7131,7 +7139,7 @@
         </p:nvCxnSpPr>
         <p:spPr bwMode="auto">
           <a:xfrm flipH="1">
-            <a:off x="17992590" y="4115063"/>
+            <a:off x="17992590" y="4348140"/>
             <a:ext cx="0" cy="254000"/>
           </a:xfrm>
           <a:prstGeom prst="line">
@@ -7168,7 +7176,7 @@
         </p:nvCxnSpPr>
         <p:spPr bwMode="auto">
           <a:xfrm flipV="1">
-            <a:off x="10319054" y="4351632"/>
+            <a:off x="10319054" y="4584709"/>
             <a:ext cx="7692460" cy="0"/>
           </a:xfrm>
           <a:prstGeom prst="line">
@@ -7205,7 +7213,7 @@
         </p:nvCxnSpPr>
         <p:spPr bwMode="auto">
           <a:xfrm>
-            <a:off x="3717663" y="10862348"/>
+            <a:off x="3717663" y="11095425"/>
             <a:ext cx="0" cy="457200"/>
           </a:xfrm>
           <a:prstGeom prst="straightConnector1">
@@ -7240,7 +7248,7 @@
         </p:nvSpPr>
         <p:spPr bwMode="auto">
           <a:xfrm>
-            <a:off x="14635527" y="5856310"/>
+            <a:off x="14635527" y="6089387"/>
             <a:ext cx="4114800" cy="365760"/>
           </a:xfrm>
           <a:prstGeom prst="roundRect">
@@ -7300,7 +7308,7 @@
         </p:nvSpPr>
         <p:spPr bwMode="auto">
           <a:xfrm>
-            <a:off x="14655263" y="6313163"/>
+            <a:off x="14655263" y="6546240"/>
             <a:ext cx="4114801" cy="969496"/>
           </a:xfrm>
           <a:prstGeom prst="rect">
@@ -7490,7 +7498,7 @@
         </p:nvSpPr>
         <p:spPr bwMode="auto">
           <a:xfrm>
-            <a:off x="8334419" y="6284219"/>
+            <a:off x="8334419" y="6517296"/>
             <a:ext cx="4114801" cy="969496"/>
           </a:xfrm>
           <a:prstGeom prst="rect">
@@ -7679,7 +7687,7 @@
         </p:nvSpPr>
         <p:spPr bwMode="auto">
           <a:xfrm>
-            <a:off x="14440884" y="8535625"/>
+            <a:off x="14440884" y="8768702"/>
             <a:ext cx="4457693" cy="384721"/>
           </a:xfrm>
           <a:prstGeom prst="rect">
@@ -7875,7 +7883,7 @@
         </p:nvCxnSpPr>
         <p:spPr bwMode="auto">
           <a:xfrm>
-            <a:off x="16603233" y="7608199"/>
+            <a:off x="16603233" y="7841276"/>
             <a:ext cx="0" cy="457200"/>
           </a:xfrm>
           <a:prstGeom prst="straightConnector1">
@@ -7912,7 +7920,7 @@
         </p:nvSpPr>
         <p:spPr bwMode="auto">
           <a:xfrm>
-            <a:off x="14374386" y="10602134"/>
+            <a:off x="14374386" y="10835211"/>
             <a:ext cx="4457693" cy="969496"/>
           </a:xfrm>
           <a:prstGeom prst="rect">
@@ -8116,7 +8124,7 @@
         </p:nvCxnSpPr>
         <p:spPr bwMode="auto">
           <a:xfrm>
-            <a:off x="16641078" y="9684907"/>
+            <a:off x="16641078" y="9917984"/>
             <a:ext cx="0" cy="457200"/>
           </a:xfrm>
           <a:prstGeom prst="straightConnector1">
@@ -8151,7 +8159,7 @@
         </p:nvCxnSpPr>
         <p:spPr bwMode="auto">
           <a:xfrm>
-            <a:off x="16629429" y="5109191"/>
+            <a:off x="16629429" y="5342268"/>
             <a:ext cx="0" cy="640080"/>
           </a:xfrm>
           <a:prstGeom prst="straightConnector1">
@@ -8186,7 +8194,7 @@
         </p:nvSpPr>
         <p:spPr>
           <a:xfrm>
-            <a:off x="1646037" y="5786982"/>
+            <a:off x="1646037" y="6020059"/>
             <a:ext cx="4114800" cy="1454229"/>
           </a:xfrm>
           <a:prstGeom prst="roundRect">
@@ -8238,7 +8246,7 @@
         </p:nvCxnSpPr>
         <p:spPr bwMode="auto">
           <a:xfrm>
-            <a:off x="3738562" y="7498907"/>
+            <a:off x="3738562" y="7731984"/>
             <a:ext cx="0" cy="457200"/>
           </a:xfrm>
           <a:prstGeom prst="straightConnector1">
@@ -8273,7 +8281,7 @@
         </p:nvSpPr>
         <p:spPr>
           <a:xfrm>
-            <a:off x="8334418" y="5854262"/>
+            <a:off x="8334418" y="6087339"/>
             <a:ext cx="4114800" cy="1454229"/>
           </a:xfrm>
           <a:prstGeom prst="roundRect">
@@ -8325,7 +8333,7 @@
         </p:nvSpPr>
         <p:spPr>
           <a:xfrm>
-            <a:off x="14639118" y="5879682"/>
+            <a:off x="14639118" y="6112759"/>
             <a:ext cx="4114800" cy="1454229"/>
           </a:xfrm>
           <a:prstGeom prst="roundRect">
@@ -8379,7 +8387,7 @@
         </p:nvCxnSpPr>
         <p:spPr bwMode="auto">
           <a:xfrm flipH="1">
-            <a:off x="10352453" y="5389720"/>
+            <a:off x="10352453" y="5622797"/>
             <a:ext cx="0" cy="397257"/>
           </a:xfrm>
           <a:prstGeom prst="straightConnector1">
@@ -8416,8 +8424,8 @@
         </p:nvSpPr>
         <p:spPr bwMode="auto">
           <a:xfrm>
-            <a:off x="5320343" y="2572228"/>
-            <a:ext cx="1631118" cy="1261884"/>
+            <a:off x="5320343" y="2800546"/>
+            <a:ext cx="1910222" cy="1261884"/>
           </a:xfrm>
           <a:prstGeom prst="rect">
             <a:avLst/>
@@ -8600,8 +8608,40 @@
               <a:defRPr/>
             </a:pPr>
             <a:r>
+              <a:rPr lang="en-US" altLang="en-US" sz="1900" b="1" kern="0" dirty="0" err="1"/>
+              <a:t>N</a:t>
+            </a:r>
+            <a:r>
+              <a:rPr lang="en-US" altLang="en-US" sz="1900" b="1" kern="0" baseline="-25000" dirty="0" err="1"/>
+              <a:t>Youths</a:t>
+            </a:r>
+            <a:r>
               <a:rPr lang="en-US" altLang="en-US" sz="1900" b="1" kern="0" dirty="0"/>
-              <a:t>(N = 36,771)</a:t>
+              <a:t> = </a:t>
+            </a:r>
+          </a:p>
+          <a:p>
+            <a:pPr algn="ctr" defTabSz="914400" eaLnBrk="0" fontAlgn="base" hangingPunct="0">
+              <a:spcBef>
+                <a:spcPct val="0"/>
+              </a:spcBef>
+              <a:spcAft>
+                <a:spcPct val="0"/>
+              </a:spcAft>
+              <a:buNone/>
+              <a:defRPr/>
+            </a:pPr>
+            <a:r>
+              <a:rPr lang="en-US" altLang="en-US" sz="1900" b="1" kern="0" dirty="0" err="1"/>
+              <a:t>N</a:t>
+            </a:r>
+            <a:r>
+              <a:rPr lang="en-US" altLang="en-US" sz="1900" b="1" kern="0" baseline="-25000" dirty="0" err="1"/>
+              <a:t>Adults</a:t>
+            </a:r>
+            <a:r>
+              <a:rPr lang="en-US" altLang="en-US" sz="1900" b="1" kern="0" dirty="0"/>
+              <a:t> = 36,771</a:t>
             </a:r>
           </a:p>
         </p:txBody>
@@ -8622,8 +8662,8 @@
         </p:nvSpPr>
         <p:spPr bwMode="auto">
           <a:xfrm>
-            <a:off x="12209418" y="2344162"/>
-            <a:ext cx="1654217" cy="1554272"/>
+            <a:off x="12209418" y="2508158"/>
+            <a:ext cx="1654217" cy="1846659"/>
           </a:xfrm>
           <a:prstGeom prst="rect">
             <a:avLst/>
@@ -8822,8 +8862,40 @@
               <a:defRPr/>
             </a:pPr>
             <a:r>
+              <a:rPr lang="en-US" altLang="en-US" sz="1900" b="1" kern="0" dirty="0" err="1"/>
+              <a:t>N</a:t>
+            </a:r>
+            <a:r>
+              <a:rPr lang="en-US" altLang="en-US" sz="1900" b="1" kern="0" baseline="-25000" dirty="0" err="1"/>
+              <a:t>Youths</a:t>
+            </a:r>
+            <a:r>
               <a:rPr lang="en-US" altLang="en-US" sz="1900" b="1" kern="0" dirty="0"/>
-              <a:t>(N = 261)</a:t>
+              <a:t> = </a:t>
+            </a:r>
+          </a:p>
+          <a:p>
+            <a:pPr algn="ctr" defTabSz="914400" eaLnBrk="0" fontAlgn="base" hangingPunct="0">
+              <a:spcBef>
+                <a:spcPct val="0"/>
+              </a:spcBef>
+              <a:spcAft>
+                <a:spcPct val="0"/>
+              </a:spcAft>
+              <a:buNone/>
+              <a:defRPr/>
+            </a:pPr>
+            <a:r>
+              <a:rPr lang="en-US" altLang="en-US" sz="1900" b="1" kern="0" dirty="0" err="1"/>
+              <a:t>N</a:t>
+            </a:r>
+            <a:r>
+              <a:rPr lang="en-US" altLang="en-US" sz="1900" b="1" kern="0" baseline="-25000" dirty="0" err="1"/>
+              <a:t>Adults</a:t>
+            </a:r>
+            <a:r>
+              <a:rPr lang="en-US" altLang="en-US" sz="1900" b="1" kern="0" dirty="0"/>
+              <a:t> = 261</a:t>
             </a:r>
           </a:p>
         </p:txBody>
@@ -8845,7 +8917,7 @@
         <p:spPr bwMode="auto">
           <a:xfrm>
             <a:off x="17032346" y="2215771"/>
-            <a:ext cx="1866231" cy="1846659"/>
+            <a:ext cx="1866231" cy="2139047"/>
           </a:xfrm>
           <a:prstGeom prst="rect">
             <a:avLst/>
@@ -9044,8 +9116,40 @@
               <a:defRPr/>
             </a:pPr>
             <a:r>
+              <a:rPr lang="en-US" altLang="en-US" sz="1900" b="1" kern="0" dirty="0" err="1"/>
+              <a:t>N</a:t>
+            </a:r>
+            <a:r>
+              <a:rPr lang="en-US" altLang="en-US" sz="1900" b="1" kern="0" baseline="-25000" dirty="0" err="1"/>
+              <a:t>Youths</a:t>
+            </a:r>
+            <a:r>
               <a:rPr lang="en-US" altLang="en-US" sz="1900" b="1" kern="0" dirty="0"/>
-              <a:t>(N = 1)</a:t>
+              <a:t> = 0 </a:t>
+            </a:r>
+          </a:p>
+          <a:p>
+            <a:pPr algn="ctr" defTabSz="914400" eaLnBrk="0" fontAlgn="base" hangingPunct="0">
+              <a:spcBef>
+                <a:spcPct val="0"/>
+              </a:spcBef>
+              <a:spcAft>
+                <a:spcPct val="0"/>
+              </a:spcAft>
+              <a:buNone/>
+              <a:defRPr/>
+            </a:pPr>
+            <a:r>
+              <a:rPr lang="en-US" altLang="en-US" sz="1900" b="1" kern="0" dirty="0" err="1"/>
+              <a:t>N</a:t>
+            </a:r>
+            <a:r>
+              <a:rPr lang="en-US" altLang="en-US" sz="1900" b="1" kern="0" baseline="-25000" dirty="0" err="1"/>
+              <a:t>Adults</a:t>
+            </a:r>
+            <a:r>
+              <a:rPr lang="en-US" altLang="en-US" sz="1900" b="1" kern="0" dirty="0"/>
+              <a:t> = 1</a:t>
             </a:r>
           </a:p>
         </p:txBody>
@@ -9067,7 +9171,7 @@
         <p:spPr bwMode="auto">
           <a:xfrm>
             <a:off x="544477" y="2214526"/>
-            <a:ext cx="1955326" cy="1846659"/>
+            <a:ext cx="1955326" cy="2139047"/>
           </a:xfrm>
           <a:prstGeom prst="rect">
             <a:avLst/>
@@ -9266,8 +9370,40 @@
               <a:defRPr/>
             </a:pPr>
             <a:r>
+              <a:rPr lang="en-US" altLang="en-US" sz="1900" b="1" kern="0" dirty="0" err="1"/>
+              <a:t>N</a:t>
+            </a:r>
+            <a:r>
+              <a:rPr lang="en-US" altLang="en-US" sz="1900" b="1" kern="0" baseline="-25000" dirty="0" err="1"/>
+              <a:t>Youths</a:t>
+            </a:r>
+            <a:r>
               <a:rPr lang="en-US" altLang="en-US" sz="1900" b="1" kern="0" dirty="0"/>
-              <a:t>(N = 50,045)</a:t>
+              <a:t> = 70,285</a:t>
+            </a:r>
+          </a:p>
+          <a:p>
+            <a:pPr algn="ctr" defTabSz="914400" eaLnBrk="0" fontAlgn="base" hangingPunct="0">
+              <a:spcBef>
+                <a:spcPct val="0"/>
+              </a:spcBef>
+              <a:spcAft>
+                <a:spcPct val="0"/>
+              </a:spcAft>
+              <a:buNone/>
+              <a:defRPr/>
+            </a:pPr>
+            <a:r>
+              <a:rPr lang="en-US" altLang="en-US" sz="1900" b="1" kern="0" dirty="0" err="1"/>
+              <a:t>N</a:t>
+            </a:r>
+            <a:r>
+              <a:rPr lang="en-US" altLang="en-US" sz="1900" b="1" kern="0" baseline="-25000" dirty="0" err="1"/>
+              <a:t>Adults</a:t>
+            </a:r>
+            <a:r>
+              <a:rPr lang="en-US" altLang="en-US" sz="1900" b="1" kern="0" dirty="0"/>
+              <a:t> = 50,045</a:t>
             </a:r>
           </a:p>
         </p:txBody>
@@ -9288,8 +9424,8 @@
         </p:nvSpPr>
         <p:spPr bwMode="auto">
           <a:xfrm>
-            <a:off x="14604312" y="2394088"/>
-            <a:ext cx="1715890" cy="1554272"/>
+            <a:off x="14604312" y="2508158"/>
+            <a:ext cx="1715890" cy="1846659"/>
           </a:xfrm>
           <a:prstGeom prst="rect">
             <a:avLst/>
@@ -9488,8 +9624,40 @@
               <a:defRPr/>
             </a:pPr>
             <a:r>
+              <a:rPr lang="en-US" altLang="en-US" sz="1900" b="1" kern="0" dirty="0" err="1"/>
+              <a:t>N</a:t>
+            </a:r>
+            <a:r>
+              <a:rPr lang="en-US" altLang="en-US" sz="1900" b="1" kern="0" baseline="-25000" dirty="0" err="1"/>
+              <a:t>Youths</a:t>
+            </a:r>
+            <a:r>
               <a:rPr lang="en-US" altLang="en-US" sz="1900" b="1" kern="0" dirty="0"/>
-              <a:t>(N = 28)</a:t>
+              <a:t> = </a:t>
+            </a:r>
+          </a:p>
+          <a:p>
+            <a:pPr algn="ctr" defTabSz="914400" eaLnBrk="0" fontAlgn="base" hangingPunct="0">
+              <a:spcBef>
+                <a:spcPct val="0"/>
+              </a:spcBef>
+              <a:spcAft>
+                <a:spcPct val="0"/>
+              </a:spcAft>
+              <a:buNone/>
+              <a:defRPr/>
+            </a:pPr>
+            <a:r>
+              <a:rPr lang="en-US" altLang="en-US" sz="1900" b="1" kern="0" dirty="0" err="1"/>
+              <a:t>N</a:t>
+            </a:r>
+            <a:r>
+              <a:rPr lang="en-US" altLang="en-US" sz="1900" b="1" kern="0" baseline="-25000" dirty="0" err="1"/>
+              <a:t>Adults</a:t>
+            </a:r>
+            <a:r>
+              <a:rPr lang="en-US" altLang="en-US" sz="1900" b="1" kern="0" dirty="0"/>
+              <a:t> = 28</a:t>
             </a:r>
           </a:p>
         </p:txBody>
@@ -9510,8 +9678,8 @@
         </p:nvSpPr>
         <p:spPr bwMode="auto">
           <a:xfrm>
-            <a:off x="9552596" y="2131470"/>
-            <a:ext cx="2062876" cy="1846659"/>
+            <a:off x="9552596" y="2215771"/>
+            <a:ext cx="2062876" cy="2139047"/>
           </a:xfrm>
           <a:prstGeom prst="rect">
             <a:avLst/>
@@ -9710,8 +9878,40 @@
               <a:defRPr/>
             </a:pPr>
             <a:r>
+              <a:rPr lang="en-US" altLang="en-US" sz="1900" b="1" kern="0" dirty="0" err="1"/>
+              <a:t>N</a:t>
+            </a:r>
+            <a:r>
+              <a:rPr lang="en-US" altLang="en-US" sz="1900" b="1" kern="0" baseline="-25000" dirty="0" err="1"/>
+              <a:t>Youths</a:t>
+            </a:r>
+            <a:r>
               <a:rPr lang="en-US" altLang="en-US" sz="1900" b="1" kern="0" dirty="0"/>
-              <a:t>(N = 4,322)</a:t>
+              <a:t> = </a:t>
+            </a:r>
+          </a:p>
+          <a:p>
+            <a:pPr algn="ctr" defTabSz="914400" eaLnBrk="0" fontAlgn="base" hangingPunct="0">
+              <a:spcBef>
+                <a:spcPct val="0"/>
+              </a:spcBef>
+              <a:spcAft>
+                <a:spcPct val="0"/>
+              </a:spcAft>
+              <a:buNone/>
+              <a:defRPr/>
+            </a:pPr>
+            <a:r>
+              <a:rPr lang="en-US" altLang="en-US" sz="1900" b="1" kern="0" dirty="0" err="1"/>
+              <a:t>N</a:t>
+            </a:r>
+            <a:r>
+              <a:rPr lang="en-US" altLang="en-US" sz="1900" b="1" kern="0" baseline="-25000" dirty="0" err="1"/>
+              <a:t>Adults</a:t>
+            </a:r>
+            <a:r>
+              <a:rPr lang="en-US" altLang="en-US" sz="1900" b="1" kern="0" dirty="0"/>
+              <a:t> = 4,322</a:t>
             </a:r>
           </a:p>
         </p:txBody>
@@ -9732,8 +9932,8 @@
         </p:nvSpPr>
         <p:spPr bwMode="auto">
           <a:xfrm>
-            <a:off x="7387495" y="2341569"/>
-            <a:ext cx="1619979" cy="1554272"/>
+            <a:off x="7387495" y="2508158"/>
+            <a:ext cx="1937819" cy="1846659"/>
           </a:xfrm>
           <a:prstGeom prst="rect">
             <a:avLst/>
@@ -9916,8 +10116,40 @@
               <a:defRPr/>
             </a:pPr>
             <a:r>
+              <a:rPr lang="en-US" altLang="en-US" sz="1900" b="1" kern="0" dirty="0" err="1"/>
+              <a:t>N</a:t>
+            </a:r>
+            <a:r>
+              <a:rPr lang="en-US" altLang="en-US" sz="1900" b="1" kern="0" baseline="-25000" dirty="0" err="1"/>
+              <a:t>Youths</a:t>
+            </a:r>
+            <a:r>
               <a:rPr lang="en-US" altLang="en-US" sz="1900" b="1" kern="0" dirty="0"/>
-              <a:t>(N = 32,459)</a:t>
+              <a:t> = </a:t>
+            </a:r>
+          </a:p>
+          <a:p>
+            <a:pPr algn="ctr" defTabSz="914400" eaLnBrk="0" fontAlgn="base" hangingPunct="0">
+              <a:spcBef>
+                <a:spcPct val="0"/>
+              </a:spcBef>
+              <a:spcAft>
+                <a:spcPct val="0"/>
+              </a:spcAft>
+              <a:buNone/>
+              <a:defRPr/>
+            </a:pPr>
+            <a:r>
+              <a:rPr lang="en-US" altLang="en-US" sz="1900" b="1" kern="0" dirty="0" err="1"/>
+              <a:t>N</a:t>
+            </a:r>
+            <a:r>
+              <a:rPr lang="en-US" altLang="en-US" sz="1900" b="1" kern="0" baseline="-25000" dirty="0" err="1"/>
+              <a:t>Adults</a:t>
+            </a:r>
+            <a:r>
+              <a:rPr lang="en-US" altLang="en-US" sz="1900" b="1" kern="0" dirty="0"/>
+              <a:t> = 32,459</a:t>
             </a:r>
           </a:p>
         </p:txBody>
@@ -9938,8 +10170,8 @@
         </p:nvSpPr>
         <p:spPr bwMode="auto">
           <a:xfrm>
-            <a:off x="2765955" y="2394690"/>
-            <a:ext cx="2536062" cy="1554272"/>
+            <a:off x="2729534" y="2508158"/>
+            <a:ext cx="2536062" cy="1846659"/>
           </a:xfrm>
           <a:prstGeom prst="rect">
             <a:avLst/>
@@ -10138,8 +10370,40 @@
               <a:defRPr/>
             </a:pPr>
             <a:r>
+              <a:rPr lang="en-US" altLang="en-US" sz="1900" b="1" kern="0" dirty="0" err="1"/>
+              <a:t>N</a:t>
+            </a:r>
+            <a:r>
+              <a:rPr lang="en-US" altLang="en-US" sz="1900" b="1" kern="0" baseline="-25000" dirty="0" err="1"/>
+              <a:t>Youths</a:t>
+            </a:r>
+            <a:r>
               <a:rPr lang="en-US" altLang="en-US" sz="1900" b="1" kern="0" dirty="0"/>
-              <a:t>(N = 5,114)</a:t>
+              <a:t> = 920</a:t>
+            </a:r>
+          </a:p>
+          <a:p>
+            <a:pPr algn="ctr" defTabSz="914400" eaLnBrk="0" fontAlgn="base" hangingPunct="0">
+              <a:spcBef>
+                <a:spcPct val="0"/>
+              </a:spcBef>
+              <a:spcAft>
+                <a:spcPct val="0"/>
+              </a:spcAft>
+              <a:buNone/>
+              <a:defRPr/>
+            </a:pPr>
+            <a:r>
+              <a:rPr lang="en-US" altLang="en-US" sz="1900" b="1" kern="0" dirty="0" err="1"/>
+              <a:t>N</a:t>
+            </a:r>
+            <a:r>
+              <a:rPr lang="en-US" altLang="en-US" sz="1900" b="1" kern="0" baseline="-25000" dirty="0" err="1"/>
+              <a:t>Adults</a:t>
+            </a:r>
+            <a:r>
+              <a:rPr lang="en-US" altLang="en-US" sz="1900" b="1" kern="0" dirty="0"/>
+              <a:t> = 5,114</a:t>
             </a:r>
           </a:p>
         </p:txBody>
@@ -10417,7 +10681,7 @@
         </p:nvSpPr>
         <p:spPr>
           <a:xfrm>
-            <a:off x="982204" y="12242615"/>
+            <a:off x="982204" y="12475692"/>
             <a:ext cx="1925207" cy="646331"/>
           </a:xfrm>
           <a:prstGeom prst="rect">
@@ -10460,7 +10724,7 @@
         </p:nvSpPr>
         <p:spPr>
           <a:xfrm>
-            <a:off x="3678345" y="13568799"/>
+            <a:off x="3678345" y="13801876"/>
             <a:ext cx="1538626" cy="369332"/>
           </a:xfrm>
           <a:prstGeom prst="rect">
@@ -10495,7 +10759,7 @@
         </p:nvSpPr>
         <p:spPr>
           <a:xfrm flipH="1">
-            <a:off x="3630241" y="11964973"/>
+            <a:off x="3630241" y="12198050"/>
             <a:ext cx="199099" cy="436374"/>
           </a:xfrm>
           <a:prstGeom prst="upArrow">
@@ -10544,7 +10808,7 @@
         </p:nvSpPr>
         <p:spPr>
           <a:xfrm>
-            <a:off x="3624635" y="12411507"/>
+            <a:off x="3624635" y="12644584"/>
             <a:ext cx="199098" cy="183303"/>
           </a:xfrm>
           <a:prstGeom prst="ellipse">
@@ -10598,7 +10862,7 @@
         </p:nvSpPr>
         <p:spPr>
           <a:xfrm rot="10800000" flipH="1">
-            <a:off x="3618115" y="12609153"/>
+            <a:off x="3618115" y="12842230"/>
             <a:ext cx="199099" cy="436374"/>
           </a:xfrm>
           <a:prstGeom prst="upArrow">
@@ -10653,7 +10917,7 @@
         </p:nvCxnSpPr>
         <p:spPr bwMode="auto">
           <a:xfrm>
-            <a:off x="3063746" y="13327462"/>
+            <a:off x="3063746" y="13560539"/>
             <a:ext cx="2397301" cy="0"/>
           </a:xfrm>
           <a:prstGeom prst="line">
@@ -10690,7 +10954,7 @@
         </p:nvCxnSpPr>
         <p:spPr bwMode="auto">
           <a:xfrm flipV="1">
-            <a:off x="3063745" y="11924231"/>
+            <a:off x="3063745" y="12157308"/>
             <a:ext cx="0" cy="1423077"/>
           </a:xfrm>
           <a:prstGeom prst="line">
@@ -10725,7 +10989,7 @@
         </p:nvSpPr>
         <p:spPr>
           <a:xfrm>
-            <a:off x="3815737" y="11749312"/>
+            <a:off x="3815737" y="11982389"/>
             <a:ext cx="1144865" cy="369332"/>
           </a:xfrm>
           <a:prstGeom prst="rect">
@@ -10769,7 +11033,7 @@
         </p:nvSpPr>
         <p:spPr>
           <a:xfrm>
-            <a:off x="3815447" y="12757568"/>
+            <a:off x="3815447" y="12990645"/>
             <a:ext cx="1175322" cy="369332"/>
           </a:xfrm>
           <a:prstGeom prst="rect">
@@ -10813,7 +11077,7 @@
         </p:nvSpPr>
         <p:spPr>
           <a:xfrm>
-            <a:off x="3827420" y="12287095"/>
+            <a:off x="3827420" y="12520172"/>
             <a:ext cx="699230" cy="369332"/>
           </a:xfrm>
           <a:prstGeom prst="rect">
@@ -10853,7 +11117,7 @@
         </p:nvSpPr>
         <p:spPr>
           <a:xfrm>
-            <a:off x="86927" y="7994741"/>
+            <a:off x="86927" y="8227818"/>
             <a:ext cx="442750" cy="369332"/>
           </a:xfrm>
           <a:prstGeom prst="rect">
@@ -10888,7 +11152,7 @@
         </p:nvSpPr>
         <p:spPr>
           <a:xfrm>
-            <a:off x="85370" y="8832963"/>
+            <a:off x="85370" y="9066040"/>
             <a:ext cx="442750" cy="369332"/>
           </a:xfrm>
           <a:prstGeom prst="rect">
@@ -10923,7 +11187,7 @@
         </p:nvSpPr>
         <p:spPr>
           <a:xfrm>
-            <a:off x="4806296" y="11829895"/>
+            <a:off x="4806296" y="12062972"/>
             <a:ext cx="442750" cy="369332"/>
           </a:xfrm>
           <a:prstGeom prst="rect">
@@ -10958,7 +11222,7 @@
         </p:nvSpPr>
         <p:spPr>
           <a:xfrm>
-            <a:off x="4806296" y="12836677"/>
+            <a:off x="4806296" y="13069754"/>
             <a:ext cx="442750" cy="369332"/>
           </a:xfrm>
           <a:prstGeom prst="rect">
@@ -10993,7 +11257,7 @@
         </p:nvSpPr>
         <p:spPr>
           <a:xfrm>
-            <a:off x="4805650" y="12320415"/>
+            <a:off x="4805650" y="12553492"/>
             <a:ext cx="442750" cy="369332"/>
           </a:xfrm>
           <a:prstGeom prst="rect">
@@ -11028,7 +11292,7 @@
         </p:nvSpPr>
         <p:spPr>
           <a:xfrm>
-            <a:off x="7697406" y="7994741"/>
+            <a:off x="7697406" y="8227818"/>
             <a:ext cx="442750" cy="369332"/>
           </a:xfrm>
           <a:prstGeom prst="rect">
@@ -11063,7 +11327,7 @@
         </p:nvSpPr>
         <p:spPr>
           <a:xfrm>
-            <a:off x="7703210" y="8832963"/>
+            <a:off x="7703210" y="9066040"/>
             <a:ext cx="442750" cy="369332"/>
           </a:xfrm>
           <a:prstGeom prst="rect">
@@ -11098,7 +11362,7 @@
         </p:nvSpPr>
         <p:spPr>
           <a:xfrm>
-            <a:off x="7256152" y="12226730"/>
+            <a:off x="7256152" y="12459807"/>
             <a:ext cx="1925207" cy="646331"/>
           </a:xfrm>
           <a:prstGeom prst="rect">
@@ -11141,7 +11405,7 @@
         </p:nvSpPr>
         <p:spPr>
           <a:xfrm flipH="1">
-            <a:off x="9453617" y="11949088"/>
+            <a:off x="9453617" y="12182165"/>
             <a:ext cx="199099" cy="436374"/>
           </a:xfrm>
           <a:prstGeom prst="upArrow">
@@ -11190,7 +11454,7 @@
         </p:nvSpPr>
         <p:spPr>
           <a:xfrm>
-            <a:off x="9448011" y="12395622"/>
+            <a:off x="9448011" y="12628699"/>
             <a:ext cx="199098" cy="183303"/>
           </a:xfrm>
           <a:prstGeom prst="ellipse">
@@ -11244,7 +11508,7 @@
         </p:nvSpPr>
         <p:spPr>
           <a:xfrm rot="10800000" flipH="1">
-            <a:off x="9441491" y="12593268"/>
+            <a:off x="9441491" y="12826345"/>
             <a:ext cx="199099" cy="436374"/>
           </a:xfrm>
           <a:prstGeom prst="upArrow">
@@ -11295,7 +11559,7 @@
         </p:nvCxnSpPr>
         <p:spPr bwMode="auto">
           <a:xfrm>
-            <a:off x="9218425" y="13311577"/>
+            <a:off x="9218425" y="13544654"/>
             <a:ext cx="3320430" cy="0"/>
           </a:xfrm>
           <a:prstGeom prst="line">
@@ -11332,7 +11596,7 @@
         </p:nvCxnSpPr>
         <p:spPr bwMode="auto">
           <a:xfrm flipV="1">
-            <a:off x="9218425" y="11908346"/>
+            <a:off x="9218425" y="12141423"/>
             <a:ext cx="0" cy="1423077"/>
           </a:xfrm>
           <a:prstGeom prst="line">
@@ -11369,7 +11633,7 @@
         </p:nvCxnSpPr>
         <p:spPr bwMode="auto">
           <a:xfrm>
-            <a:off x="10262753" y="10912612"/>
+            <a:off x="10262753" y="11145689"/>
             <a:ext cx="0" cy="457200"/>
           </a:xfrm>
           <a:prstGeom prst="straightConnector1">
@@ -11404,7 +11668,7 @@
         </p:nvSpPr>
         <p:spPr>
           <a:xfrm>
-            <a:off x="10268017" y="13662023"/>
+            <a:off x="10268017" y="13895100"/>
             <a:ext cx="1253998" cy="646331"/>
           </a:xfrm>
           <a:prstGeom prst="rect">
@@ -11447,7 +11711,7 @@
         </p:nvSpPr>
         <p:spPr>
           <a:xfrm flipH="1">
-            <a:off x="11197626" y="11801199"/>
+            <a:off x="11197626" y="12034276"/>
             <a:ext cx="193465" cy="670560"/>
           </a:xfrm>
           <a:prstGeom prst="upArrow">
@@ -11496,7 +11760,7 @@
         </p:nvSpPr>
         <p:spPr>
           <a:xfrm>
-            <a:off x="11192021" y="12481919"/>
+            <a:off x="11192021" y="12714996"/>
             <a:ext cx="199098" cy="183303"/>
           </a:xfrm>
           <a:prstGeom prst="ellipse">
@@ -11550,7 +11814,7 @@
         </p:nvSpPr>
         <p:spPr>
           <a:xfrm rot="10800000" flipH="1">
-            <a:off x="11185501" y="12679566"/>
+            <a:off x="11185501" y="12912643"/>
             <a:ext cx="220963" cy="311375"/>
           </a:xfrm>
           <a:prstGeom prst="upArrow">
@@ -11599,7 +11863,7 @@
         </p:nvSpPr>
         <p:spPr>
           <a:xfrm>
-            <a:off x="9842808" y="13347586"/>
+            <a:off x="9842808" y="13580663"/>
             <a:ext cx="300082" cy="369332"/>
           </a:xfrm>
           <a:prstGeom prst="rect">
@@ -11634,7 +11898,7 @@
         </p:nvSpPr>
         <p:spPr>
           <a:xfrm>
-            <a:off x="11501404" y="13329831"/>
+            <a:off x="11501404" y="13562908"/>
             <a:ext cx="255198" cy="369332"/>
           </a:xfrm>
           <a:prstGeom prst="rect">
@@ -11669,7 +11933,7 @@
         </p:nvSpPr>
         <p:spPr>
           <a:xfrm>
-            <a:off x="9720178" y="11796855"/>
+            <a:off x="9720178" y="12029932"/>
             <a:ext cx="1144865" cy="369332"/>
           </a:xfrm>
           <a:prstGeom prst="rect">
@@ -11713,7 +11977,7 @@
         </p:nvSpPr>
         <p:spPr>
           <a:xfrm>
-            <a:off x="9719888" y="12805111"/>
+            <a:off x="9719888" y="13038188"/>
             <a:ext cx="1175322" cy="369332"/>
           </a:xfrm>
           <a:prstGeom prst="rect">
@@ -11757,7 +12021,7 @@
         </p:nvSpPr>
         <p:spPr>
           <a:xfrm>
-            <a:off x="9731861" y="12334638"/>
+            <a:off x="9731861" y="12567715"/>
             <a:ext cx="699230" cy="369332"/>
           </a:xfrm>
           <a:prstGeom prst="rect">
@@ -11797,7 +12061,7 @@
         </p:nvSpPr>
         <p:spPr>
           <a:xfrm>
-            <a:off x="11501694" y="11827424"/>
+            <a:off x="11501694" y="12060501"/>
             <a:ext cx="1144865" cy="369332"/>
           </a:xfrm>
           <a:prstGeom prst="rect">
@@ -11841,7 +12105,7 @@
         </p:nvSpPr>
         <p:spPr>
           <a:xfrm>
-            <a:off x="11501404" y="12835680"/>
+            <a:off x="11501404" y="13068757"/>
             <a:ext cx="1175322" cy="369332"/>
           </a:xfrm>
           <a:prstGeom prst="rect">
@@ -11885,7 +12149,7 @@
         </p:nvSpPr>
         <p:spPr>
           <a:xfrm>
-            <a:off x="11513377" y="12365207"/>
+            <a:off x="11513377" y="12598284"/>
             <a:ext cx="699230" cy="369332"/>
           </a:xfrm>
           <a:prstGeom prst="rect">
@@ -11925,7 +12189,7 @@
         </p:nvSpPr>
         <p:spPr>
           <a:xfrm>
-            <a:off x="12491935" y="12412195"/>
+            <a:off x="12491935" y="12645272"/>
             <a:ext cx="442750" cy="369332"/>
           </a:xfrm>
           <a:prstGeom prst="rect">
@@ -11960,7 +12224,7 @@
         </p:nvSpPr>
         <p:spPr>
           <a:xfrm>
-            <a:off x="12500434" y="12844977"/>
+            <a:off x="12500434" y="13078054"/>
             <a:ext cx="442750" cy="369332"/>
           </a:xfrm>
           <a:prstGeom prst="rect">
@@ -11995,7 +12259,7 @@
         </p:nvSpPr>
         <p:spPr>
           <a:xfrm>
-            <a:off x="12487400" y="11868660"/>
+            <a:off x="12487400" y="12101737"/>
             <a:ext cx="442750" cy="369332"/>
           </a:xfrm>
           <a:prstGeom prst="rect">
@@ -12030,7 +12294,7 @@
         </p:nvSpPr>
         <p:spPr>
           <a:xfrm>
-            <a:off x="10702851" y="11868660"/>
+            <a:off x="10702851" y="12101737"/>
             <a:ext cx="442750" cy="369332"/>
           </a:xfrm>
           <a:prstGeom prst="rect">
@@ -12065,7 +12329,7 @@
         </p:nvSpPr>
         <p:spPr>
           <a:xfrm>
-            <a:off x="10695212" y="12844977"/>
+            <a:off x="10695212" y="13078054"/>
             <a:ext cx="442750" cy="369332"/>
           </a:xfrm>
           <a:prstGeom prst="rect">
@@ -12100,7 +12364,7 @@
         </p:nvSpPr>
         <p:spPr>
           <a:xfrm>
-            <a:off x="10695212" y="12372788"/>
+            <a:off x="10695212" y="12605865"/>
             <a:ext cx="442750" cy="369332"/>
           </a:xfrm>
           <a:prstGeom prst="rect">
@@ -12135,7 +12399,7 @@
         </p:nvSpPr>
         <p:spPr>
           <a:xfrm>
-            <a:off x="14057975" y="12703970"/>
+            <a:off x="14057975" y="12937047"/>
             <a:ext cx="958917" cy="369332"/>
           </a:xfrm>
           <a:prstGeom prst="rect">
@@ -12172,7 +12436,7 @@
         </p:nvCxnSpPr>
         <p:spPr bwMode="auto">
           <a:xfrm>
-            <a:off x="15068573" y="13246096"/>
+            <a:off x="15068573" y="13479173"/>
             <a:ext cx="3320430" cy="0"/>
           </a:xfrm>
           <a:prstGeom prst="line">
@@ -12209,7 +12473,7 @@
         </p:nvCxnSpPr>
         <p:spPr bwMode="auto">
           <a:xfrm flipV="1">
-            <a:off x="15068573" y="11848932"/>
+            <a:off x="15068573" y="12082009"/>
             <a:ext cx="0" cy="1423077"/>
           </a:xfrm>
           <a:prstGeom prst="line">
@@ -12244,7 +12508,7 @@
         </p:nvSpPr>
         <p:spPr>
           <a:xfrm>
-            <a:off x="15119004" y="13563334"/>
+            <a:off x="15119004" y="13796411"/>
             <a:ext cx="3099503" cy="369332"/>
           </a:xfrm>
           <a:prstGeom prst="rect">
@@ -12285,7 +12549,7 @@
         </p:nvCxnSpPr>
         <p:spPr>
           <a:xfrm>
-            <a:off x="15747755" y="12239102"/>
+            <a:off x="15747755" y="12472179"/>
             <a:ext cx="1922888" cy="0"/>
           </a:xfrm>
           <a:prstGeom prst="line">
@@ -12326,7 +12590,7 @@
         </p:nvSpPr>
         <p:spPr>
           <a:xfrm>
-            <a:off x="15367129" y="12219242"/>
+            <a:off x="15367129" y="12452319"/>
             <a:ext cx="442750" cy="369332"/>
           </a:xfrm>
           <a:prstGeom prst="rect">
@@ -12361,7 +12625,7 @@
         </p:nvSpPr>
         <p:spPr>
           <a:xfrm>
-            <a:off x="17622713" y="12200672"/>
+            <a:off x="17622713" y="12433749"/>
             <a:ext cx="442750" cy="369332"/>
           </a:xfrm>
           <a:prstGeom prst="rect">
@@ -12398,7 +12662,7 @@
         </p:nvCxnSpPr>
         <p:spPr>
           <a:xfrm flipV="1">
-            <a:off x="15790848" y="12410457"/>
+            <a:off x="15790848" y="12643534"/>
             <a:ext cx="1828800" cy="2721"/>
           </a:xfrm>
           <a:prstGeom prst="line">
@@ -12439,7 +12703,7 @@
         </p:nvSpPr>
         <p:spPr>
           <a:xfrm>
-            <a:off x="15367129" y="11945210"/>
+            <a:off x="15367129" y="12178287"/>
             <a:ext cx="442750" cy="369332"/>
           </a:xfrm>
           <a:prstGeom prst="rect">
@@ -12474,7 +12738,7 @@
         </p:nvSpPr>
         <p:spPr>
           <a:xfrm>
-            <a:off x="17622713" y="11945210"/>
+            <a:off x="17622713" y="12178287"/>
             <a:ext cx="442750" cy="369332"/>
           </a:xfrm>
           <a:prstGeom prst="rect">
@@ -12510,13 +12774,13 @@
           <p:nvPr>
             <p:extLst>
               <p:ext uri="{D42A27DB-BD31-4B8C-83A1-F6EECF244321}">
-                <p14:modId xmlns:p14="http://schemas.microsoft.com/office/powerpoint/2010/main" val="3237258231"/>
+                <p14:modId xmlns:p14="http://schemas.microsoft.com/office/powerpoint/2010/main" val="694943874"/>
               </p:ext>
             </p:extLst>
           </p:nvPr>
         </p:nvGraphicFramePr>
         <p:xfrm>
-          <a:off x="480830" y="9662366"/>
+          <a:off x="480830" y="9895443"/>
           <a:ext cx="6576394" cy="670560"/>
         </p:xfrm>
         <a:graphic>
@@ -13044,7 +13308,7 @@
         </p:nvSpPr>
         <p:spPr>
           <a:xfrm>
-            <a:off x="104767" y="9691624"/>
+            <a:off x="104767" y="9924701"/>
             <a:ext cx="442750" cy="369332"/>
           </a:xfrm>
           <a:prstGeom prst="rect">
@@ -13080,13 +13344,13 @@
           <p:nvPr>
             <p:extLst>
               <p:ext uri="{D42A27DB-BD31-4B8C-83A1-F6EECF244321}">
-                <p14:modId xmlns:p14="http://schemas.microsoft.com/office/powerpoint/2010/main" val="1905873387"/>
+                <p14:modId xmlns:p14="http://schemas.microsoft.com/office/powerpoint/2010/main" val="3601464748"/>
               </p:ext>
             </p:extLst>
           </p:nvPr>
         </p:nvGraphicFramePr>
         <p:xfrm>
-          <a:off x="7882285" y="9662366"/>
+          <a:off x="7882285" y="9895443"/>
           <a:ext cx="7004073" cy="670560"/>
         </p:xfrm>
         <a:graphic>
@@ -13659,7 +13923,7 @@
         </p:nvSpPr>
         <p:spPr>
           <a:xfrm>
-            <a:off x="7697406" y="9691624"/>
+            <a:off x="7697406" y="9924701"/>
             <a:ext cx="442750" cy="369332"/>
           </a:xfrm>
           <a:prstGeom prst="rect">
@@ -13694,7 +13958,7 @@
         </p:nvSpPr>
         <p:spPr>
           <a:xfrm>
-            <a:off x="15367129" y="12734963"/>
+            <a:off x="15367129" y="12968040"/>
             <a:ext cx="442750" cy="369332"/>
           </a:xfrm>
           <a:prstGeom prst="rect">
@@ -13729,7 +13993,7 @@
         </p:nvSpPr>
         <p:spPr>
           <a:xfrm>
-            <a:off x="17622713" y="12734963"/>
+            <a:off x="17622713" y="12968040"/>
             <a:ext cx="442750" cy="369332"/>
           </a:xfrm>
           <a:prstGeom prst="rect">
@@ -13766,7 +14030,7 @@
         </p:nvCxnSpPr>
         <p:spPr>
           <a:xfrm flipV="1">
-            <a:off x="15809879" y="12911163"/>
+            <a:off x="15809879" y="13144240"/>
             <a:ext cx="1712355" cy="2721"/>
           </a:xfrm>
           <a:prstGeom prst="line">
@@ -13807,7 +14071,7 @@
         </p:nvSpPr>
         <p:spPr>
           <a:xfrm>
-            <a:off x="13863635" y="12111011"/>
+            <a:off x="13863635" y="12344088"/>
             <a:ext cx="1215333" cy="369332"/>
           </a:xfrm>
           <a:prstGeom prst="rect">
@@ -13824,6 +14088,204 @@
             <a:r>
               <a:rPr lang="en-US" dirty="0"/>
               <a:t>All Women</a:t>
+            </a:r>
+          </a:p>
+        </p:txBody>
+      </p:sp>
+      <p:sp>
+        <p:nvSpPr>
+          <p:cNvPr id="42" name="TextBox 51">
+            <a:extLst>
+              <a:ext uri="{FF2B5EF4-FFF2-40B4-BE49-F238E27FC236}">
+                <a16:creationId xmlns:a16="http://schemas.microsoft.com/office/drawing/2014/main" id="{20076719-F952-BE43-FA12-C2C62FCE12C4}"/>
+              </a:ext>
+            </a:extLst>
+          </p:cNvPr>
+          <p:cNvSpPr txBox="1">
+            <a:spLocks noChangeArrowheads="1"/>
+          </p:cNvSpPr>
+          <p:nvPr/>
+        </p:nvSpPr>
+        <p:spPr bwMode="auto">
+          <a:xfrm>
+            <a:off x="7031041" y="4673178"/>
+            <a:ext cx="4040483" cy="384721"/>
+          </a:xfrm>
+          <a:prstGeom prst="rect">
+            <a:avLst/>
+          </a:prstGeom>
+          <a:noFill/>
+          <a:ln>
+            <a:noFill/>
+          </a:ln>
+          <a:extLst>
+            <a:ext uri="{909E8E84-426E-40DD-AFC4-6F175D3DCCD1}">
+              <a14:hiddenFill xmlns:a14="http://schemas.microsoft.com/office/drawing/2010/main">
+                <a:solidFill>
+                  <a:srgbClr val="FFFFFF"/>
+                </a:solidFill>
+              </a14:hiddenFill>
+            </a:ext>
+            <a:ext uri="{91240B29-F687-4F45-9708-019B960494DF}">
+              <a14:hiddenLine xmlns:a14="http://schemas.microsoft.com/office/drawing/2010/main" w="9525">
+                <a:solidFill>
+                  <a:srgbClr val="000000"/>
+                </a:solidFill>
+                <a:miter lim="800000"/>
+                <a:headEnd/>
+                <a:tailEnd/>
+              </a14:hiddenLine>
+            </a:ext>
+          </a:extLst>
+        </p:spPr>
+        <p:txBody>
+          <a:bodyPr wrap="square">
+            <a:spAutoFit/>
+          </a:bodyPr>
+          <a:lstStyle>
+            <a:lvl1pPr>
+              <a:spcBef>
+                <a:spcPct val="20000"/>
+              </a:spcBef>
+              <a:buChar char="•"/>
+              <a:defRPr sz="11500">
+                <a:solidFill>
+                  <a:schemeClr val="tx1"/>
+                </a:solidFill>
+                <a:latin typeface="Arial" panose="020B0604020202020204" pitchFamily="34" charset="0"/>
+              </a:defRPr>
+            </a:lvl1pPr>
+            <a:lvl2pPr marL="742950" indent="-285750">
+              <a:spcBef>
+                <a:spcPct val="20000"/>
+              </a:spcBef>
+              <a:buChar char="–"/>
+              <a:defRPr sz="10000">
+                <a:solidFill>
+                  <a:schemeClr val="tx1"/>
+                </a:solidFill>
+                <a:latin typeface="Arial" panose="020B0604020202020204" pitchFamily="34" charset="0"/>
+              </a:defRPr>
+            </a:lvl2pPr>
+            <a:lvl3pPr marL="1143000" indent="-228600">
+              <a:spcBef>
+                <a:spcPct val="20000"/>
+              </a:spcBef>
+              <a:buChar char="•"/>
+              <a:defRPr sz="8600">
+                <a:solidFill>
+                  <a:schemeClr val="tx1"/>
+                </a:solidFill>
+                <a:latin typeface="Arial" panose="020B0604020202020204" pitchFamily="34" charset="0"/>
+              </a:defRPr>
+            </a:lvl3pPr>
+            <a:lvl4pPr marL="1600200" indent="-228600">
+              <a:spcBef>
+                <a:spcPct val="20000"/>
+              </a:spcBef>
+              <a:buChar char="–"/>
+              <a:defRPr sz="7200">
+                <a:solidFill>
+                  <a:schemeClr val="tx1"/>
+                </a:solidFill>
+                <a:latin typeface="Arial" panose="020B0604020202020204" pitchFamily="34" charset="0"/>
+              </a:defRPr>
+            </a:lvl4pPr>
+            <a:lvl5pPr marL="2057400" indent="-228600">
+              <a:spcBef>
+                <a:spcPct val="20000"/>
+              </a:spcBef>
+              <a:buChar char="»"/>
+              <a:defRPr sz="7200">
+                <a:solidFill>
+                  <a:schemeClr val="tx1"/>
+                </a:solidFill>
+                <a:latin typeface="Arial" panose="020B0604020202020204" pitchFamily="34" charset="0"/>
+              </a:defRPr>
+            </a:lvl5pPr>
+            <a:lvl6pPr marL="2514600" indent="-228600" eaLnBrk="0" fontAlgn="base" hangingPunct="0">
+              <a:spcBef>
+                <a:spcPct val="20000"/>
+              </a:spcBef>
+              <a:spcAft>
+                <a:spcPct val="0"/>
+              </a:spcAft>
+              <a:buChar char="»"/>
+              <a:defRPr sz="7200">
+                <a:solidFill>
+                  <a:schemeClr val="tx1"/>
+                </a:solidFill>
+                <a:latin typeface="Arial" panose="020B0604020202020204" pitchFamily="34" charset="0"/>
+              </a:defRPr>
+            </a:lvl6pPr>
+            <a:lvl7pPr marL="2971800" indent="-228600" eaLnBrk="0" fontAlgn="base" hangingPunct="0">
+              <a:spcBef>
+                <a:spcPct val="20000"/>
+              </a:spcBef>
+              <a:spcAft>
+                <a:spcPct val="0"/>
+              </a:spcAft>
+              <a:buChar char="»"/>
+              <a:defRPr sz="7200">
+                <a:solidFill>
+                  <a:schemeClr val="tx1"/>
+                </a:solidFill>
+                <a:latin typeface="Arial" panose="020B0604020202020204" pitchFamily="34" charset="0"/>
+              </a:defRPr>
+            </a:lvl7pPr>
+            <a:lvl8pPr marL="3429000" indent="-228600" eaLnBrk="0" fontAlgn="base" hangingPunct="0">
+              <a:spcBef>
+                <a:spcPct val="20000"/>
+              </a:spcBef>
+              <a:spcAft>
+                <a:spcPct val="0"/>
+              </a:spcAft>
+              <a:buChar char="»"/>
+              <a:defRPr sz="7200">
+                <a:solidFill>
+                  <a:schemeClr val="tx1"/>
+                </a:solidFill>
+                <a:latin typeface="Arial" panose="020B0604020202020204" pitchFamily="34" charset="0"/>
+              </a:defRPr>
+            </a:lvl8pPr>
+            <a:lvl9pPr marL="3886200" indent="-228600" eaLnBrk="0" fontAlgn="base" hangingPunct="0">
+              <a:spcBef>
+                <a:spcPct val="20000"/>
+              </a:spcBef>
+              <a:spcAft>
+                <a:spcPct val="0"/>
+              </a:spcAft>
+              <a:buChar char="»"/>
+              <a:defRPr sz="7200">
+                <a:solidFill>
+                  <a:schemeClr val="tx1"/>
+                </a:solidFill>
+                <a:latin typeface="Arial" panose="020B0604020202020204" pitchFamily="34" charset="0"/>
+              </a:defRPr>
+            </a:lvl9pPr>
+          </a:lstStyle>
+          <a:p>
+            <a:pPr defTabSz="914400" eaLnBrk="0" fontAlgn="base" hangingPunct="0">
+              <a:spcBef>
+                <a:spcPct val="0"/>
+              </a:spcBef>
+              <a:spcAft>
+                <a:spcPct val="0"/>
+              </a:spcAft>
+              <a:buNone/>
+              <a:defRPr/>
+            </a:pPr>
+            <a:r>
+              <a:rPr lang="en-US" altLang="en-US" sz="1900" b="1" kern="0" dirty="0" err="1"/>
+              <a:t>N</a:t>
+            </a:r>
+            <a:r>
+              <a:rPr lang="en-US" altLang="en-US" sz="1900" b="1" kern="0" baseline="-25000" dirty="0" err="1"/>
+              <a:t>Youths</a:t>
+            </a:r>
+            <a:r>
+              <a:rPr lang="en-US" altLang="en-US" sz="1900" b="1" kern="0" dirty="0"/>
+              <a:t> = 1,245 participants</a:t>
             </a:r>
           </a:p>
         </p:txBody>

</xml_diff>

<commit_message>
update adult and child counts and figure
</commit_message>
<xml_diff>
--- a/Workflow Figure - Weight Perception BP3 1a_SZ_v3.pptx
+++ b/Workflow Figure - Weight Perception BP3 1a_SZ_v3.pptx
@@ -243,7 +243,7 @@
           <a:p>
             <a:fld id="{3A8AD564-B736-0C45-B96E-1A374E4A831F}" type="datetimeFigureOut">
               <a:rPr lang="en-US" smtClean="0"/>
-              <a:t>1/21/24</a:t>
+              <a:t>1/24/24</a:t>
             </a:fld>
             <a:endParaRPr lang="en-US"/>
           </a:p>
@@ -413,7 +413,7 @@
           <a:p>
             <a:fld id="{3A8AD564-B736-0C45-B96E-1A374E4A831F}" type="datetimeFigureOut">
               <a:rPr lang="en-US" smtClean="0"/>
-              <a:t>1/21/24</a:t>
+              <a:t>1/24/24</a:t>
             </a:fld>
             <a:endParaRPr lang="en-US"/>
           </a:p>
@@ -593,7 +593,7 @@
           <a:p>
             <a:fld id="{3A8AD564-B736-0C45-B96E-1A374E4A831F}" type="datetimeFigureOut">
               <a:rPr lang="en-US" smtClean="0"/>
-              <a:t>1/21/24</a:t>
+              <a:t>1/24/24</a:t>
             </a:fld>
             <a:endParaRPr lang="en-US"/>
           </a:p>
@@ -763,7 +763,7 @@
           <a:p>
             <a:fld id="{3A8AD564-B736-0C45-B96E-1A374E4A831F}" type="datetimeFigureOut">
               <a:rPr lang="en-US" smtClean="0"/>
-              <a:t>1/21/24</a:t>
+              <a:t>1/24/24</a:t>
             </a:fld>
             <a:endParaRPr lang="en-US"/>
           </a:p>
@@ -1007,7 +1007,7 @@
           <a:p>
             <a:fld id="{3A8AD564-B736-0C45-B96E-1A374E4A831F}" type="datetimeFigureOut">
               <a:rPr lang="en-US" smtClean="0"/>
-              <a:t>1/21/24</a:t>
+              <a:t>1/24/24</a:t>
             </a:fld>
             <a:endParaRPr lang="en-US"/>
           </a:p>
@@ -1239,7 +1239,7 @@
           <a:p>
             <a:fld id="{3A8AD564-B736-0C45-B96E-1A374E4A831F}" type="datetimeFigureOut">
               <a:rPr lang="en-US" smtClean="0"/>
-              <a:t>1/21/24</a:t>
+              <a:t>1/24/24</a:t>
             </a:fld>
             <a:endParaRPr lang="en-US"/>
           </a:p>
@@ -1606,7 +1606,7 @@
           <a:p>
             <a:fld id="{3A8AD564-B736-0C45-B96E-1A374E4A831F}" type="datetimeFigureOut">
               <a:rPr lang="en-US" smtClean="0"/>
-              <a:t>1/21/24</a:t>
+              <a:t>1/24/24</a:t>
             </a:fld>
             <a:endParaRPr lang="en-US"/>
           </a:p>
@@ -1724,7 +1724,7 @@
           <a:p>
             <a:fld id="{3A8AD564-B736-0C45-B96E-1A374E4A831F}" type="datetimeFigureOut">
               <a:rPr lang="en-US" smtClean="0"/>
-              <a:t>1/21/24</a:t>
+              <a:t>1/24/24</a:t>
             </a:fld>
             <a:endParaRPr lang="en-US"/>
           </a:p>
@@ -1819,7 +1819,7 @@
           <a:p>
             <a:fld id="{3A8AD564-B736-0C45-B96E-1A374E4A831F}" type="datetimeFigureOut">
               <a:rPr lang="en-US" smtClean="0"/>
-              <a:t>1/21/24</a:t>
+              <a:t>1/24/24</a:t>
             </a:fld>
             <a:endParaRPr lang="en-US"/>
           </a:p>
@@ -2096,7 +2096,7 @@
           <a:p>
             <a:fld id="{3A8AD564-B736-0C45-B96E-1A374E4A831F}" type="datetimeFigureOut">
               <a:rPr lang="en-US" smtClean="0"/>
-              <a:t>1/21/24</a:t>
+              <a:t>1/24/24</a:t>
             </a:fld>
             <a:endParaRPr lang="en-US"/>
           </a:p>
@@ -2353,7 +2353,7 @@
           <a:p>
             <a:fld id="{3A8AD564-B736-0C45-B96E-1A374E4A831F}" type="datetimeFigureOut">
               <a:rPr lang="en-US" smtClean="0"/>
-              <a:t>1/21/24</a:t>
+              <a:t>1/24/24</a:t>
             </a:fld>
             <a:endParaRPr lang="en-US"/>
           </a:p>
@@ -2566,7 +2566,7 @@
           <a:p>
             <a:fld id="{3A8AD564-B736-0C45-B96E-1A374E4A831F}" type="datetimeFigureOut">
               <a:rPr lang="en-US" smtClean="0"/>
-              <a:t>1/21/24</a:t>
+              <a:t>1/24/24</a:t>
             </a:fld>
             <a:endParaRPr lang="en-US"/>
           </a:p>
@@ -6148,8 +6148,8 @@
         </p:nvSpPr>
         <p:spPr bwMode="auto">
           <a:xfrm>
-            <a:off x="13775573" y="415457"/>
-            <a:ext cx="3088834" cy="400110"/>
+            <a:off x="13748534" y="250135"/>
+            <a:ext cx="4028212" cy="707886"/>
           </a:xfrm>
           <a:prstGeom prst="rect">
             <a:avLst/>
@@ -6316,8 +6316,44 @@
               <a:defRPr/>
             </a:pPr>
             <a:r>
+              <a:rPr lang="en-US" altLang="en-US" sz="2000" b="1" kern="0" dirty="0" err="1"/>
+              <a:t>N</a:t>
+            </a:r>
+            <a:r>
+              <a:rPr lang="en-US" altLang="en-US" sz="2000" b="1" kern="0" baseline="-25000" dirty="0" err="1"/>
+              <a:t>Adults</a:t>
+            </a:r>
+            <a:r>
               <a:rPr lang="en-US" altLang="en-US" sz="2000" b="1" kern="0" dirty="0"/>
-              <a:t>N = 132,518 participants</a:t>
+              <a:t> = 63,592 participants</a:t>
+            </a:r>
+          </a:p>
+          <a:p>
+            <a:pPr defTabSz="914400" eaLnBrk="0" fontAlgn="base" hangingPunct="0">
+              <a:spcBef>
+                <a:spcPct val="0"/>
+              </a:spcBef>
+              <a:spcAft>
+                <a:spcPct val="0"/>
+              </a:spcAft>
+              <a:buNone/>
+              <a:defRPr/>
+            </a:pPr>
+            <a:r>
+              <a:rPr lang="en-US" altLang="en-US" sz="2000" b="1" kern="0" dirty="0" err="1"/>
+              <a:t>N</a:t>
+            </a:r>
+            <a:r>
+              <a:rPr lang="en-US" altLang="en-US" sz="2000" b="1" kern="0" baseline="-25000" dirty="0" err="1"/>
+              <a:t>Youths</a:t>
+            </a:r>
+            <a:r>
+              <a:rPr lang="en-US" altLang="en-US" sz="2000" b="1" kern="0" baseline="-25000" dirty="0"/>
+              <a:t> </a:t>
+            </a:r>
+            <a:r>
+              <a:rPr lang="en-US" altLang="en-US" sz="2000" b="1" kern="0" dirty="0"/>
+              <a:t>= 16,882 participants</a:t>
             </a:r>
           </a:p>
         </p:txBody>
@@ -8424,8 +8460,8 @@
         </p:nvSpPr>
         <p:spPr bwMode="auto">
           <a:xfrm>
-            <a:off x="5320343" y="2800546"/>
-            <a:ext cx="1910222" cy="1261884"/>
+            <a:off x="5123983" y="2569528"/>
+            <a:ext cx="2076842" cy="1554272"/>
           </a:xfrm>
           <a:prstGeom prst="rect">
             <a:avLst/>
@@ -8593,7 +8629,7 @@
             </a:pPr>
             <a:r>
               <a:rPr lang="en-US" altLang="en-US" sz="1900" b="1" kern="0" dirty="0"/>
-              <a:t>Exclude male participants </a:t>
+              <a:t>Exclude </a:t>
             </a:r>
           </a:p>
           <a:p>
@@ -8608,16 +8644,8 @@
               <a:defRPr/>
             </a:pPr>
             <a:r>
-              <a:rPr lang="en-US" altLang="en-US" sz="1900" b="1" kern="0" dirty="0" err="1"/>
-              <a:t>N</a:t>
-            </a:r>
-            <a:r>
-              <a:rPr lang="en-US" altLang="en-US" sz="1900" b="1" kern="0" baseline="-25000" dirty="0" err="1"/>
-              <a:t>Youths</a:t>
-            </a:r>
-            <a:r>
               <a:rPr lang="en-US" altLang="en-US" sz="1900" b="1" kern="0" dirty="0"/>
-              <a:t> = </a:t>
+              <a:t>male participants </a:t>
             </a:r>
           </a:p>
           <a:p>
@@ -8637,11 +8665,35 @@
             </a:r>
             <a:r>
               <a:rPr lang="en-US" altLang="en-US" sz="1900" b="1" kern="0" baseline="-25000" dirty="0" err="1"/>
+              <a:t>Youths</a:t>
+            </a:r>
+            <a:r>
+              <a:rPr lang="en-US" altLang="en-US" sz="1900" b="1" kern="0" dirty="0"/>
+              <a:t> = 4,584</a:t>
+            </a:r>
+          </a:p>
+          <a:p>
+            <a:pPr algn="ctr" defTabSz="914400" eaLnBrk="0" fontAlgn="base" hangingPunct="0">
+              <a:spcBef>
+                <a:spcPct val="0"/>
+              </a:spcBef>
+              <a:spcAft>
+                <a:spcPct val="0"/>
+              </a:spcAft>
+              <a:buNone/>
+              <a:defRPr/>
+            </a:pPr>
+            <a:r>
+              <a:rPr lang="en-US" altLang="en-US" sz="1900" b="1" kern="0" dirty="0" err="1"/>
+              <a:t>N</a:t>
+            </a:r>
+            <a:r>
+              <a:rPr lang="en-US" altLang="en-US" sz="1900" b="1" kern="0" baseline="-25000" dirty="0" err="1"/>
               <a:t>Adults</a:t>
             </a:r>
             <a:r>
               <a:rPr lang="en-US" altLang="en-US" sz="1900" b="1" kern="0" dirty="0"/>
-              <a:t> = 36,771</a:t>
+              <a:t> = 28,314</a:t>
             </a:r>
           </a:p>
         </p:txBody>
@@ -8662,7 +8714,7 @@
         </p:nvSpPr>
         <p:spPr bwMode="auto">
           <a:xfrm>
-            <a:off x="12209418" y="2508158"/>
+            <a:off x="12209418" y="2392339"/>
             <a:ext cx="1654217" cy="1846659"/>
           </a:xfrm>
           <a:prstGeom prst="rect">
@@ -8871,7 +8923,7 @@
             </a:r>
             <a:r>
               <a:rPr lang="en-US" altLang="en-US" sz="1900" b="1" kern="0" dirty="0"/>
-              <a:t> = </a:t>
+              <a:t> = 80</a:t>
             </a:r>
           </a:p>
           <a:p>
@@ -8895,7 +8947,7 @@
             </a:r>
             <a:r>
               <a:rPr lang="en-US" altLang="en-US" sz="1900" b="1" kern="0" dirty="0"/>
-              <a:t> = 261</a:t>
+              <a:t> = 231</a:t>
             </a:r>
           </a:p>
         </p:txBody>
@@ -8916,7 +8968,7 @@
         </p:nvSpPr>
         <p:spPr bwMode="auto">
           <a:xfrm>
-            <a:off x="17032346" y="2215771"/>
+            <a:off x="17032346" y="2246145"/>
             <a:ext cx="1866231" cy="2139047"/>
           </a:xfrm>
           <a:prstGeom prst="rect">
@@ -9170,7 +9222,7 @@
         </p:nvSpPr>
         <p:spPr bwMode="auto">
           <a:xfrm>
-            <a:off x="544477" y="2214526"/>
+            <a:off x="544477" y="2246145"/>
             <a:ext cx="1955326" cy="2139047"/>
           </a:xfrm>
           <a:prstGeom prst="rect">
@@ -9379,7 +9431,7 @@
             </a:r>
             <a:r>
               <a:rPr lang="en-US" altLang="en-US" sz="1900" b="1" kern="0" dirty="0"/>
-              <a:t> = 70,285</a:t>
+              <a:t> = 6,922</a:t>
             </a:r>
           </a:p>
           <a:p>
@@ -9403,7 +9455,7 @@
             </a:r>
             <a:r>
               <a:rPr lang="en-US" altLang="en-US" sz="1900" b="1" kern="0" dirty="0"/>
-              <a:t> = 50,045</a:t>
+              <a:t> = 229</a:t>
             </a:r>
           </a:p>
         </p:txBody>
@@ -9424,7 +9476,7 @@
         </p:nvSpPr>
         <p:spPr bwMode="auto">
           <a:xfrm>
-            <a:off x="14604312" y="2508158"/>
+            <a:off x="14604312" y="2392339"/>
             <a:ext cx="1715890" cy="1846659"/>
           </a:xfrm>
           <a:prstGeom prst="rect">
@@ -9633,7 +9685,7 @@
             </a:r>
             <a:r>
               <a:rPr lang="en-US" altLang="en-US" sz="1900" b="1" kern="0" dirty="0"/>
-              <a:t> = </a:t>
+              <a:t> = 3</a:t>
             </a:r>
           </a:p>
           <a:p>
@@ -9657,7 +9709,7 @@
             </a:r>
             <a:r>
               <a:rPr lang="en-US" altLang="en-US" sz="1900" b="1" kern="0" dirty="0"/>
-              <a:t> = 28</a:t>
+              <a:t> = 26</a:t>
             </a:r>
           </a:p>
         </p:txBody>
@@ -9678,7 +9730,7 @@
         </p:nvSpPr>
         <p:spPr bwMode="auto">
           <a:xfrm>
-            <a:off x="9552596" y="2215771"/>
+            <a:off x="9552596" y="2246145"/>
             <a:ext cx="2062876" cy="2139047"/>
           </a:xfrm>
           <a:prstGeom prst="rect">
@@ -9887,7 +9939,7 @@
             </a:r>
             <a:r>
               <a:rPr lang="en-US" altLang="en-US" sz="1900" b="1" kern="0" dirty="0"/>
-              <a:t> = </a:t>
+              <a:t> =</a:t>
             </a:r>
           </a:p>
           <a:p>
@@ -9911,7 +9963,7 @@
             </a:r>
             <a:r>
               <a:rPr lang="en-US" altLang="en-US" sz="1900" b="1" kern="0" dirty="0"/>
-              <a:t> = 4,322</a:t>
+              <a:t> = 3,299</a:t>
             </a:r>
           </a:p>
         </p:txBody>
@@ -9932,7 +9984,7 @@
         </p:nvSpPr>
         <p:spPr bwMode="auto">
           <a:xfrm>
-            <a:off x="7387495" y="2508158"/>
+            <a:off x="7263511" y="2392339"/>
             <a:ext cx="1937819" cy="1846659"/>
           </a:xfrm>
           <a:prstGeom prst="rect">
@@ -10125,7 +10177,7 @@
             </a:r>
             <a:r>
               <a:rPr lang="en-US" altLang="en-US" sz="1900" b="1" kern="0" dirty="0"/>
-              <a:t> = </a:t>
+              <a:t> = 3,297</a:t>
             </a:r>
           </a:p>
           <a:p>
@@ -10149,7 +10201,7 @@
             </a:r>
             <a:r>
               <a:rPr lang="en-US" altLang="en-US" sz="1900" b="1" kern="0" dirty="0"/>
-              <a:t> = 32,459</a:t>
+              <a:t> = 24,507</a:t>
             </a:r>
           </a:p>
         </p:txBody>
@@ -10170,7 +10222,7 @@
         </p:nvSpPr>
         <p:spPr bwMode="auto">
           <a:xfrm>
-            <a:off x="2729534" y="2508158"/>
+            <a:off x="2636546" y="2392339"/>
             <a:ext cx="2536062" cy="1846659"/>
           </a:xfrm>
           <a:prstGeom prst="rect">
@@ -10379,7 +10431,7 @@
             </a:r>
             <a:r>
               <a:rPr lang="en-US" altLang="en-US" sz="1900" b="1" kern="0" dirty="0"/>
-              <a:t> = 920</a:t>
+              <a:t> = 751</a:t>
             </a:r>
           </a:p>
           <a:p>
@@ -10403,7 +10455,7 @@
             </a:r>
             <a:r>
               <a:rPr lang="en-US" altLang="en-US" sz="1900" b="1" kern="0" dirty="0"/>
-              <a:t> = 5,114</a:t>
+              <a:t> = 3913</a:t>
             </a:r>
           </a:p>
         </p:txBody>
@@ -10424,7 +10476,7 @@
         </p:nvCxnSpPr>
         <p:spPr bwMode="auto">
           <a:xfrm>
-            <a:off x="2554524" y="3136547"/>
+            <a:off x="2411288" y="3136547"/>
             <a:ext cx="636491" cy="0"/>
           </a:xfrm>
           <a:prstGeom prst="straightConnector1">
@@ -10461,7 +10513,7 @@
         </p:nvCxnSpPr>
         <p:spPr bwMode="auto">
           <a:xfrm>
-            <a:off x="4959557" y="3136547"/>
+            <a:off x="4804577" y="3136547"/>
             <a:ext cx="636491" cy="0"/>
           </a:xfrm>
           <a:prstGeom prst="straightConnector1">

</xml_diff>

<commit_message>
incorporate counts on excluded adults and children
</commit_message>
<xml_diff>
--- a/Workflow Figure - Weight Perception BP3 1a_SZ_v3.pptx
+++ b/Workflow Figure - Weight Perception BP3 1a_SZ_v3.pptx
@@ -243,7 +243,7 @@
           <a:p>
             <a:fld id="{3A8AD564-B736-0C45-B96E-1A374E4A831F}" type="datetimeFigureOut">
               <a:rPr lang="en-US" smtClean="0"/>
-              <a:t>1/24/24</a:t>
+              <a:t>1/30/24</a:t>
             </a:fld>
             <a:endParaRPr lang="en-US"/>
           </a:p>
@@ -413,7 +413,7 @@
           <a:p>
             <a:fld id="{3A8AD564-B736-0C45-B96E-1A374E4A831F}" type="datetimeFigureOut">
               <a:rPr lang="en-US" smtClean="0"/>
-              <a:t>1/24/24</a:t>
+              <a:t>1/30/24</a:t>
             </a:fld>
             <a:endParaRPr lang="en-US"/>
           </a:p>
@@ -593,7 +593,7 @@
           <a:p>
             <a:fld id="{3A8AD564-B736-0C45-B96E-1A374E4A831F}" type="datetimeFigureOut">
               <a:rPr lang="en-US" smtClean="0"/>
-              <a:t>1/24/24</a:t>
+              <a:t>1/30/24</a:t>
             </a:fld>
             <a:endParaRPr lang="en-US"/>
           </a:p>
@@ -763,7 +763,7 @@
           <a:p>
             <a:fld id="{3A8AD564-B736-0C45-B96E-1A374E4A831F}" type="datetimeFigureOut">
               <a:rPr lang="en-US" smtClean="0"/>
-              <a:t>1/24/24</a:t>
+              <a:t>1/30/24</a:t>
             </a:fld>
             <a:endParaRPr lang="en-US"/>
           </a:p>
@@ -1007,7 +1007,7 @@
           <a:p>
             <a:fld id="{3A8AD564-B736-0C45-B96E-1A374E4A831F}" type="datetimeFigureOut">
               <a:rPr lang="en-US" smtClean="0"/>
-              <a:t>1/24/24</a:t>
+              <a:t>1/30/24</a:t>
             </a:fld>
             <a:endParaRPr lang="en-US"/>
           </a:p>
@@ -1239,7 +1239,7 @@
           <a:p>
             <a:fld id="{3A8AD564-B736-0C45-B96E-1A374E4A831F}" type="datetimeFigureOut">
               <a:rPr lang="en-US" smtClean="0"/>
-              <a:t>1/24/24</a:t>
+              <a:t>1/30/24</a:t>
             </a:fld>
             <a:endParaRPr lang="en-US"/>
           </a:p>
@@ -1606,7 +1606,7 @@
           <a:p>
             <a:fld id="{3A8AD564-B736-0C45-B96E-1A374E4A831F}" type="datetimeFigureOut">
               <a:rPr lang="en-US" smtClean="0"/>
-              <a:t>1/24/24</a:t>
+              <a:t>1/30/24</a:t>
             </a:fld>
             <a:endParaRPr lang="en-US"/>
           </a:p>
@@ -1724,7 +1724,7 @@
           <a:p>
             <a:fld id="{3A8AD564-B736-0C45-B96E-1A374E4A831F}" type="datetimeFigureOut">
               <a:rPr lang="en-US" smtClean="0"/>
-              <a:t>1/24/24</a:t>
+              <a:t>1/30/24</a:t>
             </a:fld>
             <a:endParaRPr lang="en-US"/>
           </a:p>
@@ -1819,7 +1819,7 @@
           <a:p>
             <a:fld id="{3A8AD564-B736-0C45-B96E-1A374E4A831F}" type="datetimeFigureOut">
               <a:rPr lang="en-US" smtClean="0"/>
-              <a:t>1/24/24</a:t>
+              <a:t>1/30/24</a:t>
             </a:fld>
             <a:endParaRPr lang="en-US"/>
           </a:p>
@@ -2096,7 +2096,7 @@
           <a:p>
             <a:fld id="{3A8AD564-B736-0C45-B96E-1A374E4A831F}" type="datetimeFigureOut">
               <a:rPr lang="en-US" smtClean="0"/>
-              <a:t>1/24/24</a:t>
+              <a:t>1/30/24</a:t>
             </a:fld>
             <a:endParaRPr lang="en-US"/>
           </a:p>
@@ -2353,7 +2353,7 @@
           <a:p>
             <a:fld id="{3A8AD564-B736-0C45-B96E-1A374E4A831F}" type="datetimeFigureOut">
               <a:rPr lang="en-US" smtClean="0"/>
-              <a:t>1/24/24</a:t>
+              <a:t>1/30/24</a:t>
             </a:fld>
             <a:endParaRPr lang="en-US"/>
           </a:p>
@@ -2566,7 +2566,7 @@
           <a:p>
             <a:fld id="{3A8AD564-B736-0C45-B96E-1A374E4A831F}" type="datetimeFigureOut">
               <a:rPr lang="en-US" smtClean="0"/>
-              <a:t>1/24/24</a:t>
+              <a:t>1/30/24</a:t>
             </a:fld>
             <a:endParaRPr lang="en-US"/>
           </a:p>
@@ -8460,7 +8460,7 @@
         </p:nvSpPr>
         <p:spPr bwMode="auto">
           <a:xfrm>
-            <a:off x="5123983" y="2569528"/>
+            <a:off x="5123983" y="2739480"/>
             <a:ext cx="2076842" cy="1554272"/>
           </a:xfrm>
           <a:prstGeom prst="rect">
@@ -8714,7 +8714,7 @@
         </p:nvSpPr>
         <p:spPr bwMode="auto">
           <a:xfrm>
-            <a:off x="12209418" y="2392339"/>
+            <a:off x="12209418" y="2447093"/>
             <a:ext cx="1654217" cy="1846659"/>
           </a:xfrm>
           <a:prstGeom prst="rect">
@@ -8968,7 +8968,7 @@
         </p:nvSpPr>
         <p:spPr bwMode="auto">
           <a:xfrm>
-            <a:off x="17032346" y="2153381"/>
+            <a:off x="17032346" y="2154705"/>
             <a:ext cx="1866231" cy="2139047"/>
           </a:xfrm>
           <a:prstGeom prst="rect">
@@ -9222,7 +9222,7 @@
         </p:nvSpPr>
         <p:spPr bwMode="auto">
           <a:xfrm>
-            <a:off x="544477" y="2246145"/>
+            <a:off x="544477" y="2154705"/>
             <a:ext cx="1955326" cy="2139047"/>
           </a:xfrm>
           <a:prstGeom prst="rect">
@@ -9476,7 +9476,7 @@
         </p:nvSpPr>
         <p:spPr bwMode="auto">
           <a:xfrm>
-            <a:off x="14604312" y="2392339"/>
+            <a:off x="14604312" y="2447093"/>
             <a:ext cx="1715890" cy="1846659"/>
           </a:xfrm>
           <a:prstGeom prst="rect">
@@ -9730,7 +9730,7 @@
         </p:nvSpPr>
         <p:spPr bwMode="auto">
           <a:xfrm>
-            <a:off x="9552596" y="2246145"/>
+            <a:off x="9552596" y="2154705"/>
             <a:ext cx="2062876" cy="2139047"/>
           </a:xfrm>
           <a:prstGeom prst="rect">
@@ -9984,7 +9984,7 @@
         </p:nvSpPr>
         <p:spPr bwMode="auto">
           <a:xfrm>
-            <a:off x="7263511" y="2392339"/>
+            <a:off x="7263511" y="2447093"/>
             <a:ext cx="1937819" cy="1846659"/>
           </a:xfrm>
           <a:prstGeom prst="rect">
@@ -10222,7 +10222,7 @@
         </p:nvSpPr>
         <p:spPr bwMode="auto">
           <a:xfrm>
-            <a:off x="2636546" y="2392339"/>
+            <a:off x="2636546" y="2447093"/>
             <a:ext cx="2536062" cy="1846659"/>
           </a:xfrm>
           <a:prstGeom prst="rect">

</xml_diff>